<commit_message>
PowerPoint Literaturfolie. Titelfolie ergänzt. Graphiken eingefügt.
</commit_message>
<xml_diff>
--- a/Referat/PowerPoint/TimvS_SVNE.pptx
+++ b/Referat/PowerPoint/TimvS_SVNE.pptx
@@ -5,18 +5,23 @@
     <p:sldMasterId id="2147483652" r:id="rId1"/>
   </p:sldMasterIdLst>
   <p:notesMasterIdLst>
-    <p:notesMasterId r:id="rId8"/>
+    <p:notesMasterId r:id="rId13"/>
   </p:notesMasterIdLst>
   <p:handoutMasterIdLst>
-    <p:handoutMasterId r:id="rId9"/>
+    <p:handoutMasterId r:id="rId14"/>
   </p:handoutMasterIdLst>
   <p:sldIdLst>
-    <p:sldId id="836" r:id="rId2"/>
-    <p:sldId id="837" r:id="rId3"/>
-    <p:sldId id="838" r:id="rId4"/>
-    <p:sldId id="839" r:id="rId5"/>
-    <p:sldId id="840" r:id="rId6"/>
-    <p:sldId id="841" r:id="rId7"/>
+    <p:sldId id="844" r:id="rId2"/>
+    <p:sldId id="836" r:id="rId3"/>
+    <p:sldId id="837" r:id="rId4"/>
+    <p:sldId id="838" r:id="rId5"/>
+    <p:sldId id="839" r:id="rId6"/>
+    <p:sldId id="843" r:id="rId7"/>
+    <p:sldId id="842" r:id="rId8"/>
+    <p:sldId id="840" r:id="rId9"/>
+    <p:sldId id="841" r:id="rId10"/>
+    <p:sldId id="845" r:id="rId11"/>
+    <p:sldId id="846" r:id="rId12"/>
   </p:sldIdLst>
   <p:sldSz cx="9144000" cy="6858000" type="screen4x3"/>
   <p:notesSz cx="6781800" cy="9855200"/>
@@ -400,7 +405,7 @@
             <a:fld id="{AE02961B-B228-4466-84E5-B65BB245109F}" type="datetimeFigureOut">
               <a:rPr lang="de-DE"/>
               <a:pPr/>
-              <a:t>12.02.2017</a:t>
+              <a:t>13.02.2017</a:t>
             </a:fld>
             <a:endParaRPr lang="de-DE"/>
           </a:p>
@@ -811,7 +816,7 @@
             <a:fld id="{87E9C61A-9B5E-4580-98DD-1AC874081FFB}" type="slidenum">
               <a:rPr lang="de-DE" smtClean="0"/>
               <a:pPr/>
-              <a:t>2</a:t>
+              <a:t>3</a:t>
             </a:fld>
             <a:endParaRPr lang="de-DE"/>
           </a:p>
@@ -896,7 +901,7 @@
             <a:fld id="{87E9C61A-9B5E-4580-98DD-1AC874081FFB}" type="slidenum">
               <a:rPr lang="de-DE" smtClean="0"/>
               <a:pPr/>
-              <a:t>3</a:t>
+              <a:t>4</a:t>
             </a:fld>
             <a:endParaRPr lang="de-DE"/>
           </a:p>
@@ -981,7 +986,7 @@
             <a:fld id="{87E9C61A-9B5E-4580-98DD-1AC874081FFB}" type="slidenum">
               <a:rPr lang="de-DE" smtClean="0"/>
               <a:pPr/>
-              <a:t>4</a:t>
+              <a:t>5</a:t>
             </a:fld>
             <a:endParaRPr lang="de-DE"/>
           </a:p>
@@ -1066,7 +1071,7 @@
             <a:fld id="{87E9C61A-9B5E-4580-98DD-1AC874081FFB}" type="slidenum">
               <a:rPr lang="de-DE" smtClean="0"/>
               <a:pPr/>
-              <a:t>5</a:t>
+              <a:t>6</a:t>
             </a:fld>
             <a:endParaRPr lang="de-DE"/>
           </a:p>
@@ -1075,7 +1080,7 @@
     </p:spTree>
     <p:extLst>
       <p:ext uri="{BB962C8B-B14F-4D97-AF65-F5344CB8AC3E}">
-        <p14:creationId xmlns:p14="http://schemas.microsoft.com/office/powerpoint/2010/main" val="669372719"/>
+        <p14:creationId xmlns:p14="http://schemas.microsoft.com/office/powerpoint/2010/main" val="1004574314"/>
       </p:ext>
     </p:extLst>
   </p:cSld>
@@ -1151,7 +1156,177 @@
             <a:fld id="{87E9C61A-9B5E-4580-98DD-1AC874081FFB}" type="slidenum">
               <a:rPr lang="de-DE" smtClean="0"/>
               <a:pPr/>
-              <a:t>6</a:t>
+              <a:t>7</a:t>
+            </a:fld>
+            <a:endParaRPr lang="de-DE"/>
+          </a:p>
+        </p:txBody>
+      </p:sp>
+    </p:spTree>
+    <p:extLst>
+      <p:ext uri="{BB962C8B-B14F-4D97-AF65-F5344CB8AC3E}">
+        <p14:creationId xmlns:p14="http://schemas.microsoft.com/office/powerpoint/2010/main" val="2577850142"/>
+      </p:ext>
+    </p:extLst>
+  </p:cSld>
+  <p:clrMapOvr>
+    <a:masterClrMapping/>
+  </p:clrMapOvr>
+</p:notes>
+</file>
+
+<file path=ppt/notesSlides/notesSlide6.xml><?xml version="1.0" encoding="utf-8"?>
+<p:notes xmlns:a="http://schemas.openxmlformats.org/drawingml/2006/main" xmlns:r="http://schemas.openxmlformats.org/officeDocument/2006/relationships" xmlns:p="http://schemas.openxmlformats.org/presentationml/2006/main">
+  <p:cSld>
+    <p:spTree>
+      <p:nvGrpSpPr>
+        <p:cNvPr id="1" name=""/>
+        <p:cNvGrpSpPr/>
+        <p:nvPr/>
+      </p:nvGrpSpPr>
+      <p:grpSpPr>
+        <a:xfrm>
+          <a:off x="0" y="0"/>
+          <a:ext cx="0" cy="0"/>
+          <a:chOff x="0" y="0"/>
+          <a:chExt cx="0" cy="0"/>
+        </a:xfrm>
+      </p:grpSpPr>
+      <p:sp>
+        <p:nvSpPr>
+          <p:cNvPr id="2" name="Folienbildplatzhalter 1"/>
+          <p:cNvSpPr>
+            <a:spLocks noGrp="1" noRot="1" noChangeAspect="1"/>
+          </p:cNvSpPr>
+          <p:nvPr>
+            <p:ph type="sldImg"/>
+          </p:nvPr>
+        </p:nvSpPr>
+        <p:spPr/>
+      </p:sp>
+      <p:sp>
+        <p:nvSpPr>
+          <p:cNvPr id="3" name="Notizenplatzhalter 2"/>
+          <p:cNvSpPr>
+            <a:spLocks noGrp="1"/>
+          </p:cNvSpPr>
+          <p:nvPr>
+            <p:ph type="body" idx="1"/>
+          </p:nvPr>
+        </p:nvSpPr>
+        <p:spPr/>
+        <p:txBody>
+          <a:bodyPr/>
+          <a:lstStyle/>
+          <a:p>
+            <a:endParaRPr lang="de-DE" dirty="0"/>
+          </a:p>
+        </p:txBody>
+      </p:sp>
+      <p:sp>
+        <p:nvSpPr>
+          <p:cNvPr id="4" name="Foliennummernplatzhalter 3"/>
+          <p:cNvSpPr>
+            <a:spLocks noGrp="1"/>
+          </p:cNvSpPr>
+          <p:nvPr>
+            <p:ph type="sldNum" sz="quarter" idx="10"/>
+          </p:nvPr>
+        </p:nvSpPr>
+        <p:spPr/>
+        <p:txBody>
+          <a:bodyPr/>
+          <a:lstStyle/>
+          <a:p>
+            <a:fld id="{87E9C61A-9B5E-4580-98DD-1AC874081FFB}" type="slidenum">
+              <a:rPr lang="de-DE" smtClean="0"/>
+              <a:pPr/>
+              <a:t>8</a:t>
+            </a:fld>
+            <a:endParaRPr lang="de-DE"/>
+          </a:p>
+        </p:txBody>
+      </p:sp>
+    </p:spTree>
+    <p:extLst>
+      <p:ext uri="{BB962C8B-B14F-4D97-AF65-F5344CB8AC3E}">
+        <p14:creationId xmlns:p14="http://schemas.microsoft.com/office/powerpoint/2010/main" val="669372719"/>
+      </p:ext>
+    </p:extLst>
+  </p:cSld>
+  <p:clrMapOvr>
+    <a:masterClrMapping/>
+  </p:clrMapOvr>
+</p:notes>
+</file>
+
+<file path=ppt/notesSlides/notesSlide7.xml><?xml version="1.0" encoding="utf-8"?>
+<p:notes xmlns:a="http://schemas.openxmlformats.org/drawingml/2006/main" xmlns:r="http://schemas.openxmlformats.org/officeDocument/2006/relationships" xmlns:p="http://schemas.openxmlformats.org/presentationml/2006/main">
+  <p:cSld>
+    <p:spTree>
+      <p:nvGrpSpPr>
+        <p:cNvPr id="1" name=""/>
+        <p:cNvGrpSpPr/>
+        <p:nvPr/>
+      </p:nvGrpSpPr>
+      <p:grpSpPr>
+        <a:xfrm>
+          <a:off x="0" y="0"/>
+          <a:ext cx="0" cy="0"/>
+          <a:chOff x="0" y="0"/>
+          <a:chExt cx="0" cy="0"/>
+        </a:xfrm>
+      </p:grpSpPr>
+      <p:sp>
+        <p:nvSpPr>
+          <p:cNvPr id="2" name="Folienbildplatzhalter 1"/>
+          <p:cNvSpPr>
+            <a:spLocks noGrp="1" noRot="1" noChangeAspect="1"/>
+          </p:cNvSpPr>
+          <p:nvPr>
+            <p:ph type="sldImg"/>
+          </p:nvPr>
+        </p:nvSpPr>
+        <p:spPr/>
+      </p:sp>
+      <p:sp>
+        <p:nvSpPr>
+          <p:cNvPr id="3" name="Notizenplatzhalter 2"/>
+          <p:cNvSpPr>
+            <a:spLocks noGrp="1"/>
+          </p:cNvSpPr>
+          <p:nvPr>
+            <p:ph type="body" idx="1"/>
+          </p:nvPr>
+        </p:nvSpPr>
+        <p:spPr/>
+        <p:txBody>
+          <a:bodyPr/>
+          <a:lstStyle/>
+          <a:p>
+            <a:endParaRPr lang="de-DE" dirty="0"/>
+          </a:p>
+        </p:txBody>
+      </p:sp>
+      <p:sp>
+        <p:nvSpPr>
+          <p:cNvPr id="4" name="Foliennummernplatzhalter 3"/>
+          <p:cNvSpPr>
+            <a:spLocks noGrp="1"/>
+          </p:cNvSpPr>
+          <p:nvPr>
+            <p:ph type="sldNum" sz="quarter" idx="10"/>
+          </p:nvPr>
+        </p:nvSpPr>
+        <p:spPr/>
+        <p:txBody>
+          <a:bodyPr/>
+          <a:lstStyle/>
+          <a:p>
+            <a:fld id="{87E9C61A-9B5E-4580-98DD-1AC874081FFB}" type="slidenum">
+              <a:rPr lang="de-DE" smtClean="0"/>
+              <a:pPr/>
+              <a:t>9</a:t>
             </a:fld>
             <a:endParaRPr lang="de-DE"/>
           </a:p>
@@ -1161,6 +1336,176 @@
     <p:extLst>
       <p:ext uri="{BB962C8B-B14F-4D97-AF65-F5344CB8AC3E}">
         <p14:creationId xmlns:p14="http://schemas.microsoft.com/office/powerpoint/2010/main" val="752673120"/>
+      </p:ext>
+    </p:extLst>
+  </p:cSld>
+  <p:clrMapOvr>
+    <a:masterClrMapping/>
+  </p:clrMapOvr>
+</p:notes>
+</file>
+
+<file path=ppt/notesSlides/notesSlide8.xml><?xml version="1.0" encoding="utf-8"?>
+<p:notes xmlns:a="http://schemas.openxmlformats.org/drawingml/2006/main" xmlns:r="http://schemas.openxmlformats.org/officeDocument/2006/relationships" xmlns:p="http://schemas.openxmlformats.org/presentationml/2006/main">
+  <p:cSld>
+    <p:spTree>
+      <p:nvGrpSpPr>
+        <p:cNvPr id="1" name=""/>
+        <p:cNvGrpSpPr/>
+        <p:nvPr/>
+      </p:nvGrpSpPr>
+      <p:grpSpPr>
+        <a:xfrm>
+          <a:off x="0" y="0"/>
+          <a:ext cx="0" cy="0"/>
+          <a:chOff x="0" y="0"/>
+          <a:chExt cx="0" cy="0"/>
+        </a:xfrm>
+      </p:grpSpPr>
+      <p:sp>
+        <p:nvSpPr>
+          <p:cNvPr id="2" name="Folienbildplatzhalter 1"/>
+          <p:cNvSpPr>
+            <a:spLocks noGrp="1" noRot="1" noChangeAspect="1"/>
+          </p:cNvSpPr>
+          <p:nvPr>
+            <p:ph type="sldImg"/>
+          </p:nvPr>
+        </p:nvSpPr>
+        <p:spPr/>
+      </p:sp>
+      <p:sp>
+        <p:nvSpPr>
+          <p:cNvPr id="3" name="Notizenplatzhalter 2"/>
+          <p:cNvSpPr>
+            <a:spLocks noGrp="1"/>
+          </p:cNvSpPr>
+          <p:nvPr>
+            <p:ph type="body" idx="1"/>
+          </p:nvPr>
+        </p:nvSpPr>
+        <p:spPr/>
+        <p:txBody>
+          <a:bodyPr/>
+          <a:lstStyle/>
+          <a:p>
+            <a:endParaRPr lang="de-DE" dirty="0"/>
+          </a:p>
+        </p:txBody>
+      </p:sp>
+      <p:sp>
+        <p:nvSpPr>
+          <p:cNvPr id="4" name="Foliennummernplatzhalter 3"/>
+          <p:cNvSpPr>
+            <a:spLocks noGrp="1"/>
+          </p:cNvSpPr>
+          <p:nvPr>
+            <p:ph type="sldNum" sz="quarter" idx="10"/>
+          </p:nvPr>
+        </p:nvSpPr>
+        <p:spPr/>
+        <p:txBody>
+          <a:bodyPr/>
+          <a:lstStyle/>
+          <a:p>
+            <a:fld id="{87E9C61A-9B5E-4580-98DD-1AC874081FFB}" type="slidenum">
+              <a:rPr lang="de-DE" smtClean="0"/>
+              <a:pPr/>
+              <a:t>10</a:t>
+            </a:fld>
+            <a:endParaRPr lang="de-DE"/>
+          </a:p>
+        </p:txBody>
+      </p:sp>
+    </p:spTree>
+    <p:extLst>
+      <p:ext uri="{BB962C8B-B14F-4D97-AF65-F5344CB8AC3E}">
+        <p14:creationId xmlns:p14="http://schemas.microsoft.com/office/powerpoint/2010/main" val="1348049600"/>
+      </p:ext>
+    </p:extLst>
+  </p:cSld>
+  <p:clrMapOvr>
+    <a:masterClrMapping/>
+  </p:clrMapOvr>
+</p:notes>
+</file>
+
+<file path=ppt/notesSlides/notesSlide9.xml><?xml version="1.0" encoding="utf-8"?>
+<p:notes xmlns:a="http://schemas.openxmlformats.org/drawingml/2006/main" xmlns:r="http://schemas.openxmlformats.org/officeDocument/2006/relationships" xmlns:p="http://schemas.openxmlformats.org/presentationml/2006/main">
+  <p:cSld>
+    <p:spTree>
+      <p:nvGrpSpPr>
+        <p:cNvPr id="1" name=""/>
+        <p:cNvGrpSpPr/>
+        <p:nvPr/>
+      </p:nvGrpSpPr>
+      <p:grpSpPr>
+        <a:xfrm>
+          <a:off x="0" y="0"/>
+          <a:ext cx="0" cy="0"/>
+          <a:chOff x="0" y="0"/>
+          <a:chExt cx="0" cy="0"/>
+        </a:xfrm>
+      </p:grpSpPr>
+      <p:sp>
+        <p:nvSpPr>
+          <p:cNvPr id="2" name="Folienbildplatzhalter 1"/>
+          <p:cNvSpPr>
+            <a:spLocks noGrp="1" noRot="1" noChangeAspect="1"/>
+          </p:cNvSpPr>
+          <p:nvPr>
+            <p:ph type="sldImg"/>
+          </p:nvPr>
+        </p:nvSpPr>
+        <p:spPr/>
+      </p:sp>
+      <p:sp>
+        <p:nvSpPr>
+          <p:cNvPr id="3" name="Notizenplatzhalter 2"/>
+          <p:cNvSpPr>
+            <a:spLocks noGrp="1"/>
+          </p:cNvSpPr>
+          <p:nvPr>
+            <p:ph type="body" idx="1"/>
+          </p:nvPr>
+        </p:nvSpPr>
+        <p:spPr/>
+        <p:txBody>
+          <a:bodyPr/>
+          <a:lstStyle/>
+          <a:p>
+            <a:endParaRPr lang="de-DE" dirty="0"/>
+          </a:p>
+        </p:txBody>
+      </p:sp>
+      <p:sp>
+        <p:nvSpPr>
+          <p:cNvPr id="4" name="Foliennummernplatzhalter 3"/>
+          <p:cNvSpPr>
+            <a:spLocks noGrp="1"/>
+          </p:cNvSpPr>
+          <p:nvPr>
+            <p:ph type="sldNum" sz="quarter" idx="10"/>
+          </p:nvPr>
+        </p:nvSpPr>
+        <p:spPr/>
+        <p:txBody>
+          <a:bodyPr/>
+          <a:lstStyle/>
+          <a:p>
+            <a:fld id="{87E9C61A-9B5E-4580-98DD-1AC874081FFB}" type="slidenum">
+              <a:rPr lang="de-DE" smtClean="0"/>
+              <a:pPr/>
+              <a:t>11</a:t>
+            </a:fld>
+            <a:endParaRPr lang="de-DE"/>
+          </a:p>
+        </p:txBody>
+      </p:sp>
+    </p:spTree>
+    <p:extLst>
+      <p:ext uri="{BB962C8B-B14F-4D97-AF65-F5344CB8AC3E}">
+        <p14:creationId xmlns:p14="http://schemas.microsoft.com/office/powerpoint/2010/main" val="2648054851"/>
       </p:ext>
     </p:extLst>
   </p:cSld>
@@ -5143,116 +5488,674 @@
       </p:grpSpPr>
       <p:sp>
         <p:nvSpPr>
-          <p:cNvPr id="10" name="Untertitel 9"/>
-          <p:cNvSpPr>
-            <a:spLocks noGrp="1"/>
-          </p:cNvSpPr>
-          <p:nvPr>
-            <p:ph type="subTitle" idx="1"/>
-          </p:nvPr>
-        </p:nvSpPr>
-        <p:spPr/>
-        <p:txBody>
-          <a:bodyPr/>
+          <p:cNvPr id="6" name="Rechteck 5"/>
+          <p:cNvSpPr/>
+          <p:nvPr/>
+        </p:nvSpPr>
+        <p:spPr bwMode="auto">
+          <a:xfrm>
+            <a:off x="0" y="0"/>
+            <a:ext cx="9144000" cy="6858000"/>
+          </a:xfrm>
+          <a:prstGeom prst="rect">
+            <a:avLst/>
+          </a:prstGeom>
+          <a:solidFill>
+            <a:schemeClr val="tx1"/>
+          </a:solidFill>
+          <a:ln w="12700" cap="flat" cmpd="sng" algn="ctr">
+            <a:noFill/>
+            <a:prstDash val="solid"/>
+            <a:round/>
+            <a:headEnd type="none" w="med" len="med"/>
+            <a:tailEnd type="none" w="med" len="med"/>
+          </a:ln>
+          <a:effectLst/>
+        </p:spPr>
+        <p:txBody>
+          <a:bodyPr vert="horz" wrap="square" lIns="91440" tIns="45720" rIns="91440" bIns="45720" numCol="1" rtlCol="0" anchor="ctr" anchorCtr="0" compatLnSpc="1">
+            <a:prstTxWarp prst="textNoShape">
+              <a:avLst/>
+            </a:prstTxWarp>
+          </a:bodyPr>
           <a:lstStyle/>
           <a:p>
-            <a:pPr>
+            <a:pPr marL="0" marR="0" indent="0" algn="l" defTabSz="914400" rtl="0" eaLnBrk="0" fontAlgn="base" latinLnBrk="0" hangingPunct="0">
+              <a:lnSpc>
+                <a:spcPct val="100000"/>
+              </a:lnSpc>
+              <a:spcBef>
+                <a:spcPct val="0"/>
+              </a:spcBef>
+              <a:spcAft>
+                <a:spcPct val="0"/>
+              </a:spcAft>
+              <a:buClrTx/>
+              <a:buSzTx/>
+              <a:buFontTx/>
               <a:buNone/>
+              <a:tabLst/>
             </a:pPr>
-            <a:r>
-              <a:rPr lang="de-DE" dirty="0" smtClean="0"/>
-              <a:t>Abschlusspräsentation im Bachelorseminar</a:t>
-            </a:r>
-          </a:p>
-          <a:p>
-            <a:pPr>
-              <a:buNone/>
-            </a:pPr>
-            <a:r>
-              <a:rPr lang="de-DE" dirty="0"/>
-              <a:t>„Trends in Mobilen und Verteilten </a:t>
-            </a:r>
-            <a:r>
-              <a:rPr lang="de-DE" dirty="0" smtClean="0"/>
-              <a:t>Systemen“</a:t>
-            </a:r>
-            <a:endParaRPr lang="de-DE" dirty="0"/>
-          </a:p>
-        </p:txBody>
-      </p:sp>
-      <p:sp>
-        <p:nvSpPr>
-          <p:cNvPr id="9" name="Titel 8"/>
-          <p:cNvSpPr>
-            <a:spLocks noGrp="1"/>
-          </p:cNvSpPr>
-          <p:nvPr>
-            <p:ph type="ctrTitle"/>
-          </p:nvPr>
-        </p:nvSpPr>
-        <p:spPr/>
-        <p:txBody>
-          <a:bodyPr/>
-          <a:lstStyle/>
-          <a:p>
-            <a:r>
-              <a:rPr lang="de-DE" dirty="0"/>
-              <a:t>Sicherheitsaspekte beim </a:t>
-            </a:r>
-            <a:r>
-              <a:rPr lang="de-DE" dirty="0" err="1"/>
-              <a:t>Deployment</a:t>
-            </a:r>
-            <a:r>
-              <a:rPr lang="de-DE" dirty="0"/>
-              <a:t> virtueller</a:t>
-            </a:r>
-            <a:br>
-              <a:rPr lang="de-DE" dirty="0"/>
-            </a:br>
-            <a:r>
-              <a:rPr lang="de-DE" dirty="0" smtClean="0"/>
-              <a:t>Netzinfrastrukturen</a:t>
-            </a:r>
-            <a:endParaRPr lang="de-DE" dirty="0"/>
-          </a:p>
-        </p:txBody>
-      </p:sp>
-      <p:sp>
-        <p:nvSpPr>
-          <p:cNvPr id="11" name="Textplatzhalter 10"/>
-          <p:cNvSpPr>
-            <a:spLocks noGrp="1"/>
-          </p:cNvSpPr>
-          <p:nvPr>
-            <p:ph type="body" sz="quarter" idx="10"/>
-          </p:nvPr>
-        </p:nvSpPr>
-        <p:spPr/>
-        <p:txBody>
-          <a:bodyPr/>
-          <a:lstStyle/>
-          <a:p>
-            <a:r>
-              <a:rPr lang="de-DE" dirty="0" smtClean="0"/>
-              <a:t>Gerhard </a:t>
-            </a:r>
-            <a:r>
-              <a:rPr lang="de-DE" dirty="0" err="1" smtClean="0"/>
-              <a:t>Gröschl</a:t>
-            </a:r>
-            <a:r>
-              <a:rPr lang="de-DE" dirty="0" smtClean="0"/>
-              <a:t>, Miran Mizani</a:t>
-            </a:r>
-            <a:endParaRPr lang="de-DE" dirty="0"/>
+            <a:endParaRPr kumimoji="0" lang="de-DE" sz="1400" b="0" i="0" u="none" strike="noStrike" cap="none" normalizeH="0" baseline="0" smtClean="0">
+              <a:ln>
+                <a:noFill/>
+              </a:ln>
+              <a:solidFill>
+                <a:schemeClr val="tx1"/>
+              </a:solidFill>
+              <a:effectLst/>
+              <a:latin typeface="LMU CompatilFact" pitchFamily="2" charset="0"/>
+            </a:endParaRPr>
           </a:p>
         </p:txBody>
       </p:sp>
     </p:spTree>
     <p:extLst>
       <p:ext uri="{BB962C8B-B14F-4D97-AF65-F5344CB8AC3E}">
-        <p14:creationId xmlns:p14="http://schemas.microsoft.com/office/powerpoint/2010/main" val="2931754677"/>
+        <p14:creationId xmlns:p14="http://schemas.microsoft.com/office/powerpoint/2010/main" val="1118323160"/>
+      </p:ext>
+    </p:extLst>
+  </p:cSld>
+  <p:clrMapOvr>
+    <a:masterClrMapping/>
+  </p:clrMapOvr>
+  <p:transition spd="med"/>
+  <p:timing>
+    <p:tnLst>
+      <p:par>
+        <p:cTn id="1" dur="indefinite" restart="never" nodeType="tmRoot"/>
+      </p:par>
+    </p:tnLst>
+  </p:timing>
+</p:sld>
+</file>
+
+<file path=ppt/slides/slide10.xml><?xml version="1.0" encoding="utf-8"?>
+<p:sld xmlns:a="http://schemas.openxmlformats.org/drawingml/2006/main" xmlns:r="http://schemas.openxmlformats.org/officeDocument/2006/relationships" xmlns:p="http://schemas.openxmlformats.org/presentationml/2006/main">
+  <p:cSld>
+    <p:spTree>
+      <p:nvGrpSpPr>
+        <p:cNvPr id="1" name=""/>
+        <p:cNvGrpSpPr/>
+        <p:nvPr/>
+      </p:nvGrpSpPr>
+      <p:grpSpPr>
+        <a:xfrm>
+          <a:off x="0" y="0"/>
+          <a:ext cx="0" cy="0"/>
+          <a:chOff x="0" y="0"/>
+          <a:chExt cx="0" cy="0"/>
+        </a:xfrm>
+      </p:grpSpPr>
+      <p:sp>
+        <p:nvSpPr>
+          <p:cNvPr id="2" name="Titel 1"/>
+          <p:cNvSpPr>
+            <a:spLocks noGrp="1"/>
+          </p:cNvSpPr>
+          <p:nvPr>
+            <p:ph type="title"/>
+          </p:nvPr>
+        </p:nvSpPr>
+        <p:spPr/>
+        <p:txBody>
+          <a:bodyPr/>
+          <a:lstStyle/>
+          <a:p>
+            <a:r>
+              <a:rPr lang="de-DE" dirty="0" smtClean="0"/>
+              <a:t>Empfehlenswerte Literatur</a:t>
+            </a:r>
+            <a:endParaRPr lang="de-DE" sz="1800" dirty="0"/>
+          </a:p>
+        </p:txBody>
+      </p:sp>
+      <p:sp>
+        <p:nvSpPr>
+          <p:cNvPr id="3" name="Inhaltsplatzhalter 2"/>
+          <p:cNvSpPr>
+            <a:spLocks noGrp="1"/>
+          </p:cNvSpPr>
+          <p:nvPr>
+            <p:ph idx="1"/>
+          </p:nvPr>
+        </p:nvSpPr>
+        <p:spPr/>
+        <p:txBody>
+          <a:bodyPr/>
+          <a:lstStyle/>
+          <a:p>
+            <a:pPr marL="0" indent="0">
+              <a:buNone/>
+            </a:pPr>
+            <a:r>
+              <a:rPr lang="de-DE" sz="1600" b="1" dirty="0" smtClean="0"/>
+              <a:t>Sicherheitsaspekte virtueller Netzinfrastrukturen</a:t>
+            </a:r>
+          </a:p>
+          <a:p>
+            <a:r>
+              <a:rPr lang="de-DE" sz="1600" dirty="0"/>
+              <a:t>Kamal </a:t>
+            </a:r>
+            <a:r>
+              <a:rPr lang="de-DE" sz="1600" dirty="0" err="1"/>
+              <a:t>Dahbur</a:t>
+            </a:r>
+            <a:r>
+              <a:rPr lang="de-DE" sz="1600" dirty="0"/>
+              <a:t>, </a:t>
+            </a:r>
+            <a:r>
+              <a:rPr lang="de-DE" sz="1600" dirty="0" err="1"/>
+              <a:t>Bassil</a:t>
+            </a:r>
+            <a:r>
+              <a:rPr lang="de-DE" sz="1600" dirty="0"/>
+              <a:t> Mohammad und Ahmad Bisher </a:t>
+            </a:r>
+            <a:r>
+              <a:rPr lang="de-DE" sz="1600" dirty="0" err="1"/>
+              <a:t>Tarakji</a:t>
+            </a:r>
+            <a:r>
+              <a:rPr lang="de-DE" sz="1600" dirty="0"/>
+              <a:t>. A </a:t>
+            </a:r>
+            <a:r>
+              <a:rPr lang="de-DE" sz="1600" dirty="0" err="1"/>
+              <a:t>survey</a:t>
+            </a:r>
+            <a:r>
+              <a:rPr lang="de-DE" sz="1600" dirty="0"/>
+              <a:t> </a:t>
+            </a:r>
+            <a:r>
+              <a:rPr lang="de-DE" sz="1600" dirty="0" err="1"/>
+              <a:t>of</a:t>
+            </a:r>
+            <a:r>
+              <a:rPr lang="de-DE" sz="1600" dirty="0"/>
+              <a:t> </a:t>
+            </a:r>
+            <a:r>
+              <a:rPr lang="de-DE" sz="1600" dirty="0" err="1"/>
+              <a:t>risks</a:t>
+            </a:r>
+            <a:r>
+              <a:rPr lang="de-DE" sz="1600" dirty="0"/>
+              <a:t>, </a:t>
+            </a:r>
+            <a:r>
+              <a:rPr lang="en-US" sz="1600" dirty="0"/>
+              <a:t>threats and vulnerabilities in cloud computing. In </a:t>
+            </a:r>
+            <a:r>
+              <a:rPr lang="en-US" sz="1600" i="1" dirty="0"/>
+              <a:t>Proceedings of the 2011 International </a:t>
+            </a:r>
+            <a:r>
+              <a:rPr lang="de-DE" sz="1600" i="1" dirty="0" err="1"/>
+              <a:t>conference</a:t>
+            </a:r>
+            <a:r>
+              <a:rPr lang="de-DE" sz="1600" i="1" dirty="0"/>
+              <a:t> on intelligent </a:t>
+            </a:r>
+            <a:r>
+              <a:rPr lang="de-DE" sz="1600" i="1" dirty="0" err="1"/>
+              <a:t>semantic</a:t>
+            </a:r>
+            <a:r>
+              <a:rPr lang="de-DE" sz="1600" i="1" dirty="0"/>
+              <a:t> Web-services </a:t>
+            </a:r>
+            <a:r>
+              <a:rPr lang="de-DE" sz="1600" i="1" dirty="0" err="1"/>
+              <a:t>and</a:t>
+            </a:r>
+            <a:r>
+              <a:rPr lang="de-DE" sz="1600" i="1" dirty="0"/>
+              <a:t> </a:t>
+            </a:r>
+            <a:r>
+              <a:rPr lang="de-DE" sz="1600" i="1" dirty="0" err="1"/>
+              <a:t>applications</a:t>
+            </a:r>
+            <a:r>
+              <a:rPr lang="de-DE" sz="1600" dirty="0"/>
+              <a:t>, Seite 12. ACM, 2011.</a:t>
+            </a:r>
+          </a:p>
+          <a:p>
+            <a:r>
+              <a:rPr lang="de-DE" sz="1600" dirty="0" smtClean="0"/>
+              <a:t>Andreas </a:t>
+            </a:r>
+            <a:r>
+              <a:rPr lang="de-DE" sz="1600" dirty="0"/>
+              <a:t>Fischer, Juan Felipe Botero, Michael Till Beck, Hermann De Meer und </a:t>
+            </a:r>
+            <a:r>
+              <a:rPr lang="de-DE" sz="1600" dirty="0" smtClean="0"/>
+              <a:t>Xavier Hesselbach</a:t>
+            </a:r>
+            <a:r>
+              <a:rPr lang="de-DE" sz="1600" dirty="0"/>
+              <a:t>. Virtual </a:t>
+            </a:r>
+            <a:r>
+              <a:rPr lang="de-DE" sz="1600" dirty="0" err="1"/>
+              <a:t>network</a:t>
+            </a:r>
+            <a:r>
+              <a:rPr lang="de-DE" sz="1600" dirty="0"/>
+              <a:t> </a:t>
+            </a:r>
+            <a:r>
+              <a:rPr lang="de-DE" sz="1600" dirty="0" err="1"/>
+              <a:t>embedding</a:t>
+            </a:r>
+            <a:r>
+              <a:rPr lang="de-DE" sz="1600" dirty="0"/>
+              <a:t>: A </a:t>
+            </a:r>
+            <a:r>
+              <a:rPr lang="de-DE" sz="1600" dirty="0" err="1"/>
+              <a:t>survey</a:t>
+            </a:r>
+            <a:r>
+              <a:rPr lang="de-DE" sz="1600" dirty="0"/>
+              <a:t>. </a:t>
+            </a:r>
+            <a:r>
+              <a:rPr lang="de-DE" sz="1600" i="1" dirty="0"/>
+              <a:t>IEEE Communications Surveys </a:t>
+            </a:r>
+            <a:r>
+              <a:rPr lang="de-DE" sz="1600" i="1" dirty="0" smtClean="0"/>
+              <a:t>&amp; Tutorials</a:t>
+            </a:r>
+            <a:r>
+              <a:rPr lang="de-DE" sz="1600" dirty="0"/>
+              <a:t>, 15(4):1888–1906, 2013</a:t>
+            </a:r>
+            <a:r>
+              <a:rPr lang="de-DE" sz="1600" dirty="0" smtClean="0"/>
+              <a:t>.</a:t>
+            </a:r>
+            <a:endParaRPr lang="de-DE" sz="1600" dirty="0"/>
+          </a:p>
+          <a:p>
+            <a:r>
+              <a:rPr lang="de-DE" sz="1600" dirty="0" err="1" smtClean="0"/>
+              <a:t>Shuiqing</a:t>
+            </a:r>
+            <a:r>
+              <a:rPr lang="de-DE" sz="1600" dirty="0" smtClean="0"/>
+              <a:t> </a:t>
+            </a:r>
+            <a:r>
+              <a:rPr lang="de-DE" sz="1600" dirty="0"/>
+              <a:t>Gong, </a:t>
+            </a:r>
+            <a:r>
+              <a:rPr lang="de-DE" sz="1600" dirty="0" err="1"/>
+              <a:t>Jing</a:t>
+            </a:r>
+            <a:r>
+              <a:rPr lang="de-DE" sz="1600" dirty="0"/>
+              <a:t> Chen, </a:t>
+            </a:r>
+            <a:r>
+              <a:rPr lang="de-DE" sz="1600" dirty="0" err="1"/>
+              <a:t>Conghui</a:t>
+            </a:r>
+            <a:r>
+              <a:rPr lang="de-DE" sz="1600" dirty="0"/>
+              <a:t> Huang, </a:t>
+            </a:r>
+            <a:r>
+              <a:rPr lang="de-DE" sz="1600" dirty="0" err="1"/>
+              <a:t>Qingchao</a:t>
+            </a:r>
+            <a:r>
+              <a:rPr lang="de-DE" sz="1600" dirty="0"/>
+              <a:t> Zhu und </a:t>
+            </a:r>
+            <a:r>
+              <a:rPr lang="de-DE" sz="1600" dirty="0" err="1"/>
+              <a:t>Siyi</a:t>
+            </a:r>
+            <a:r>
+              <a:rPr lang="de-DE" sz="1600" dirty="0"/>
+              <a:t> Zhao. Virtual </a:t>
+            </a:r>
+            <a:r>
+              <a:rPr lang="en-US" sz="1600" dirty="0"/>
+              <a:t>Network Embedding through Security Risk Awareness and Optimization. </a:t>
+            </a:r>
+            <a:r>
+              <a:rPr lang="en-US" sz="1600" i="1" dirty="0"/>
+              <a:t>KSII Transactions </a:t>
+            </a:r>
+            <a:r>
+              <a:rPr lang="de-DE" sz="1600" i="1" dirty="0"/>
+              <a:t>on Internet &amp; Information Systems</a:t>
+            </a:r>
+            <a:r>
+              <a:rPr lang="de-DE" sz="1600" dirty="0"/>
+              <a:t>, 10(7), 2016.</a:t>
+            </a:r>
+            <a:endParaRPr lang="de-DE" sz="1600" dirty="0" smtClean="0"/>
+          </a:p>
+          <a:p>
+            <a:endParaRPr lang="de-DE" sz="1600" dirty="0" smtClean="0"/>
+          </a:p>
+          <a:p>
+            <a:pPr marL="0" indent="0">
+              <a:buNone/>
+            </a:pPr>
+            <a:r>
+              <a:rPr lang="de-DE" sz="1600" b="1" dirty="0" smtClean="0"/>
+              <a:t>Untersuchte Algorithmen</a:t>
+            </a:r>
+            <a:endParaRPr lang="de-DE" sz="1600" b="1" dirty="0" smtClean="0"/>
+          </a:p>
+          <a:p>
+            <a:r>
+              <a:rPr lang="de-DE" sz="1600" dirty="0" smtClean="0"/>
+              <a:t>Hong </a:t>
+            </a:r>
+            <a:r>
+              <a:rPr lang="de-DE" sz="1600" dirty="0" err="1"/>
+              <a:t>Xu</a:t>
+            </a:r>
+            <a:r>
+              <a:rPr lang="de-DE" sz="1600" dirty="0"/>
+              <a:t> Ming </a:t>
+            </a:r>
+            <a:r>
+              <a:rPr lang="de-DE" sz="1600" dirty="0" err="1"/>
+              <a:t>Xu</a:t>
+            </a:r>
+            <a:r>
+              <a:rPr lang="de-DE" sz="1600" dirty="0"/>
+              <a:t> </a:t>
+            </a:r>
+            <a:r>
+              <a:rPr lang="de-DE" sz="1600" dirty="0" err="1"/>
+              <a:t>Shuhao</a:t>
+            </a:r>
+            <a:r>
+              <a:rPr lang="de-DE" sz="1600" dirty="0"/>
+              <a:t> Liu, </a:t>
+            </a:r>
+            <a:r>
+              <a:rPr lang="de-DE" sz="1600" dirty="0" err="1"/>
+              <a:t>Zhiping</a:t>
+            </a:r>
+            <a:r>
+              <a:rPr lang="de-DE" sz="1600" dirty="0"/>
+              <a:t> Cai. </a:t>
+            </a:r>
+            <a:r>
+              <a:rPr lang="de-DE" sz="1600" dirty="0" err="1"/>
+              <a:t>Towards</a:t>
+            </a:r>
+            <a:r>
+              <a:rPr lang="de-DE" sz="1600" dirty="0"/>
+              <a:t> Security-aware Virtual </a:t>
+            </a:r>
+            <a:r>
+              <a:rPr lang="de-DE" sz="1600" dirty="0" smtClean="0"/>
+              <a:t>Network Embedding</a:t>
+            </a:r>
+            <a:r>
+              <a:rPr lang="de-DE" sz="1600" dirty="0"/>
+              <a:t>, 2015</a:t>
+            </a:r>
+            <a:r>
+              <a:rPr lang="de-DE" sz="1600" dirty="0" smtClean="0"/>
+              <a:t>.</a:t>
+            </a:r>
+          </a:p>
+          <a:p>
+            <a:r>
+              <a:rPr lang="en-US" sz="1600" dirty="0" smtClean="0"/>
+              <a:t>Yang </a:t>
+            </a:r>
+            <a:r>
+              <a:rPr lang="en-US" sz="1600" dirty="0"/>
+              <a:t>Wang, </a:t>
+            </a:r>
+            <a:r>
+              <a:rPr lang="en-US" sz="1600" dirty="0" err="1"/>
+              <a:t>Phanvu</a:t>
+            </a:r>
+            <a:r>
+              <a:rPr lang="en-US" sz="1600" dirty="0"/>
+              <a:t> Chau und </a:t>
+            </a:r>
+            <a:r>
+              <a:rPr lang="en-US" sz="1600" dirty="0" err="1"/>
+              <a:t>Fuyu</a:t>
+            </a:r>
+            <a:r>
+              <a:rPr lang="en-US" sz="1600" dirty="0"/>
+              <a:t> Chen. Towards a secured network </a:t>
+            </a:r>
+            <a:r>
+              <a:rPr lang="en-US" sz="1600" dirty="0" smtClean="0"/>
+              <a:t>virtualization. </a:t>
+            </a:r>
+            <a:r>
+              <a:rPr lang="de-DE" sz="1600" i="1" dirty="0" smtClean="0"/>
+              <a:t>Computer </a:t>
+            </a:r>
+            <a:r>
+              <a:rPr lang="de-DE" sz="1600" i="1" dirty="0"/>
+              <a:t>Networks</a:t>
+            </a:r>
+            <a:r>
+              <a:rPr lang="de-DE" sz="1600" dirty="0"/>
+              <a:t>, 104:55–65, 2016.</a:t>
+            </a:r>
+            <a:endParaRPr lang="de-DE" sz="1600" dirty="0" smtClean="0"/>
+          </a:p>
+          <a:p>
+            <a:endParaRPr lang="de-DE" sz="1600" dirty="0"/>
+          </a:p>
+        </p:txBody>
+      </p:sp>
+      <p:sp>
+        <p:nvSpPr>
+          <p:cNvPr id="4" name="Foliennummernplatzhalter 3"/>
+          <p:cNvSpPr>
+            <a:spLocks noGrp="1"/>
+          </p:cNvSpPr>
+          <p:nvPr>
+            <p:ph type="sldNum" sz="quarter" idx="4"/>
+          </p:nvPr>
+        </p:nvSpPr>
+        <p:spPr/>
+        <p:txBody>
+          <a:bodyPr/>
+          <a:lstStyle/>
+          <a:p>
+            <a:pPr>
+              <a:defRPr/>
+            </a:pPr>
+            <a:fld id="{70BFFA52-4234-45F6-B1A6-074E24FF43A2}" type="slidenum">
+              <a:rPr lang="de-DE" smtClean="0"/>
+              <a:pPr>
+                <a:defRPr/>
+              </a:pPr>
+              <a:t>10</a:t>
+            </a:fld>
+            <a:endParaRPr lang="de-DE" dirty="0"/>
+          </a:p>
+        </p:txBody>
+      </p:sp>
+      <p:sp>
+        <p:nvSpPr>
+          <p:cNvPr id="5" name="Fußzeilenplatzhalter 4"/>
+          <p:cNvSpPr>
+            <a:spLocks noGrp="1"/>
+          </p:cNvSpPr>
+          <p:nvPr>
+            <p:ph type="ftr" sz="quarter" idx="3"/>
+          </p:nvPr>
+        </p:nvSpPr>
+        <p:spPr/>
+        <p:txBody>
+          <a:bodyPr/>
+          <a:lstStyle/>
+          <a:p>
+            <a:r>
+              <a:rPr lang="de-DE" smtClean="0"/>
+              <a:t>Sicherheitsaspekte beim Deployment virtueller Netzinfrastrukturen</a:t>
+            </a:r>
+            <a:endParaRPr lang="de-DE" dirty="0"/>
+          </a:p>
+        </p:txBody>
+      </p:sp>
+    </p:spTree>
+    <p:extLst>
+      <p:ext uri="{BB962C8B-B14F-4D97-AF65-F5344CB8AC3E}">
+        <p14:creationId xmlns:p14="http://schemas.microsoft.com/office/powerpoint/2010/main" val="2073930859"/>
+      </p:ext>
+    </p:extLst>
+  </p:cSld>
+  <p:clrMapOvr>
+    <a:masterClrMapping/>
+  </p:clrMapOvr>
+  <p:transition spd="med"/>
+  <p:timing>
+    <p:tnLst>
+      <p:par>
+        <p:cTn id="1" dur="indefinite" restart="never" nodeType="tmRoot"/>
+      </p:par>
+    </p:tnLst>
+  </p:timing>
+</p:sld>
+</file>
+
+<file path=ppt/slides/slide11.xml><?xml version="1.0" encoding="utf-8"?>
+<p:sld xmlns:a="http://schemas.openxmlformats.org/drawingml/2006/main" xmlns:r="http://schemas.openxmlformats.org/officeDocument/2006/relationships" xmlns:p="http://schemas.openxmlformats.org/presentationml/2006/main">
+  <p:cSld>
+    <p:spTree>
+      <p:nvGrpSpPr>
+        <p:cNvPr id="1" name=""/>
+        <p:cNvGrpSpPr/>
+        <p:nvPr/>
+      </p:nvGrpSpPr>
+      <p:grpSpPr>
+        <a:xfrm>
+          <a:off x="0" y="0"/>
+          <a:ext cx="0" cy="0"/>
+          <a:chOff x="0" y="0"/>
+          <a:chExt cx="0" cy="0"/>
+        </a:xfrm>
+      </p:grpSpPr>
+      <p:sp>
+        <p:nvSpPr>
+          <p:cNvPr id="2" name="Titel 1"/>
+          <p:cNvSpPr>
+            <a:spLocks noGrp="1"/>
+          </p:cNvSpPr>
+          <p:nvPr>
+            <p:ph type="title"/>
+          </p:nvPr>
+        </p:nvSpPr>
+        <p:spPr/>
+        <p:txBody>
+          <a:bodyPr/>
+          <a:lstStyle/>
+          <a:p>
+            <a:r>
+              <a:rPr lang="de-DE" dirty="0" smtClean="0"/>
+              <a:t>Diskussion</a:t>
+            </a:r>
+            <a:endParaRPr lang="de-DE" sz="1800" dirty="0"/>
+          </a:p>
+        </p:txBody>
+      </p:sp>
+      <p:sp>
+        <p:nvSpPr>
+          <p:cNvPr id="3" name="Inhaltsplatzhalter 2"/>
+          <p:cNvSpPr>
+            <a:spLocks noGrp="1"/>
+          </p:cNvSpPr>
+          <p:nvPr>
+            <p:ph idx="1"/>
+          </p:nvPr>
+        </p:nvSpPr>
+        <p:spPr/>
+        <p:txBody>
+          <a:bodyPr/>
+          <a:lstStyle/>
+          <a:p>
+            <a:endParaRPr lang="de-DE" dirty="0"/>
+          </a:p>
+        </p:txBody>
+      </p:sp>
+      <p:sp>
+        <p:nvSpPr>
+          <p:cNvPr id="4" name="Foliennummernplatzhalter 3"/>
+          <p:cNvSpPr>
+            <a:spLocks noGrp="1"/>
+          </p:cNvSpPr>
+          <p:nvPr>
+            <p:ph type="sldNum" sz="quarter" idx="4"/>
+          </p:nvPr>
+        </p:nvSpPr>
+        <p:spPr/>
+        <p:txBody>
+          <a:bodyPr/>
+          <a:lstStyle/>
+          <a:p>
+            <a:pPr>
+              <a:defRPr/>
+            </a:pPr>
+            <a:fld id="{70BFFA52-4234-45F6-B1A6-074E24FF43A2}" type="slidenum">
+              <a:rPr lang="de-DE" smtClean="0"/>
+              <a:pPr>
+                <a:defRPr/>
+              </a:pPr>
+              <a:t>11</a:t>
+            </a:fld>
+            <a:endParaRPr lang="de-DE" dirty="0"/>
+          </a:p>
+        </p:txBody>
+      </p:sp>
+      <p:sp>
+        <p:nvSpPr>
+          <p:cNvPr id="5" name="Fußzeilenplatzhalter 4"/>
+          <p:cNvSpPr>
+            <a:spLocks noGrp="1"/>
+          </p:cNvSpPr>
+          <p:nvPr>
+            <p:ph type="ftr" sz="quarter" idx="3"/>
+          </p:nvPr>
+        </p:nvSpPr>
+        <p:spPr/>
+        <p:txBody>
+          <a:bodyPr/>
+          <a:lstStyle/>
+          <a:p>
+            <a:r>
+              <a:rPr lang="de-DE" smtClean="0"/>
+              <a:t>Sicherheitsaspekte beim Deployment virtueller Netzinfrastrukturen</a:t>
+            </a:r>
+            <a:endParaRPr lang="de-DE" dirty="0"/>
+          </a:p>
+        </p:txBody>
+      </p:sp>
+    </p:spTree>
+    <p:extLst>
+      <p:ext uri="{BB962C8B-B14F-4D97-AF65-F5344CB8AC3E}">
+        <p14:creationId xmlns:p14="http://schemas.microsoft.com/office/powerpoint/2010/main" val="476771543"/>
       </p:ext>
     </p:extLst>
   </p:cSld>
@@ -5289,12 +6192,12 @@
       </p:grpSpPr>
       <p:sp>
         <p:nvSpPr>
-          <p:cNvPr id="2" name="Titel 1"/>
+          <p:cNvPr id="10" name="Untertitel 9"/>
           <p:cNvSpPr>
             <a:spLocks noGrp="1"/>
           </p:cNvSpPr>
           <p:nvPr>
-            <p:ph type="title"/>
+            <p:ph type="subTitle" idx="1"/>
           </p:nvPr>
         </p:nvSpPr>
         <p:spPr/>
@@ -5302,22 +6205,76 @@
           <a:bodyPr/>
           <a:lstStyle/>
           <a:p>
-            <a:r>
-              <a:rPr lang="de-DE" dirty="0" smtClean="0"/>
-              <a:t>Motivation</a:t>
-            </a:r>
-            <a:endParaRPr lang="de-DE" dirty="0"/>
-          </a:p>
-        </p:txBody>
-      </p:sp>
-      <p:sp>
-        <p:nvSpPr>
-          <p:cNvPr id="3" name="Inhaltsplatzhalter 2"/>
+            <a:pPr>
+              <a:buNone/>
+            </a:pPr>
+            <a:r>
+              <a:rPr lang="de-DE" dirty="0" smtClean="0"/>
+              <a:t>Abschlusspräsentation im Bachelorseminar</a:t>
+            </a:r>
+          </a:p>
+          <a:p>
+            <a:pPr>
+              <a:buNone/>
+            </a:pPr>
+            <a:r>
+              <a:rPr lang="de-DE" dirty="0"/>
+              <a:t>„Trends in Mobilen und Verteilten </a:t>
+            </a:r>
+            <a:r>
+              <a:rPr lang="de-DE" dirty="0" smtClean="0"/>
+              <a:t>Systemen</a:t>
+            </a:r>
+            <a:r>
+              <a:rPr lang="de-DE" dirty="0" smtClean="0"/>
+              <a:t>“</a:t>
+            </a:r>
+            <a:br>
+              <a:rPr lang="de-DE" dirty="0" smtClean="0"/>
+            </a:br>
+            <a:endParaRPr lang="de-DE" dirty="0" smtClean="0"/>
+          </a:p>
+          <a:p>
+            <a:pPr>
+              <a:buNone/>
+            </a:pPr>
+            <a:r>
+              <a:rPr lang="de-DE" sz="1400" dirty="0" smtClean="0"/>
+              <a:t>München, </a:t>
+            </a:r>
+            <a:r>
+              <a:rPr lang="de-DE" sz="1400" dirty="0" err="1" smtClean="0"/>
+              <a:t>Oettingenstr</a:t>
+            </a:r>
+            <a:r>
+              <a:rPr lang="de-DE" sz="1400" dirty="0"/>
+              <a:t>. 67, Raum </a:t>
+            </a:r>
+            <a:r>
+              <a:rPr lang="de-DE" sz="1400" dirty="0" smtClean="0"/>
+              <a:t>027</a:t>
+            </a:r>
+          </a:p>
+          <a:p>
+            <a:pPr>
+              <a:buNone/>
+            </a:pPr>
+            <a:r>
+              <a:rPr lang="de-DE" sz="1400" dirty="0" smtClean="0"/>
+              <a:t>16. Februar 2017</a:t>
+            </a:r>
+            <a:endParaRPr lang="de-DE" sz="1400" dirty="0"/>
+          </a:p>
+        </p:txBody>
+      </p:sp>
+      <p:sp>
+        <p:nvSpPr>
+          <p:cNvPr id="9" name="Titel 8"/>
           <p:cNvSpPr>
             <a:spLocks noGrp="1"/>
           </p:cNvSpPr>
           <p:nvPr>
-            <p:ph idx="1"/>
+            <p:ph type="ctrTitle"/>
           </p:nvPr>
         </p:nvSpPr>
         <p:spPr/>
@@ -5325,18 +6282,37 @@
           <a:bodyPr/>
           <a:lstStyle/>
           <a:p>
+            <a:r>
+              <a:rPr lang="de-DE" dirty="0"/>
+              <a:t>Sicherheitsaspekte beim </a:t>
+            </a:r>
+            <a:r>
+              <a:rPr lang="de-DE" dirty="0" err="1"/>
+              <a:t>Deployment</a:t>
+            </a:r>
+            <a:r>
+              <a:rPr lang="de-DE" dirty="0"/>
+              <a:t> virtueller</a:t>
+            </a:r>
+            <a:br>
+              <a:rPr lang="de-DE" dirty="0"/>
+            </a:br>
+            <a:r>
+              <a:rPr lang="de-DE" dirty="0" smtClean="0"/>
+              <a:t>Netzinfrastrukturen</a:t>
+            </a:r>
             <a:endParaRPr lang="de-DE" dirty="0"/>
           </a:p>
         </p:txBody>
       </p:sp>
       <p:sp>
         <p:nvSpPr>
-          <p:cNvPr id="4" name="Foliennummernplatzhalter 3"/>
+          <p:cNvPr id="11" name="Textplatzhalter 10"/>
           <p:cNvSpPr>
             <a:spLocks noGrp="1"/>
           </p:cNvSpPr>
           <p:nvPr>
-            <p:ph type="sldNum" sz="quarter" idx="4"/>
+            <p:ph type="body" sz="quarter" idx="10"/>
           </p:nvPr>
         </p:nvSpPr>
         <p:spPr/>
@@ -5344,46 +6320,17 @@
           <a:bodyPr/>
           <a:lstStyle/>
           <a:p>
-            <a:pPr>
-              <a:defRPr/>
-            </a:pPr>
-            <a:fld id="{70BFFA52-4234-45F6-B1A6-074E24FF43A2}" type="slidenum">
-              <a:rPr lang="de-DE" smtClean="0"/>
-              <a:pPr>
-                <a:defRPr/>
-              </a:pPr>
-              <a:t>2</a:t>
-            </a:fld>
-            <a:endParaRPr lang="de-DE" dirty="0"/>
-          </a:p>
-        </p:txBody>
-      </p:sp>
-      <p:sp>
-        <p:nvSpPr>
-          <p:cNvPr id="5" name="Fußzeilenplatzhalter 4"/>
-          <p:cNvSpPr>
-            <a:spLocks noGrp="1"/>
-          </p:cNvSpPr>
-          <p:nvPr>
-            <p:ph type="ftr" sz="quarter" idx="3"/>
-          </p:nvPr>
-        </p:nvSpPr>
-        <p:spPr/>
-        <p:txBody>
-          <a:bodyPr/>
-          <a:lstStyle/>
-          <a:p>
-            <a:r>
-              <a:rPr lang="de-DE" dirty="0" smtClean="0"/>
-              <a:t>Sicherheitsaspekte beim </a:t>
+            <a:r>
+              <a:rPr lang="de-DE" dirty="0" smtClean="0"/>
+              <a:t>Gerhard </a:t>
             </a:r>
             <a:r>
               <a:rPr lang="de-DE" dirty="0" err="1" smtClean="0"/>
-              <a:t>Deployment</a:t>
-            </a:r>
-            <a:r>
-              <a:rPr lang="de-DE" dirty="0" smtClean="0"/>
-              <a:t> virtueller Netzinfrastrukturen</a:t>
+              <a:t>Gröschl</a:t>
+            </a:r>
+            <a:r>
+              <a:rPr lang="de-DE" dirty="0" smtClean="0"/>
+              <a:t>, Miran Mizani</a:t>
             </a:r>
             <a:endParaRPr lang="de-DE" dirty="0"/>
           </a:p>
@@ -5392,7 +6339,7 @@
     </p:spTree>
     <p:extLst>
       <p:ext uri="{BB962C8B-B14F-4D97-AF65-F5344CB8AC3E}">
-        <p14:creationId xmlns:p14="http://schemas.microsoft.com/office/powerpoint/2010/main" val="3273344848"/>
+        <p14:creationId xmlns:p14="http://schemas.microsoft.com/office/powerpoint/2010/main" val="2931754677"/>
       </p:ext>
     </p:extLst>
   </p:cSld>
@@ -5444,7 +6391,7 @@
           <a:p>
             <a:r>
               <a:rPr lang="de-DE" dirty="0" smtClean="0"/>
-              <a:t>Virtual Network Embedding</a:t>
+              <a:t>Motivation</a:t>
             </a:r>
             <a:endParaRPr lang="de-DE" dirty="0"/>
           </a:p>
@@ -5465,7 +6412,7 @@
           <a:bodyPr/>
           <a:lstStyle/>
           <a:p>
-            <a:endParaRPr lang="de-DE"/>
+            <a:endParaRPr lang="de-DE" dirty="0"/>
           </a:p>
         </p:txBody>
       </p:sp>
@@ -5514,8 +6461,16 @@
           <a:lstStyle/>
           <a:p>
             <a:r>
-              <a:rPr lang="de-DE" smtClean="0"/>
-              <a:t>Sicherheitsaspekte beim Deployment virtueller Netzinfrastrukturen</a:t>
+              <a:rPr lang="de-DE" dirty="0" smtClean="0"/>
+              <a:t>Sicherheitsaspekte beim </a:t>
+            </a:r>
+            <a:r>
+              <a:rPr lang="de-DE" dirty="0" err="1" smtClean="0"/>
+              <a:t>Deployment</a:t>
+            </a:r>
+            <a:r>
+              <a:rPr lang="de-DE" dirty="0" smtClean="0"/>
+              <a:t> virtueller Netzinfrastrukturen</a:t>
             </a:r>
             <a:endParaRPr lang="de-DE" dirty="0"/>
           </a:p>
@@ -5524,7 +6479,7 @@
     </p:spTree>
     <p:extLst>
       <p:ext uri="{BB962C8B-B14F-4D97-AF65-F5344CB8AC3E}">
-        <p14:creationId xmlns:p14="http://schemas.microsoft.com/office/powerpoint/2010/main" val="145312068"/>
+        <p14:creationId xmlns:p14="http://schemas.microsoft.com/office/powerpoint/2010/main" val="3273344848"/>
       </p:ext>
     </p:extLst>
   </p:cSld>
@@ -5576,7 +6531,7 @@
           <a:p>
             <a:r>
               <a:rPr lang="de-DE" dirty="0" smtClean="0"/>
-              <a:t>Klassifizierung von Sicherheitsrisiken</a:t>
+              <a:t>Virtual Network Embedding</a:t>
             </a:r>
             <a:endParaRPr lang="de-DE" dirty="0"/>
           </a:p>
@@ -5656,7 +6611,7 @@
     </p:spTree>
     <p:extLst>
       <p:ext uri="{BB962C8B-B14F-4D97-AF65-F5344CB8AC3E}">
-        <p14:creationId xmlns:p14="http://schemas.microsoft.com/office/powerpoint/2010/main" val="664013948"/>
+        <p14:creationId xmlns:p14="http://schemas.microsoft.com/office/powerpoint/2010/main" val="145312068"/>
       </p:ext>
     </p:extLst>
   </p:cSld>
@@ -5708,42 +6663,41 @@
           <a:p>
             <a:r>
               <a:rPr lang="de-DE" dirty="0" smtClean="0"/>
-              <a:t>SVNE-Algorithmen:</a:t>
-            </a:r>
-            <a:br>
-              <a:rPr lang="de-DE" dirty="0" smtClean="0"/>
-            </a:br>
-            <a:r>
-              <a:rPr lang="de-DE" sz="1800" b="0" dirty="0"/>
-              <a:t>Strikte Trennung und </a:t>
-            </a:r>
-            <a:r>
-              <a:rPr lang="de-DE" sz="1800" b="0" dirty="0" err="1"/>
-              <a:t>Preprocessing</a:t>
-            </a:r>
-            <a:endParaRPr lang="de-DE" sz="1800" dirty="0"/>
-          </a:p>
-        </p:txBody>
-      </p:sp>
-      <p:sp>
-        <p:nvSpPr>
-          <p:cNvPr id="3" name="Inhaltsplatzhalter 2"/>
-          <p:cNvSpPr>
-            <a:spLocks noGrp="1"/>
-          </p:cNvSpPr>
+              <a:t>Klassifizierung von Sicherheitsrisiken</a:t>
+            </a:r>
+            <a:endParaRPr lang="de-DE" dirty="0"/>
+          </a:p>
+        </p:txBody>
+      </p:sp>
+      <p:pic>
+        <p:nvPicPr>
+          <p:cNvPr id="6" name="Inhaltsplatzhalter 5"/>
+          <p:cNvPicPr>
+            <a:picLocks noGrp="1" noChangeAspect="1"/>
+          </p:cNvPicPr>
           <p:nvPr>
             <p:ph idx="1"/>
           </p:nvPr>
-        </p:nvSpPr>
-        <p:spPr/>
-        <p:txBody>
-          <a:bodyPr/>
-          <a:lstStyle/>
-          <a:p>
-            <a:endParaRPr lang="de-DE"/>
-          </a:p>
-        </p:txBody>
-      </p:sp>
+        </p:nvPicPr>
+        <p:blipFill>
+          <a:blip r:embed="rId3" cstate="print">
+            <a:extLst>
+              <a:ext uri="{28A0092B-C50C-407E-A947-70E740481C1C}">
+                <a14:useLocalDpi xmlns:a14="http://schemas.microsoft.com/office/drawing/2010/main" val="0"/>
+              </a:ext>
+            </a:extLst>
+          </a:blip>
+          <a:stretch>
+            <a:fillRect/>
+          </a:stretch>
+        </p:blipFill>
+        <p:spPr>
+          <a:xfrm>
+            <a:off x="920974" y="1347788"/>
+            <a:ext cx="7278239" cy="4900612"/>
+          </a:xfrm>
+        </p:spPr>
+      </p:pic>
       <p:sp>
         <p:nvSpPr>
           <p:cNvPr id="4" name="Foliennummernplatzhalter 3"/>
@@ -5796,10 +6750,41 @@
           </a:p>
         </p:txBody>
       </p:sp>
+      <p:sp>
+        <p:nvSpPr>
+          <p:cNvPr id="7" name="Textfeld 6"/>
+          <p:cNvSpPr txBox="1"/>
+          <p:nvPr/>
+        </p:nvSpPr>
+        <p:spPr>
+          <a:xfrm>
+            <a:off x="1031567" y="6182580"/>
+            <a:ext cx="7057060" cy="276999"/>
+          </a:xfrm>
+          <a:prstGeom prst="rect">
+            <a:avLst/>
+          </a:prstGeom>
+          <a:noFill/>
+        </p:spPr>
+        <p:txBody>
+          <a:bodyPr wrap="none" rtlCol="0">
+            <a:spAutoFit/>
+          </a:bodyPr>
+          <a:lstStyle/>
+          <a:p>
+            <a:pPr algn="ctr"/>
+            <a:r>
+              <a:rPr lang="de-DE" dirty="0" smtClean="0"/>
+              <a:t>Die Substratnetze zweier Infrastructure Provider hosten zwei virtuelle Netze eines Service Providers.</a:t>
+            </a:r>
+            <a:endParaRPr lang="de-DE" dirty="0"/>
+          </a:p>
+        </p:txBody>
+      </p:sp>
     </p:spTree>
     <p:extLst>
       <p:ext uri="{BB962C8B-B14F-4D97-AF65-F5344CB8AC3E}">
-        <p14:creationId xmlns:p14="http://schemas.microsoft.com/office/powerpoint/2010/main" val="3408010396"/>
+        <p14:creationId xmlns:p14="http://schemas.microsoft.com/office/powerpoint/2010/main" val="664013948"/>
       </p:ext>
     </p:extLst>
   </p:cSld>
@@ -5851,35 +6836,9 @@
           <a:p>
             <a:r>
               <a:rPr lang="de-DE" dirty="0" smtClean="0"/>
-              <a:t>SVNE-Algorithmen:</a:t>
-            </a:r>
-            <a:br>
-              <a:rPr lang="de-DE" dirty="0" smtClean="0"/>
-            </a:br>
-            <a:r>
-              <a:rPr lang="de-DE" sz="1800" b="0" dirty="0"/>
-              <a:t>Sicherheitsvektoren und doppelte Berechnung</a:t>
-            </a:r>
-            <a:endParaRPr lang="de-DE" sz="1800" dirty="0"/>
-          </a:p>
-        </p:txBody>
-      </p:sp>
-      <p:sp>
-        <p:nvSpPr>
-          <p:cNvPr id="3" name="Inhaltsplatzhalter 2"/>
-          <p:cNvSpPr>
-            <a:spLocks noGrp="1"/>
-          </p:cNvSpPr>
-          <p:nvPr>
-            <p:ph idx="1"/>
-          </p:nvPr>
-        </p:nvSpPr>
-        <p:spPr/>
-        <p:txBody>
-          <a:bodyPr/>
-          <a:lstStyle/>
-          <a:p>
-            <a:endParaRPr lang="de-DE"/>
+              <a:t>Klassifizierung von Sicherheitsrisiken</a:t>
+            </a:r>
+            <a:endParaRPr lang="de-DE" dirty="0"/>
           </a:p>
         </p:txBody>
       </p:sp>
@@ -5932,6 +6891,1059 @@
               <a:t>Sicherheitsaspekte beim Deployment virtueller Netzinfrastrukturen</a:t>
             </a:r>
             <a:endParaRPr lang="de-DE" dirty="0"/>
+          </a:p>
+        </p:txBody>
+      </p:sp>
+      <p:sp>
+        <p:nvSpPr>
+          <p:cNvPr id="7" name="Textfeld 6"/>
+          <p:cNvSpPr txBox="1"/>
+          <p:nvPr/>
+        </p:nvSpPr>
+        <p:spPr>
+          <a:xfrm>
+            <a:off x="1031567" y="6182580"/>
+            <a:ext cx="7057060" cy="276999"/>
+          </a:xfrm>
+          <a:prstGeom prst="rect">
+            <a:avLst/>
+          </a:prstGeom>
+          <a:noFill/>
+        </p:spPr>
+        <p:txBody>
+          <a:bodyPr wrap="none" rtlCol="0">
+            <a:spAutoFit/>
+          </a:bodyPr>
+          <a:lstStyle/>
+          <a:p>
+            <a:pPr algn="ctr"/>
+            <a:r>
+              <a:rPr lang="de-DE" dirty="0" smtClean="0"/>
+              <a:t>Die Substratnetze zweier Infrastructure Provider hosten zwei virtuelle Netze eines Service Providers.</a:t>
+            </a:r>
+            <a:endParaRPr lang="de-DE" dirty="0"/>
+          </a:p>
+        </p:txBody>
+      </p:sp>
+      <p:pic>
+        <p:nvPicPr>
+          <p:cNvPr id="8" name="Grafik 7"/>
+          <p:cNvPicPr>
+            <a:picLocks noChangeAspect="1"/>
+          </p:cNvPicPr>
+          <p:nvPr/>
+        </p:nvPicPr>
+        <p:blipFill>
+          <a:blip r:embed="rId3"/>
+          <a:stretch>
+            <a:fillRect/>
+          </a:stretch>
+        </p:blipFill>
+        <p:spPr>
+          <a:xfrm>
+            <a:off x="858233" y="1285880"/>
+            <a:ext cx="7403727" cy="4896700"/>
+          </a:xfrm>
+          <a:prstGeom prst="rect">
+            <a:avLst/>
+          </a:prstGeom>
+        </p:spPr>
+      </p:pic>
+    </p:spTree>
+    <p:extLst>
+      <p:ext uri="{BB962C8B-B14F-4D97-AF65-F5344CB8AC3E}">
+        <p14:creationId xmlns:p14="http://schemas.microsoft.com/office/powerpoint/2010/main" val="895626734"/>
+      </p:ext>
+    </p:extLst>
+  </p:cSld>
+  <p:clrMapOvr>
+    <a:masterClrMapping/>
+  </p:clrMapOvr>
+  <p:transition spd="med"/>
+  <p:timing>
+    <p:tnLst>
+      <p:par>
+        <p:cTn id="1" dur="indefinite" restart="never" nodeType="tmRoot"/>
+      </p:par>
+    </p:tnLst>
+  </p:timing>
+</p:sld>
+</file>
+
+<file path=ppt/slides/slide7.xml><?xml version="1.0" encoding="utf-8"?>
+<p:sld xmlns:a="http://schemas.openxmlformats.org/drawingml/2006/main" xmlns:r="http://schemas.openxmlformats.org/officeDocument/2006/relationships" xmlns:p="http://schemas.openxmlformats.org/presentationml/2006/main">
+  <p:cSld>
+    <p:spTree>
+      <p:nvGrpSpPr>
+        <p:cNvPr id="1" name=""/>
+        <p:cNvGrpSpPr/>
+        <p:nvPr/>
+      </p:nvGrpSpPr>
+      <p:grpSpPr>
+        <a:xfrm>
+          <a:off x="0" y="0"/>
+          <a:ext cx="0" cy="0"/>
+          <a:chOff x="0" y="0"/>
+          <a:chExt cx="0" cy="0"/>
+        </a:xfrm>
+      </p:grpSpPr>
+      <p:sp>
+        <p:nvSpPr>
+          <p:cNvPr id="2" name="Titel 1"/>
+          <p:cNvSpPr>
+            <a:spLocks noGrp="1"/>
+          </p:cNvSpPr>
+          <p:nvPr>
+            <p:ph type="title"/>
+          </p:nvPr>
+        </p:nvSpPr>
+        <p:spPr/>
+        <p:txBody>
+          <a:bodyPr/>
+          <a:lstStyle/>
+          <a:p>
+            <a:r>
+              <a:rPr lang="de-DE" dirty="0" smtClean="0"/>
+              <a:t>Klassifizierung von Sicherheitsrisiken</a:t>
+            </a:r>
+            <a:endParaRPr lang="de-DE" dirty="0"/>
+          </a:p>
+        </p:txBody>
+      </p:sp>
+      <p:sp>
+        <p:nvSpPr>
+          <p:cNvPr id="4" name="Foliennummernplatzhalter 3"/>
+          <p:cNvSpPr>
+            <a:spLocks noGrp="1"/>
+          </p:cNvSpPr>
+          <p:nvPr>
+            <p:ph type="sldNum" sz="quarter" idx="4"/>
+          </p:nvPr>
+        </p:nvSpPr>
+        <p:spPr/>
+        <p:txBody>
+          <a:bodyPr/>
+          <a:lstStyle/>
+          <a:p>
+            <a:pPr>
+              <a:defRPr/>
+            </a:pPr>
+            <a:fld id="{70BFFA52-4234-45F6-B1A6-074E24FF43A2}" type="slidenum">
+              <a:rPr lang="de-DE" smtClean="0"/>
+              <a:pPr>
+                <a:defRPr/>
+              </a:pPr>
+              <a:t>7</a:t>
+            </a:fld>
+            <a:endParaRPr lang="de-DE" dirty="0"/>
+          </a:p>
+        </p:txBody>
+      </p:sp>
+      <p:sp>
+        <p:nvSpPr>
+          <p:cNvPr id="5" name="Fußzeilenplatzhalter 4"/>
+          <p:cNvSpPr>
+            <a:spLocks noGrp="1"/>
+          </p:cNvSpPr>
+          <p:nvPr>
+            <p:ph type="ftr" sz="quarter" idx="3"/>
+          </p:nvPr>
+        </p:nvSpPr>
+        <p:spPr/>
+        <p:txBody>
+          <a:bodyPr/>
+          <a:lstStyle/>
+          <a:p>
+            <a:r>
+              <a:rPr lang="de-DE" smtClean="0"/>
+              <a:t>Sicherheitsaspekte beim Deployment virtueller Netzinfrastrukturen</a:t>
+            </a:r>
+            <a:endParaRPr lang="de-DE" dirty="0"/>
+          </a:p>
+        </p:txBody>
+      </p:sp>
+      <p:sp>
+        <p:nvSpPr>
+          <p:cNvPr id="9" name="Rechteck 8"/>
+          <p:cNvSpPr/>
+          <p:nvPr/>
+        </p:nvSpPr>
+        <p:spPr bwMode="auto">
+          <a:xfrm>
+            <a:off x="898525" y="3032956"/>
+            <a:ext cx="7381887" cy="3321034"/>
+          </a:xfrm>
+          <a:prstGeom prst="rect">
+            <a:avLst/>
+          </a:prstGeom>
+          <a:solidFill>
+            <a:schemeClr val="bg1"/>
+          </a:solidFill>
+          <a:ln w="12700" cap="flat" cmpd="sng" algn="ctr">
+            <a:noFill/>
+            <a:prstDash val="solid"/>
+            <a:round/>
+            <a:headEnd type="none" w="med" len="med"/>
+            <a:tailEnd type="none" w="med" len="med"/>
+          </a:ln>
+          <a:effectLst/>
+        </p:spPr>
+        <p:txBody>
+          <a:bodyPr vert="horz" wrap="square" lIns="91440" tIns="45720" rIns="91440" bIns="45720" numCol="1" rtlCol="0" anchor="ctr" anchorCtr="0" compatLnSpc="1">
+            <a:prstTxWarp prst="textNoShape">
+              <a:avLst/>
+            </a:prstTxWarp>
+          </a:bodyPr>
+          <a:lstStyle/>
+          <a:p>
+            <a:pPr marL="0" marR="0" indent="0" algn="l" defTabSz="914400" rtl="0" eaLnBrk="0" fontAlgn="base" latinLnBrk="0" hangingPunct="0">
+              <a:lnSpc>
+                <a:spcPct val="100000"/>
+              </a:lnSpc>
+              <a:spcBef>
+                <a:spcPct val="0"/>
+              </a:spcBef>
+              <a:spcAft>
+                <a:spcPct val="0"/>
+              </a:spcAft>
+              <a:buClrTx/>
+              <a:buSzTx/>
+              <a:buFontTx/>
+              <a:buNone/>
+              <a:tabLst/>
+            </a:pPr>
+            <a:endParaRPr kumimoji="0" lang="de-DE" sz="1400" b="0" i="0" u="none" strike="noStrike" cap="none" normalizeH="0" baseline="0" smtClean="0">
+              <a:ln>
+                <a:noFill/>
+              </a:ln>
+              <a:solidFill>
+                <a:schemeClr val="tx1"/>
+              </a:solidFill>
+              <a:effectLst/>
+              <a:latin typeface="LMU CompatilFact" pitchFamily="2" charset="0"/>
+            </a:endParaRPr>
+          </a:p>
+        </p:txBody>
+      </p:sp>
+      <p:sp>
+        <p:nvSpPr>
+          <p:cNvPr id="8" name="Rechteck 7"/>
+          <p:cNvSpPr/>
+          <p:nvPr/>
+        </p:nvSpPr>
+        <p:spPr bwMode="auto">
+          <a:xfrm>
+            <a:off x="898525" y="3933056"/>
+            <a:ext cx="7381887" cy="2420934"/>
+          </a:xfrm>
+          <a:prstGeom prst="rect">
+            <a:avLst/>
+          </a:prstGeom>
+          <a:solidFill>
+            <a:schemeClr val="bg1"/>
+          </a:solidFill>
+          <a:ln w="12700" cap="flat" cmpd="sng" algn="ctr">
+            <a:noFill/>
+            <a:prstDash val="solid"/>
+            <a:round/>
+            <a:headEnd type="none" w="med" len="med"/>
+            <a:tailEnd type="none" w="med" len="med"/>
+          </a:ln>
+          <a:effectLst/>
+        </p:spPr>
+        <p:txBody>
+          <a:bodyPr vert="horz" wrap="square" lIns="91440" tIns="45720" rIns="91440" bIns="45720" numCol="1" rtlCol="0" anchor="ctr" anchorCtr="0" compatLnSpc="1">
+            <a:prstTxWarp prst="textNoShape">
+              <a:avLst/>
+            </a:prstTxWarp>
+          </a:bodyPr>
+          <a:lstStyle/>
+          <a:p>
+            <a:pPr marL="0" marR="0" indent="0" algn="l" defTabSz="914400" rtl="0" eaLnBrk="0" fontAlgn="base" latinLnBrk="0" hangingPunct="0">
+              <a:lnSpc>
+                <a:spcPct val="100000"/>
+              </a:lnSpc>
+              <a:spcBef>
+                <a:spcPct val="0"/>
+              </a:spcBef>
+              <a:spcAft>
+                <a:spcPct val="0"/>
+              </a:spcAft>
+              <a:buClrTx/>
+              <a:buSzTx/>
+              <a:buFontTx/>
+              <a:buNone/>
+              <a:tabLst/>
+            </a:pPr>
+            <a:endParaRPr kumimoji="0" lang="de-DE" sz="1400" b="0" i="0" u="none" strike="noStrike" cap="none" normalizeH="0" baseline="0" smtClean="0">
+              <a:ln>
+                <a:noFill/>
+              </a:ln>
+              <a:solidFill>
+                <a:schemeClr val="tx1"/>
+              </a:solidFill>
+              <a:effectLst/>
+              <a:latin typeface="LMU CompatilFact" pitchFamily="2" charset="0"/>
+            </a:endParaRPr>
+          </a:p>
+        </p:txBody>
+      </p:sp>
+      <p:pic>
+        <p:nvPicPr>
+          <p:cNvPr id="11" name="Grafik 10"/>
+          <p:cNvPicPr>
+            <a:picLocks noChangeAspect="1"/>
+          </p:cNvPicPr>
+          <p:nvPr/>
+        </p:nvPicPr>
+        <p:blipFill>
+          <a:blip r:embed="rId3"/>
+          <a:stretch>
+            <a:fillRect/>
+          </a:stretch>
+        </p:blipFill>
+        <p:spPr>
+          <a:xfrm>
+            <a:off x="1322236" y="1340768"/>
+            <a:ext cx="6526128" cy="5059562"/>
+          </a:xfrm>
+          <a:prstGeom prst="rect">
+            <a:avLst/>
+          </a:prstGeom>
+        </p:spPr>
+      </p:pic>
+      <p:sp>
+        <p:nvSpPr>
+          <p:cNvPr id="12" name="Rechteck 11"/>
+          <p:cNvSpPr/>
+          <p:nvPr/>
+        </p:nvSpPr>
+        <p:spPr bwMode="auto">
+          <a:xfrm>
+            <a:off x="898525" y="3068960"/>
+            <a:ext cx="7381887" cy="3285030"/>
+          </a:xfrm>
+          <a:prstGeom prst="rect">
+            <a:avLst/>
+          </a:prstGeom>
+          <a:solidFill>
+            <a:schemeClr val="bg1"/>
+          </a:solidFill>
+          <a:ln w="12700" cap="flat" cmpd="sng" algn="ctr">
+            <a:noFill/>
+            <a:prstDash val="solid"/>
+            <a:round/>
+            <a:headEnd type="none" w="med" len="med"/>
+            <a:tailEnd type="none" w="med" len="med"/>
+          </a:ln>
+          <a:effectLst/>
+        </p:spPr>
+        <p:txBody>
+          <a:bodyPr vert="horz" wrap="square" lIns="91440" tIns="45720" rIns="91440" bIns="45720" numCol="1" rtlCol="0" anchor="ctr" anchorCtr="0" compatLnSpc="1">
+            <a:prstTxWarp prst="textNoShape">
+              <a:avLst/>
+            </a:prstTxWarp>
+          </a:bodyPr>
+          <a:lstStyle/>
+          <a:p>
+            <a:pPr marL="0" marR="0" indent="0" algn="l" defTabSz="914400" rtl="0" eaLnBrk="0" fontAlgn="base" latinLnBrk="0" hangingPunct="0">
+              <a:lnSpc>
+                <a:spcPct val="100000"/>
+              </a:lnSpc>
+              <a:spcBef>
+                <a:spcPct val="0"/>
+              </a:spcBef>
+              <a:spcAft>
+                <a:spcPct val="0"/>
+              </a:spcAft>
+              <a:buClrTx/>
+              <a:buSzTx/>
+              <a:buFontTx/>
+              <a:buNone/>
+              <a:tabLst/>
+            </a:pPr>
+            <a:endParaRPr kumimoji="0" lang="de-DE" sz="1400" b="0" i="0" u="none" strike="noStrike" cap="none" normalizeH="0" baseline="0" smtClean="0">
+              <a:ln>
+                <a:noFill/>
+              </a:ln>
+              <a:solidFill>
+                <a:schemeClr val="tx1"/>
+              </a:solidFill>
+              <a:effectLst/>
+              <a:latin typeface="LMU CompatilFact" pitchFamily="2" charset="0"/>
+            </a:endParaRPr>
+          </a:p>
+        </p:txBody>
+      </p:sp>
+      <p:sp>
+        <p:nvSpPr>
+          <p:cNvPr id="13" name="Rechteck 12"/>
+          <p:cNvSpPr/>
+          <p:nvPr/>
+        </p:nvSpPr>
+        <p:spPr bwMode="auto">
+          <a:xfrm>
+            <a:off x="898525" y="4005064"/>
+            <a:ext cx="7381887" cy="2348926"/>
+          </a:xfrm>
+          <a:prstGeom prst="rect">
+            <a:avLst/>
+          </a:prstGeom>
+          <a:solidFill>
+            <a:schemeClr val="bg1"/>
+          </a:solidFill>
+          <a:ln w="12700" cap="flat" cmpd="sng" algn="ctr">
+            <a:noFill/>
+            <a:prstDash val="solid"/>
+            <a:round/>
+            <a:headEnd type="none" w="med" len="med"/>
+            <a:tailEnd type="none" w="med" len="med"/>
+          </a:ln>
+          <a:effectLst/>
+        </p:spPr>
+        <p:txBody>
+          <a:bodyPr vert="horz" wrap="square" lIns="91440" tIns="45720" rIns="91440" bIns="45720" numCol="1" rtlCol="0" anchor="ctr" anchorCtr="0" compatLnSpc="1">
+            <a:prstTxWarp prst="textNoShape">
+              <a:avLst/>
+            </a:prstTxWarp>
+          </a:bodyPr>
+          <a:lstStyle/>
+          <a:p>
+            <a:pPr marL="0" marR="0" indent="0" algn="l" defTabSz="914400" rtl="0" eaLnBrk="0" fontAlgn="base" latinLnBrk="0" hangingPunct="0">
+              <a:lnSpc>
+                <a:spcPct val="100000"/>
+              </a:lnSpc>
+              <a:spcBef>
+                <a:spcPct val="0"/>
+              </a:spcBef>
+              <a:spcAft>
+                <a:spcPct val="0"/>
+              </a:spcAft>
+              <a:buClrTx/>
+              <a:buSzTx/>
+              <a:buFontTx/>
+              <a:buNone/>
+              <a:tabLst/>
+            </a:pPr>
+            <a:endParaRPr kumimoji="0" lang="de-DE" sz="1400" b="0" i="0" u="none" strike="noStrike" cap="none" normalizeH="0" baseline="0" smtClean="0">
+              <a:ln>
+                <a:noFill/>
+              </a:ln>
+              <a:solidFill>
+                <a:schemeClr val="tx1"/>
+              </a:solidFill>
+              <a:effectLst/>
+              <a:latin typeface="LMU CompatilFact" pitchFamily="2" charset="0"/>
+            </a:endParaRPr>
+          </a:p>
+        </p:txBody>
+      </p:sp>
+    </p:spTree>
+    <p:extLst>
+      <p:ext uri="{BB962C8B-B14F-4D97-AF65-F5344CB8AC3E}">
+        <p14:creationId xmlns:p14="http://schemas.microsoft.com/office/powerpoint/2010/main" val="541222762"/>
+      </p:ext>
+    </p:extLst>
+  </p:cSld>
+  <p:clrMapOvr>
+    <a:masterClrMapping/>
+  </p:clrMapOvr>
+  <p:transition spd="med"/>
+  <p:timing>
+    <p:tnLst>
+      <p:par>
+        <p:cTn id="1" dur="indefinite" restart="never" nodeType="tmRoot">
+          <p:childTnLst>
+            <p:seq concurrent="1" nextAc="seek">
+              <p:cTn id="2" dur="indefinite" nodeType="mainSeq">
+                <p:childTnLst>
+                  <p:par>
+                    <p:cTn id="3" fill="hold">
+                      <p:stCondLst>
+                        <p:cond delay="indefinite"/>
+                      </p:stCondLst>
+                      <p:childTnLst>
+                        <p:par>
+                          <p:cTn id="4" fill="hold">
+                            <p:stCondLst>
+                              <p:cond delay="0"/>
+                            </p:stCondLst>
+                            <p:childTnLst>
+                              <p:par>
+                                <p:cTn id="5" presetID="10" presetClass="exit" presetSubtype="0" fill="hold" grpId="0" nodeType="clickEffect">
+                                  <p:stCondLst>
+                                    <p:cond delay="0"/>
+                                  </p:stCondLst>
+                                  <p:childTnLst>
+                                    <p:animEffect transition="out" filter="fade">
+                                      <p:cBhvr>
+                                        <p:cTn id="6" dur="500"/>
+                                        <p:tgtEl>
+                                          <p:spTgt spid="12"/>
+                                        </p:tgtEl>
+                                      </p:cBhvr>
+                                    </p:animEffect>
+                                    <p:set>
+                                      <p:cBhvr>
+                                        <p:cTn id="7" dur="1" fill="hold">
+                                          <p:stCondLst>
+                                            <p:cond delay="499"/>
+                                          </p:stCondLst>
+                                        </p:cTn>
+                                        <p:tgtEl>
+                                          <p:spTgt spid="12"/>
+                                        </p:tgtEl>
+                                        <p:attrNameLst>
+                                          <p:attrName>style.visibility</p:attrName>
+                                        </p:attrNameLst>
+                                      </p:cBhvr>
+                                      <p:to>
+                                        <p:strVal val="hidden"/>
+                                      </p:to>
+                                    </p:set>
+                                  </p:childTnLst>
+                                </p:cTn>
+                              </p:par>
+                            </p:childTnLst>
+                          </p:cTn>
+                        </p:par>
+                      </p:childTnLst>
+                    </p:cTn>
+                  </p:par>
+                  <p:par>
+                    <p:cTn id="8" fill="hold">
+                      <p:stCondLst>
+                        <p:cond delay="indefinite"/>
+                      </p:stCondLst>
+                      <p:childTnLst>
+                        <p:par>
+                          <p:cTn id="9" fill="hold">
+                            <p:stCondLst>
+                              <p:cond delay="0"/>
+                            </p:stCondLst>
+                            <p:childTnLst>
+                              <p:par>
+                                <p:cTn id="10" presetID="10" presetClass="exit" presetSubtype="0" fill="hold" grpId="0" nodeType="clickEffect">
+                                  <p:stCondLst>
+                                    <p:cond delay="0"/>
+                                  </p:stCondLst>
+                                  <p:childTnLst>
+                                    <p:animEffect transition="out" filter="fade">
+                                      <p:cBhvr>
+                                        <p:cTn id="11" dur="500"/>
+                                        <p:tgtEl>
+                                          <p:spTgt spid="13"/>
+                                        </p:tgtEl>
+                                      </p:cBhvr>
+                                    </p:animEffect>
+                                    <p:set>
+                                      <p:cBhvr>
+                                        <p:cTn id="12" dur="1" fill="hold">
+                                          <p:stCondLst>
+                                            <p:cond delay="499"/>
+                                          </p:stCondLst>
+                                        </p:cTn>
+                                        <p:tgtEl>
+                                          <p:spTgt spid="13"/>
+                                        </p:tgtEl>
+                                        <p:attrNameLst>
+                                          <p:attrName>style.visibility</p:attrName>
+                                        </p:attrNameLst>
+                                      </p:cBhvr>
+                                      <p:to>
+                                        <p:strVal val="hidden"/>
+                                      </p:to>
+                                    </p:set>
+                                  </p:childTnLst>
+                                </p:cTn>
+                              </p:par>
+                            </p:childTnLst>
+                          </p:cTn>
+                        </p:par>
+                      </p:childTnLst>
+                    </p:cTn>
+                  </p:par>
+                </p:childTnLst>
+              </p:cTn>
+              <p:prevCondLst>
+                <p:cond evt="onPrev" delay="0">
+                  <p:tgtEl>
+                    <p:sldTgt/>
+                  </p:tgtEl>
+                </p:cond>
+              </p:prevCondLst>
+              <p:nextCondLst>
+                <p:cond evt="onNext" delay="0">
+                  <p:tgtEl>
+                    <p:sldTgt/>
+                  </p:tgtEl>
+                </p:cond>
+              </p:nextCondLst>
+            </p:seq>
+          </p:childTnLst>
+        </p:cTn>
+      </p:par>
+    </p:tnLst>
+    <p:bldLst>
+      <p:bldP spid="12" grpId="0" animBg="1"/>
+      <p:bldP spid="13" grpId="0" animBg="1"/>
+    </p:bldLst>
+  </p:timing>
+</p:sld>
+</file>
+
+<file path=ppt/slides/slide8.xml><?xml version="1.0" encoding="utf-8"?>
+<p:sld xmlns:a="http://schemas.openxmlformats.org/drawingml/2006/main" xmlns:r="http://schemas.openxmlformats.org/officeDocument/2006/relationships" xmlns:p="http://schemas.openxmlformats.org/presentationml/2006/main">
+  <p:cSld>
+    <p:spTree>
+      <p:nvGrpSpPr>
+        <p:cNvPr id="1" name=""/>
+        <p:cNvGrpSpPr/>
+        <p:nvPr/>
+      </p:nvGrpSpPr>
+      <p:grpSpPr>
+        <a:xfrm>
+          <a:off x="0" y="0"/>
+          <a:ext cx="0" cy="0"/>
+          <a:chOff x="0" y="0"/>
+          <a:chExt cx="0" cy="0"/>
+        </a:xfrm>
+      </p:grpSpPr>
+      <p:sp>
+        <p:nvSpPr>
+          <p:cNvPr id="2" name="Titel 1"/>
+          <p:cNvSpPr>
+            <a:spLocks noGrp="1"/>
+          </p:cNvSpPr>
+          <p:nvPr>
+            <p:ph type="title"/>
+          </p:nvPr>
+        </p:nvSpPr>
+        <p:spPr/>
+        <p:txBody>
+          <a:bodyPr/>
+          <a:lstStyle/>
+          <a:p>
+            <a:r>
+              <a:rPr lang="de-DE" dirty="0" smtClean="0"/>
+              <a:t>SVNE-Algorithmen:</a:t>
+            </a:r>
+            <a:br>
+              <a:rPr lang="de-DE" dirty="0" smtClean="0"/>
+            </a:br>
+            <a:r>
+              <a:rPr lang="de-DE" sz="1800" b="0" dirty="0"/>
+              <a:t>Strikte Trennung und </a:t>
+            </a:r>
+            <a:r>
+              <a:rPr lang="de-DE" sz="1800" b="0" dirty="0" err="1" smtClean="0"/>
+              <a:t>Preprocessing</a:t>
+            </a:r>
+            <a:endParaRPr lang="de-DE" sz="1800" dirty="0"/>
+          </a:p>
+        </p:txBody>
+      </p:sp>
+      <p:sp>
+        <p:nvSpPr>
+          <p:cNvPr id="3" name="Inhaltsplatzhalter 2"/>
+          <p:cNvSpPr>
+            <a:spLocks noGrp="1"/>
+          </p:cNvSpPr>
+          <p:nvPr>
+            <p:ph idx="1"/>
+          </p:nvPr>
+        </p:nvSpPr>
+        <p:spPr/>
+        <p:txBody>
+          <a:bodyPr/>
+          <a:lstStyle/>
+          <a:p>
+            <a:endParaRPr lang="de-DE" dirty="0"/>
+          </a:p>
+        </p:txBody>
+      </p:sp>
+      <p:sp>
+        <p:nvSpPr>
+          <p:cNvPr id="4" name="Foliennummernplatzhalter 3"/>
+          <p:cNvSpPr>
+            <a:spLocks noGrp="1"/>
+          </p:cNvSpPr>
+          <p:nvPr>
+            <p:ph type="sldNum" sz="quarter" idx="4"/>
+          </p:nvPr>
+        </p:nvSpPr>
+        <p:spPr/>
+        <p:txBody>
+          <a:bodyPr/>
+          <a:lstStyle/>
+          <a:p>
+            <a:pPr>
+              <a:defRPr/>
+            </a:pPr>
+            <a:fld id="{70BFFA52-4234-45F6-B1A6-074E24FF43A2}" type="slidenum">
+              <a:rPr lang="de-DE" smtClean="0"/>
+              <a:pPr>
+                <a:defRPr/>
+              </a:pPr>
+              <a:t>8</a:t>
+            </a:fld>
+            <a:endParaRPr lang="de-DE" dirty="0"/>
+          </a:p>
+        </p:txBody>
+      </p:sp>
+      <p:sp>
+        <p:nvSpPr>
+          <p:cNvPr id="5" name="Fußzeilenplatzhalter 4"/>
+          <p:cNvSpPr>
+            <a:spLocks noGrp="1"/>
+          </p:cNvSpPr>
+          <p:nvPr>
+            <p:ph type="ftr" sz="quarter" idx="3"/>
+          </p:nvPr>
+        </p:nvSpPr>
+        <p:spPr/>
+        <p:txBody>
+          <a:bodyPr/>
+          <a:lstStyle/>
+          <a:p>
+            <a:r>
+              <a:rPr lang="de-DE" smtClean="0"/>
+              <a:t>Sicherheitsaspekte beim Deployment virtueller Netzinfrastrukturen</a:t>
+            </a:r>
+            <a:endParaRPr lang="de-DE" dirty="0"/>
+          </a:p>
+        </p:txBody>
+      </p:sp>
+      <p:sp>
+        <p:nvSpPr>
+          <p:cNvPr id="6" name="Textfeld 5"/>
+          <p:cNvSpPr txBox="1"/>
+          <p:nvPr/>
+        </p:nvSpPr>
+        <p:spPr>
+          <a:xfrm>
+            <a:off x="143508" y="6225899"/>
+            <a:ext cx="7564763" cy="461665"/>
+          </a:xfrm>
+          <a:prstGeom prst="rect">
+            <a:avLst/>
+          </a:prstGeom>
+          <a:noFill/>
+        </p:spPr>
+        <p:txBody>
+          <a:bodyPr wrap="none" rtlCol="0">
+            <a:spAutoFit/>
+          </a:bodyPr>
+          <a:lstStyle/>
+          <a:p>
+            <a:r>
+              <a:rPr lang="de-DE" dirty="0" smtClean="0"/>
+              <a:t>[1] Hong </a:t>
+            </a:r>
+            <a:r>
+              <a:rPr lang="de-DE" dirty="0" err="1"/>
+              <a:t>Xu</a:t>
+            </a:r>
+            <a:r>
+              <a:rPr lang="de-DE" dirty="0"/>
+              <a:t> Ming </a:t>
+            </a:r>
+            <a:r>
+              <a:rPr lang="de-DE" dirty="0" err="1"/>
+              <a:t>Xu</a:t>
+            </a:r>
+            <a:r>
+              <a:rPr lang="de-DE" dirty="0"/>
+              <a:t> </a:t>
+            </a:r>
+            <a:r>
+              <a:rPr lang="de-DE" dirty="0" err="1"/>
+              <a:t>Shuhao</a:t>
+            </a:r>
+            <a:r>
+              <a:rPr lang="de-DE" dirty="0"/>
+              <a:t> Liu, </a:t>
+            </a:r>
+            <a:r>
+              <a:rPr lang="de-DE" dirty="0" err="1"/>
+              <a:t>Zhiping</a:t>
+            </a:r>
+            <a:r>
+              <a:rPr lang="de-DE" dirty="0"/>
+              <a:t> Cai. </a:t>
+            </a:r>
+            <a:r>
+              <a:rPr lang="de-DE" dirty="0" err="1"/>
+              <a:t>Towards</a:t>
+            </a:r>
+            <a:r>
+              <a:rPr lang="de-DE" dirty="0"/>
+              <a:t> Security-aware Virtual Network Embedding, 2015.</a:t>
+            </a:r>
+          </a:p>
+          <a:p>
+            <a:endParaRPr lang="de-DE" dirty="0"/>
+          </a:p>
+        </p:txBody>
+      </p:sp>
+      <p:sp>
+        <p:nvSpPr>
+          <p:cNvPr id="7" name="Textfeld 6"/>
+          <p:cNvSpPr txBox="1"/>
+          <p:nvPr/>
+        </p:nvSpPr>
+        <p:spPr>
+          <a:xfrm>
+            <a:off x="5778538" y="692696"/>
+            <a:ext cx="269626" cy="276999"/>
+          </a:xfrm>
+          <a:prstGeom prst="rect">
+            <a:avLst/>
+          </a:prstGeom>
+          <a:noFill/>
+        </p:spPr>
+        <p:txBody>
+          <a:bodyPr wrap="none" rtlCol="0">
+            <a:spAutoFit/>
+          </a:bodyPr>
+          <a:lstStyle/>
+          <a:p>
+            <a:r>
+              <a:rPr lang="de-DE" b="1" dirty="0" smtClean="0"/>
+              <a:t>1</a:t>
+            </a:r>
+            <a:endParaRPr lang="de-DE" b="1" dirty="0"/>
+          </a:p>
+        </p:txBody>
+      </p:sp>
+    </p:spTree>
+    <p:extLst>
+      <p:ext uri="{BB962C8B-B14F-4D97-AF65-F5344CB8AC3E}">
+        <p14:creationId xmlns:p14="http://schemas.microsoft.com/office/powerpoint/2010/main" val="3408010396"/>
+      </p:ext>
+    </p:extLst>
+  </p:cSld>
+  <p:clrMapOvr>
+    <a:masterClrMapping/>
+  </p:clrMapOvr>
+  <p:transition spd="med"/>
+  <p:timing>
+    <p:tnLst>
+      <p:par>
+        <p:cTn id="1" dur="indefinite" restart="never" nodeType="tmRoot"/>
+      </p:par>
+    </p:tnLst>
+  </p:timing>
+</p:sld>
+</file>
+
+<file path=ppt/slides/slide9.xml><?xml version="1.0" encoding="utf-8"?>
+<p:sld xmlns:a="http://schemas.openxmlformats.org/drawingml/2006/main" xmlns:r="http://schemas.openxmlformats.org/officeDocument/2006/relationships" xmlns:p="http://schemas.openxmlformats.org/presentationml/2006/main">
+  <p:cSld>
+    <p:spTree>
+      <p:nvGrpSpPr>
+        <p:cNvPr id="1" name=""/>
+        <p:cNvGrpSpPr/>
+        <p:nvPr/>
+      </p:nvGrpSpPr>
+      <p:grpSpPr>
+        <a:xfrm>
+          <a:off x="0" y="0"/>
+          <a:ext cx="0" cy="0"/>
+          <a:chOff x="0" y="0"/>
+          <a:chExt cx="0" cy="0"/>
+        </a:xfrm>
+      </p:grpSpPr>
+      <p:sp>
+        <p:nvSpPr>
+          <p:cNvPr id="2" name="Titel 1"/>
+          <p:cNvSpPr>
+            <a:spLocks noGrp="1"/>
+          </p:cNvSpPr>
+          <p:nvPr>
+            <p:ph type="title"/>
+          </p:nvPr>
+        </p:nvSpPr>
+        <p:spPr/>
+        <p:txBody>
+          <a:bodyPr/>
+          <a:lstStyle/>
+          <a:p>
+            <a:r>
+              <a:rPr lang="de-DE" dirty="0" smtClean="0"/>
+              <a:t>SVNE-Algorithmen:</a:t>
+            </a:r>
+            <a:br>
+              <a:rPr lang="de-DE" dirty="0" smtClean="0"/>
+            </a:br>
+            <a:r>
+              <a:rPr lang="de-DE" sz="1800" b="0" dirty="0"/>
+              <a:t>Sicherheitsvektoren und doppelte Berechnung</a:t>
+            </a:r>
+            <a:endParaRPr lang="de-DE" sz="1800" dirty="0"/>
+          </a:p>
+        </p:txBody>
+      </p:sp>
+      <p:sp>
+        <p:nvSpPr>
+          <p:cNvPr id="3" name="Inhaltsplatzhalter 2"/>
+          <p:cNvSpPr>
+            <a:spLocks noGrp="1"/>
+          </p:cNvSpPr>
+          <p:nvPr>
+            <p:ph idx="1"/>
+          </p:nvPr>
+        </p:nvSpPr>
+        <p:spPr/>
+        <p:txBody>
+          <a:bodyPr/>
+          <a:lstStyle/>
+          <a:p>
+            <a:endParaRPr lang="de-DE"/>
+          </a:p>
+        </p:txBody>
+      </p:sp>
+      <p:sp>
+        <p:nvSpPr>
+          <p:cNvPr id="4" name="Foliennummernplatzhalter 3"/>
+          <p:cNvSpPr>
+            <a:spLocks noGrp="1"/>
+          </p:cNvSpPr>
+          <p:nvPr>
+            <p:ph type="sldNum" sz="quarter" idx="4"/>
+          </p:nvPr>
+        </p:nvSpPr>
+        <p:spPr/>
+        <p:txBody>
+          <a:bodyPr/>
+          <a:lstStyle/>
+          <a:p>
+            <a:pPr>
+              <a:defRPr/>
+            </a:pPr>
+            <a:fld id="{70BFFA52-4234-45F6-B1A6-074E24FF43A2}" type="slidenum">
+              <a:rPr lang="de-DE" smtClean="0"/>
+              <a:pPr>
+                <a:defRPr/>
+              </a:pPr>
+              <a:t>9</a:t>
+            </a:fld>
+            <a:endParaRPr lang="de-DE" dirty="0"/>
+          </a:p>
+        </p:txBody>
+      </p:sp>
+      <p:sp>
+        <p:nvSpPr>
+          <p:cNvPr id="5" name="Fußzeilenplatzhalter 4"/>
+          <p:cNvSpPr>
+            <a:spLocks noGrp="1"/>
+          </p:cNvSpPr>
+          <p:nvPr>
+            <p:ph type="ftr" sz="quarter" idx="3"/>
+          </p:nvPr>
+        </p:nvSpPr>
+        <p:spPr/>
+        <p:txBody>
+          <a:bodyPr/>
+          <a:lstStyle/>
+          <a:p>
+            <a:r>
+              <a:rPr lang="de-DE" smtClean="0"/>
+              <a:t>Sicherheitsaspekte beim Deployment virtueller Netzinfrastrukturen</a:t>
+            </a:r>
+            <a:endParaRPr lang="de-DE" dirty="0"/>
+          </a:p>
+        </p:txBody>
+      </p:sp>
+      <p:sp>
+        <p:nvSpPr>
+          <p:cNvPr id="6" name="Textfeld 5"/>
+          <p:cNvSpPr txBox="1"/>
+          <p:nvPr/>
+        </p:nvSpPr>
+        <p:spPr>
+          <a:xfrm>
+            <a:off x="143508" y="6225899"/>
+            <a:ext cx="8944821" cy="276999"/>
+          </a:xfrm>
+          <a:prstGeom prst="rect">
+            <a:avLst/>
+          </a:prstGeom>
+          <a:noFill/>
+        </p:spPr>
+        <p:txBody>
+          <a:bodyPr wrap="none" rtlCol="0">
+            <a:spAutoFit/>
+          </a:bodyPr>
+          <a:lstStyle/>
+          <a:p>
+            <a:r>
+              <a:rPr lang="de-DE" dirty="0" smtClean="0"/>
+              <a:t>[1] </a:t>
+            </a:r>
+            <a:r>
+              <a:rPr lang="en-US" dirty="0"/>
+              <a:t>Yang Wang, </a:t>
+            </a:r>
+            <a:r>
+              <a:rPr lang="en-US" dirty="0" err="1"/>
+              <a:t>Phanvu</a:t>
+            </a:r>
+            <a:r>
+              <a:rPr lang="en-US" dirty="0"/>
+              <a:t> Chau und </a:t>
+            </a:r>
+            <a:r>
+              <a:rPr lang="en-US" dirty="0" err="1"/>
+              <a:t>Fuyu</a:t>
+            </a:r>
+            <a:r>
+              <a:rPr lang="en-US" dirty="0"/>
+              <a:t> Chen. Towards a secured network virtualization. </a:t>
+            </a:r>
+            <a:r>
+              <a:rPr lang="de-DE" i="1" dirty="0"/>
+              <a:t>Computer Networks</a:t>
+            </a:r>
+            <a:r>
+              <a:rPr lang="de-DE" dirty="0"/>
+              <a:t>, 104:55–65, 2016</a:t>
+            </a:r>
+            <a:r>
+              <a:rPr lang="de-DE" dirty="0" smtClean="0"/>
+              <a:t>.</a:t>
+            </a:r>
+            <a:endParaRPr lang="de-DE" dirty="0"/>
+          </a:p>
+        </p:txBody>
+      </p:sp>
+      <p:sp>
+        <p:nvSpPr>
+          <p:cNvPr id="7" name="Textfeld 6"/>
+          <p:cNvSpPr txBox="1"/>
+          <p:nvPr/>
+        </p:nvSpPr>
+        <p:spPr>
+          <a:xfrm>
+            <a:off x="3330266" y="692696"/>
+            <a:ext cx="269626" cy="276999"/>
+          </a:xfrm>
+          <a:prstGeom prst="rect">
+            <a:avLst/>
+          </a:prstGeom>
+          <a:noFill/>
+        </p:spPr>
+        <p:txBody>
+          <a:bodyPr wrap="none" rtlCol="0">
+            <a:spAutoFit/>
+          </a:bodyPr>
+          <a:lstStyle/>
+          <a:p>
+            <a:r>
+              <a:rPr lang="de-DE" b="1" dirty="0" smtClean="0"/>
+              <a:t>1</a:t>
+            </a:r>
+            <a:endParaRPr lang="de-DE" b="1" dirty="0"/>
           </a:p>
         </p:txBody>
       </p:sp>

</xml_diff>

<commit_message>
Folien zu Sicherheitsrisiken vorbereitet. Mitlaufende Klassifizierung.
</commit_message>
<xml_diff>
--- a/Referat/PowerPoint/TimvS_SVNE.pptx
+++ b/Referat/PowerPoint/TimvS_SVNE.pptx
@@ -5,23 +5,29 @@
     <p:sldMasterId id="2147483652" r:id="rId1"/>
   </p:sldMasterIdLst>
   <p:notesMasterIdLst>
-    <p:notesMasterId r:id="rId13"/>
+    <p:notesMasterId r:id="rId19"/>
   </p:notesMasterIdLst>
   <p:handoutMasterIdLst>
-    <p:handoutMasterId r:id="rId14"/>
+    <p:handoutMasterId r:id="rId20"/>
   </p:handoutMasterIdLst>
   <p:sldIdLst>
     <p:sldId id="844" r:id="rId2"/>
     <p:sldId id="836" r:id="rId3"/>
     <p:sldId id="837" r:id="rId4"/>
     <p:sldId id="838" r:id="rId5"/>
-    <p:sldId id="839" r:id="rId6"/>
-    <p:sldId id="843" r:id="rId7"/>
-    <p:sldId id="842" r:id="rId8"/>
-    <p:sldId id="840" r:id="rId9"/>
-    <p:sldId id="841" r:id="rId10"/>
-    <p:sldId id="845" r:id="rId11"/>
-    <p:sldId id="846" r:id="rId12"/>
+    <p:sldId id="843" r:id="rId6"/>
+    <p:sldId id="842" r:id="rId7"/>
+    <p:sldId id="847" r:id="rId8"/>
+    <p:sldId id="851" r:id="rId9"/>
+    <p:sldId id="853" r:id="rId10"/>
+    <p:sldId id="852" r:id="rId11"/>
+    <p:sldId id="855" r:id="rId12"/>
+    <p:sldId id="854" r:id="rId13"/>
+    <p:sldId id="856" r:id="rId14"/>
+    <p:sldId id="840" r:id="rId15"/>
+    <p:sldId id="841" r:id="rId16"/>
+    <p:sldId id="845" r:id="rId17"/>
+    <p:sldId id="846" r:id="rId18"/>
   </p:sldIdLst>
   <p:sldSz cx="9144000" cy="6858000" type="screen4x3"/>
   <p:notesSz cx="6781800" cy="9855200"/>
@@ -835,6 +841,516 @@
 </p:notes>
 </file>
 
+<file path=ppt/notesSlides/notesSlide10.xml><?xml version="1.0" encoding="utf-8"?>
+<p:notes xmlns:a="http://schemas.openxmlformats.org/drawingml/2006/main" xmlns:r="http://schemas.openxmlformats.org/officeDocument/2006/relationships" xmlns:p="http://schemas.openxmlformats.org/presentationml/2006/main">
+  <p:cSld>
+    <p:spTree>
+      <p:nvGrpSpPr>
+        <p:cNvPr id="1" name=""/>
+        <p:cNvGrpSpPr/>
+        <p:nvPr/>
+      </p:nvGrpSpPr>
+      <p:grpSpPr>
+        <a:xfrm>
+          <a:off x="0" y="0"/>
+          <a:ext cx="0" cy="0"/>
+          <a:chOff x="0" y="0"/>
+          <a:chExt cx="0" cy="0"/>
+        </a:xfrm>
+      </p:grpSpPr>
+      <p:sp>
+        <p:nvSpPr>
+          <p:cNvPr id="2" name="Folienbildplatzhalter 1"/>
+          <p:cNvSpPr>
+            <a:spLocks noGrp="1" noRot="1" noChangeAspect="1"/>
+          </p:cNvSpPr>
+          <p:nvPr>
+            <p:ph type="sldImg"/>
+          </p:nvPr>
+        </p:nvSpPr>
+        <p:spPr/>
+      </p:sp>
+      <p:sp>
+        <p:nvSpPr>
+          <p:cNvPr id="3" name="Notizenplatzhalter 2"/>
+          <p:cNvSpPr>
+            <a:spLocks noGrp="1"/>
+          </p:cNvSpPr>
+          <p:nvPr>
+            <p:ph type="body" idx="1"/>
+          </p:nvPr>
+        </p:nvSpPr>
+        <p:spPr/>
+        <p:txBody>
+          <a:bodyPr/>
+          <a:lstStyle/>
+          <a:p>
+            <a:endParaRPr lang="de-DE" dirty="0"/>
+          </a:p>
+        </p:txBody>
+      </p:sp>
+      <p:sp>
+        <p:nvSpPr>
+          <p:cNvPr id="4" name="Foliennummernplatzhalter 3"/>
+          <p:cNvSpPr>
+            <a:spLocks noGrp="1"/>
+          </p:cNvSpPr>
+          <p:nvPr>
+            <p:ph type="sldNum" sz="quarter" idx="10"/>
+          </p:nvPr>
+        </p:nvSpPr>
+        <p:spPr/>
+        <p:txBody>
+          <a:bodyPr/>
+          <a:lstStyle/>
+          <a:p>
+            <a:fld id="{87E9C61A-9B5E-4580-98DD-1AC874081FFB}" type="slidenum">
+              <a:rPr lang="de-DE" smtClean="0"/>
+              <a:pPr/>
+              <a:t>12</a:t>
+            </a:fld>
+            <a:endParaRPr lang="de-DE"/>
+          </a:p>
+        </p:txBody>
+      </p:sp>
+    </p:spTree>
+    <p:extLst>
+      <p:ext uri="{BB962C8B-B14F-4D97-AF65-F5344CB8AC3E}">
+        <p14:creationId xmlns:p14="http://schemas.microsoft.com/office/powerpoint/2010/main" val="1399884599"/>
+      </p:ext>
+    </p:extLst>
+  </p:cSld>
+  <p:clrMapOvr>
+    <a:masterClrMapping/>
+  </p:clrMapOvr>
+</p:notes>
+</file>
+
+<file path=ppt/notesSlides/notesSlide11.xml><?xml version="1.0" encoding="utf-8"?>
+<p:notes xmlns:a="http://schemas.openxmlformats.org/drawingml/2006/main" xmlns:r="http://schemas.openxmlformats.org/officeDocument/2006/relationships" xmlns:p="http://schemas.openxmlformats.org/presentationml/2006/main">
+  <p:cSld>
+    <p:spTree>
+      <p:nvGrpSpPr>
+        <p:cNvPr id="1" name=""/>
+        <p:cNvGrpSpPr/>
+        <p:nvPr/>
+      </p:nvGrpSpPr>
+      <p:grpSpPr>
+        <a:xfrm>
+          <a:off x="0" y="0"/>
+          <a:ext cx="0" cy="0"/>
+          <a:chOff x="0" y="0"/>
+          <a:chExt cx="0" cy="0"/>
+        </a:xfrm>
+      </p:grpSpPr>
+      <p:sp>
+        <p:nvSpPr>
+          <p:cNvPr id="2" name="Folienbildplatzhalter 1"/>
+          <p:cNvSpPr>
+            <a:spLocks noGrp="1" noRot="1" noChangeAspect="1"/>
+          </p:cNvSpPr>
+          <p:nvPr>
+            <p:ph type="sldImg"/>
+          </p:nvPr>
+        </p:nvSpPr>
+        <p:spPr/>
+      </p:sp>
+      <p:sp>
+        <p:nvSpPr>
+          <p:cNvPr id="3" name="Notizenplatzhalter 2"/>
+          <p:cNvSpPr>
+            <a:spLocks noGrp="1"/>
+          </p:cNvSpPr>
+          <p:nvPr>
+            <p:ph type="body" idx="1"/>
+          </p:nvPr>
+        </p:nvSpPr>
+        <p:spPr/>
+        <p:txBody>
+          <a:bodyPr/>
+          <a:lstStyle/>
+          <a:p>
+            <a:endParaRPr lang="de-DE" dirty="0"/>
+          </a:p>
+        </p:txBody>
+      </p:sp>
+      <p:sp>
+        <p:nvSpPr>
+          <p:cNvPr id="4" name="Foliennummernplatzhalter 3"/>
+          <p:cNvSpPr>
+            <a:spLocks noGrp="1"/>
+          </p:cNvSpPr>
+          <p:nvPr>
+            <p:ph type="sldNum" sz="quarter" idx="10"/>
+          </p:nvPr>
+        </p:nvSpPr>
+        <p:spPr/>
+        <p:txBody>
+          <a:bodyPr/>
+          <a:lstStyle/>
+          <a:p>
+            <a:fld id="{87E9C61A-9B5E-4580-98DD-1AC874081FFB}" type="slidenum">
+              <a:rPr lang="de-DE" smtClean="0"/>
+              <a:pPr/>
+              <a:t>13</a:t>
+            </a:fld>
+            <a:endParaRPr lang="de-DE"/>
+          </a:p>
+        </p:txBody>
+      </p:sp>
+    </p:spTree>
+    <p:extLst>
+      <p:ext uri="{BB962C8B-B14F-4D97-AF65-F5344CB8AC3E}">
+        <p14:creationId xmlns:p14="http://schemas.microsoft.com/office/powerpoint/2010/main" val="2354681918"/>
+      </p:ext>
+    </p:extLst>
+  </p:cSld>
+  <p:clrMapOvr>
+    <a:masterClrMapping/>
+  </p:clrMapOvr>
+</p:notes>
+</file>
+
+<file path=ppt/notesSlides/notesSlide12.xml><?xml version="1.0" encoding="utf-8"?>
+<p:notes xmlns:a="http://schemas.openxmlformats.org/drawingml/2006/main" xmlns:r="http://schemas.openxmlformats.org/officeDocument/2006/relationships" xmlns:p="http://schemas.openxmlformats.org/presentationml/2006/main">
+  <p:cSld>
+    <p:spTree>
+      <p:nvGrpSpPr>
+        <p:cNvPr id="1" name=""/>
+        <p:cNvGrpSpPr/>
+        <p:nvPr/>
+      </p:nvGrpSpPr>
+      <p:grpSpPr>
+        <a:xfrm>
+          <a:off x="0" y="0"/>
+          <a:ext cx="0" cy="0"/>
+          <a:chOff x="0" y="0"/>
+          <a:chExt cx="0" cy="0"/>
+        </a:xfrm>
+      </p:grpSpPr>
+      <p:sp>
+        <p:nvSpPr>
+          <p:cNvPr id="2" name="Folienbildplatzhalter 1"/>
+          <p:cNvSpPr>
+            <a:spLocks noGrp="1" noRot="1" noChangeAspect="1"/>
+          </p:cNvSpPr>
+          <p:nvPr>
+            <p:ph type="sldImg"/>
+          </p:nvPr>
+        </p:nvSpPr>
+        <p:spPr/>
+      </p:sp>
+      <p:sp>
+        <p:nvSpPr>
+          <p:cNvPr id="3" name="Notizenplatzhalter 2"/>
+          <p:cNvSpPr>
+            <a:spLocks noGrp="1"/>
+          </p:cNvSpPr>
+          <p:nvPr>
+            <p:ph type="body" idx="1"/>
+          </p:nvPr>
+        </p:nvSpPr>
+        <p:spPr/>
+        <p:txBody>
+          <a:bodyPr/>
+          <a:lstStyle/>
+          <a:p>
+            <a:endParaRPr lang="de-DE" dirty="0"/>
+          </a:p>
+        </p:txBody>
+      </p:sp>
+      <p:sp>
+        <p:nvSpPr>
+          <p:cNvPr id="4" name="Foliennummernplatzhalter 3"/>
+          <p:cNvSpPr>
+            <a:spLocks noGrp="1"/>
+          </p:cNvSpPr>
+          <p:nvPr>
+            <p:ph type="sldNum" sz="quarter" idx="10"/>
+          </p:nvPr>
+        </p:nvSpPr>
+        <p:spPr/>
+        <p:txBody>
+          <a:bodyPr/>
+          <a:lstStyle/>
+          <a:p>
+            <a:fld id="{87E9C61A-9B5E-4580-98DD-1AC874081FFB}" type="slidenum">
+              <a:rPr lang="de-DE" smtClean="0"/>
+              <a:pPr/>
+              <a:t>14</a:t>
+            </a:fld>
+            <a:endParaRPr lang="de-DE"/>
+          </a:p>
+        </p:txBody>
+      </p:sp>
+    </p:spTree>
+    <p:extLst>
+      <p:ext uri="{BB962C8B-B14F-4D97-AF65-F5344CB8AC3E}">
+        <p14:creationId xmlns:p14="http://schemas.microsoft.com/office/powerpoint/2010/main" val="669372719"/>
+      </p:ext>
+    </p:extLst>
+  </p:cSld>
+  <p:clrMapOvr>
+    <a:masterClrMapping/>
+  </p:clrMapOvr>
+</p:notes>
+</file>
+
+<file path=ppt/notesSlides/notesSlide13.xml><?xml version="1.0" encoding="utf-8"?>
+<p:notes xmlns:a="http://schemas.openxmlformats.org/drawingml/2006/main" xmlns:r="http://schemas.openxmlformats.org/officeDocument/2006/relationships" xmlns:p="http://schemas.openxmlformats.org/presentationml/2006/main">
+  <p:cSld>
+    <p:spTree>
+      <p:nvGrpSpPr>
+        <p:cNvPr id="1" name=""/>
+        <p:cNvGrpSpPr/>
+        <p:nvPr/>
+      </p:nvGrpSpPr>
+      <p:grpSpPr>
+        <a:xfrm>
+          <a:off x="0" y="0"/>
+          <a:ext cx="0" cy="0"/>
+          <a:chOff x="0" y="0"/>
+          <a:chExt cx="0" cy="0"/>
+        </a:xfrm>
+      </p:grpSpPr>
+      <p:sp>
+        <p:nvSpPr>
+          <p:cNvPr id="2" name="Folienbildplatzhalter 1"/>
+          <p:cNvSpPr>
+            <a:spLocks noGrp="1" noRot="1" noChangeAspect="1"/>
+          </p:cNvSpPr>
+          <p:nvPr>
+            <p:ph type="sldImg"/>
+          </p:nvPr>
+        </p:nvSpPr>
+        <p:spPr/>
+      </p:sp>
+      <p:sp>
+        <p:nvSpPr>
+          <p:cNvPr id="3" name="Notizenplatzhalter 2"/>
+          <p:cNvSpPr>
+            <a:spLocks noGrp="1"/>
+          </p:cNvSpPr>
+          <p:nvPr>
+            <p:ph type="body" idx="1"/>
+          </p:nvPr>
+        </p:nvSpPr>
+        <p:spPr/>
+        <p:txBody>
+          <a:bodyPr/>
+          <a:lstStyle/>
+          <a:p>
+            <a:endParaRPr lang="de-DE" dirty="0"/>
+          </a:p>
+        </p:txBody>
+      </p:sp>
+      <p:sp>
+        <p:nvSpPr>
+          <p:cNvPr id="4" name="Foliennummernplatzhalter 3"/>
+          <p:cNvSpPr>
+            <a:spLocks noGrp="1"/>
+          </p:cNvSpPr>
+          <p:nvPr>
+            <p:ph type="sldNum" sz="quarter" idx="10"/>
+          </p:nvPr>
+        </p:nvSpPr>
+        <p:spPr/>
+        <p:txBody>
+          <a:bodyPr/>
+          <a:lstStyle/>
+          <a:p>
+            <a:fld id="{87E9C61A-9B5E-4580-98DD-1AC874081FFB}" type="slidenum">
+              <a:rPr lang="de-DE" smtClean="0"/>
+              <a:pPr/>
+              <a:t>15</a:t>
+            </a:fld>
+            <a:endParaRPr lang="de-DE"/>
+          </a:p>
+        </p:txBody>
+      </p:sp>
+    </p:spTree>
+    <p:extLst>
+      <p:ext uri="{BB962C8B-B14F-4D97-AF65-F5344CB8AC3E}">
+        <p14:creationId xmlns:p14="http://schemas.microsoft.com/office/powerpoint/2010/main" val="752673120"/>
+      </p:ext>
+    </p:extLst>
+  </p:cSld>
+  <p:clrMapOvr>
+    <a:masterClrMapping/>
+  </p:clrMapOvr>
+</p:notes>
+</file>
+
+<file path=ppt/notesSlides/notesSlide14.xml><?xml version="1.0" encoding="utf-8"?>
+<p:notes xmlns:a="http://schemas.openxmlformats.org/drawingml/2006/main" xmlns:r="http://schemas.openxmlformats.org/officeDocument/2006/relationships" xmlns:p="http://schemas.openxmlformats.org/presentationml/2006/main">
+  <p:cSld>
+    <p:spTree>
+      <p:nvGrpSpPr>
+        <p:cNvPr id="1" name=""/>
+        <p:cNvGrpSpPr/>
+        <p:nvPr/>
+      </p:nvGrpSpPr>
+      <p:grpSpPr>
+        <a:xfrm>
+          <a:off x="0" y="0"/>
+          <a:ext cx="0" cy="0"/>
+          <a:chOff x="0" y="0"/>
+          <a:chExt cx="0" cy="0"/>
+        </a:xfrm>
+      </p:grpSpPr>
+      <p:sp>
+        <p:nvSpPr>
+          <p:cNvPr id="2" name="Folienbildplatzhalter 1"/>
+          <p:cNvSpPr>
+            <a:spLocks noGrp="1" noRot="1" noChangeAspect="1"/>
+          </p:cNvSpPr>
+          <p:nvPr>
+            <p:ph type="sldImg"/>
+          </p:nvPr>
+        </p:nvSpPr>
+        <p:spPr/>
+      </p:sp>
+      <p:sp>
+        <p:nvSpPr>
+          <p:cNvPr id="3" name="Notizenplatzhalter 2"/>
+          <p:cNvSpPr>
+            <a:spLocks noGrp="1"/>
+          </p:cNvSpPr>
+          <p:nvPr>
+            <p:ph type="body" idx="1"/>
+          </p:nvPr>
+        </p:nvSpPr>
+        <p:spPr/>
+        <p:txBody>
+          <a:bodyPr/>
+          <a:lstStyle/>
+          <a:p>
+            <a:endParaRPr lang="de-DE" dirty="0"/>
+          </a:p>
+        </p:txBody>
+      </p:sp>
+      <p:sp>
+        <p:nvSpPr>
+          <p:cNvPr id="4" name="Foliennummernplatzhalter 3"/>
+          <p:cNvSpPr>
+            <a:spLocks noGrp="1"/>
+          </p:cNvSpPr>
+          <p:nvPr>
+            <p:ph type="sldNum" sz="quarter" idx="10"/>
+          </p:nvPr>
+        </p:nvSpPr>
+        <p:spPr/>
+        <p:txBody>
+          <a:bodyPr/>
+          <a:lstStyle/>
+          <a:p>
+            <a:fld id="{87E9C61A-9B5E-4580-98DD-1AC874081FFB}" type="slidenum">
+              <a:rPr lang="de-DE" smtClean="0"/>
+              <a:pPr/>
+              <a:t>16</a:t>
+            </a:fld>
+            <a:endParaRPr lang="de-DE"/>
+          </a:p>
+        </p:txBody>
+      </p:sp>
+    </p:spTree>
+    <p:extLst>
+      <p:ext uri="{BB962C8B-B14F-4D97-AF65-F5344CB8AC3E}">
+        <p14:creationId xmlns:p14="http://schemas.microsoft.com/office/powerpoint/2010/main" val="1348049600"/>
+      </p:ext>
+    </p:extLst>
+  </p:cSld>
+  <p:clrMapOvr>
+    <a:masterClrMapping/>
+  </p:clrMapOvr>
+</p:notes>
+</file>
+
+<file path=ppt/notesSlides/notesSlide15.xml><?xml version="1.0" encoding="utf-8"?>
+<p:notes xmlns:a="http://schemas.openxmlformats.org/drawingml/2006/main" xmlns:r="http://schemas.openxmlformats.org/officeDocument/2006/relationships" xmlns:p="http://schemas.openxmlformats.org/presentationml/2006/main">
+  <p:cSld>
+    <p:spTree>
+      <p:nvGrpSpPr>
+        <p:cNvPr id="1" name=""/>
+        <p:cNvGrpSpPr/>
+        <p:nvPr/>
+      </p:nvGrpSpPr>
+      <p:grpSpPr>
+        <a:xfrm>
+          <a:off x="0" y="0"/>
+          <a:ext cx="0" cy="0"/>
+          <a:chOff x="0" y="0"/>
+          <a:chExt cx="0" cy="0"/>
+        </a:xfrm>
+      </p:grpSpPr>
+      <p:sp>
+        <p:nvSpPr>
+          <p:cNvPr id="2" name="Folienbildplatzhalter 1"/>
+          <p:cNvSpPr>
+            <a:spLocks noGrp="1" noRot="1" noChangeAspect="1"/>
+          </p:cNvSpPr>
+          <p:nvPr>
+            <p:ph type="sldImg"/>
+          </p:nvPr>
+        </p:nvSpPr>
+        <p:spPr/>
+      </p:sp>
+      <p:sp>
+        <p:nvSpPr>
+          <p:cNvPr id="3" name="Notizenplatzhalter 2"/>
+          <p:cNvSpPr>
+            <a:spLocks noGrp="1"/>
+          </p:cNvSpPr>
+          <p:nvPr>
+            <p:ph type="body" idx="1"/>
+          </p:nvPr>
+        </p:nvSpPr>
+        <p:spPr/>
+        <p:txBody>
+          <a:bodyPr/>
+          <a:lstStyle/>
+          <a:p>
+            <a:endParaRPr lang="de-DE" dirty="0"/>
+          </a:p>
+        </p:txBody>
+      </p:sp>
+      <p:sp>
+        <p:nvSpPr>
+          <p:cNvPr id="4" name="Foliennummernplatzhalter 3"/>
+          <p:cNvSpPr>
+            <a:spLocks noGrp="1"/>
+          </p:cNvSpPr>
+          <p:nvPr>
+            <p:ph type="sldNum" sz="quarter" idx="10"/>
+          </p:nvPr>
+        </p:nvSpPr>
+        <p:spPr/>
+        <p:txBody>
+          <a:bodyPr/>
+          <a:lstStyle/>
+          <a:p>
+            <a:fld id="{87E9C61A-9B5E-4580-98DD-1AC874081FFB}" type="slidenum">
+              <a:rPr lang="de-DE" smtClean="0"/>
+              <a:pPr/>
+              <a:t>17</a:t>
+            </a:fld>
+            <a:endParaRPr lang="de-DE"/>
+          </a:p>
+        </p:txBody>
+      </p:sp>
+    </p:spTree>
+    <p:extLst>
+      <p:ext uri="{BB962C8B-B14F-4D97-AF65-F5344CB8AC3E}">
+        <p14:creationId xmlns:p14="http://schemas.microsoft.com/office/powerpoint/2010/main" val="2648054851"/>
+      </p:ext>
+    </p:extLst>
+  </p:cSld>
+  <p:clrMapOvr>
+    <a:masterClrMapping/>
+  </p:clrMapOvr>
+</p:notes>
+</file>
+
 <file path=ppt/notesSlides/notesSlide2.xml><?xml version="1.0" encoding="utf-8"?>
 <p:notes xmlns:a="http://schemas.openxmlformats.org/drawingml/2006/main" xmlns:r="http://schemas.openxmlformats.org/officeDocument/2006/relationships" xmlns:p="http://schemas.openxmlformats.org/presentationml/2006/main">
   <p:cSld>
@@ -995,7 +1511,7 @@
     </p:spTree>
     <p:extLst>
       <p:ext uri="{BB962C8B-B14F-4D97-AF65-F5344CB8AC3E}">
-        <p14:creationId xmlns:p14="http://schemas.microsoft.com/office/powerpoint/2010/main" val="1292271134"/>
+        <p14:creationId xmlns:p14="http://schemas.microsoft.com/office/powerpoint/2010/main" val="1004574314"/>
       </p:ext>
     </p:extLst>
   </p:cSld>
@@ -1080,7 +1596,7 @@
     </p:spTree>
     <p:extLst>
       <p:ext uri="{BB962C8B-B14F-4D97-AF65-F5344CB8AC3E}">
-        <p14:creationId xmlns:p14="http://schemas.microsoft.com/office/powerpoint/2010/main" val="1004574314"/>
+        <p14:creationId xmlns:p14="http://schemas.microsoft.com/office/powerpoint/2010/main" val="2577850142"/>
       </p:ext>
     </p:extLst>
   </p:cSld>
@@ -1165,7 +1681,7 @@
     </p:spTree>
     <p:extLst>
       <p:ext uri="{BB962C8B-B14F-4D97-AF65-F5344CB8AC3E}">
-        <p14:creationId xmlns:p14="http://schemas.microsoft.com/office/powerpoint/2010/main" val="2577850142"/>
+        <p14:creationId xmlns:p14="http://schemas.microsoft.com/office/powerpoint/2010/main" val="2044551413"/>
       </p:ext>
     </p:extLst>
   </p:cSld>
@@ -1250,7 +1766,7 @@
     </p:spTree>
     <p:extLst>
       <p:ext uri="{BB962C8B-B14F-4D97-AF65-F5344CB8AC3E}">
-        <p14:creationId xmlns:p14="http://schemas.microsoft.com/office/powerpoint/2010/main" val="669372719"/>
+        <p14:creationId xmlns:p14="http://schemas.microsoft.com/office/powerpoint/2010/main" val="3531495016"/>
       </p:ext>
     </p:extLst>
   </p:cSld>
@@ -1335,7 +1851,7 @@
     </p:spTree>
     <p:extLst>
       <p:ext uri="{BB962C8B-B14F-4D97-AF65-F5344CB8AC3E}">
-        <p14:creationId xmlns:p14="http://schemas.microsoft.com/office/powerpoint/2010/main" val="752673120"/>
+        <p14:creationId xmlns:p14="http://schemas.microsoft.com/office/powerpoint/2010/main" val="1147172371"/>
       </p:ext>
     </p:extLst>
   </p:cSld>
@@ -1420,7 +1936,7 @@
     </p:spTree>
     <p:extLst>
       <p:ext uri="{BB962C8B-B14F-4D97-AF65-F5344CB8AC3E}">
-        <p14:creationId xmlns:p14="http://schemas.microsoft.com/office/powerpoint/2010/main" val="1348049600"/>
+        <p14:creationId xmlns:p14="http://schemas.microsoft.com/office/powerpoint/2010/main" val="1153979423"/>
       </p:ext>
     </p:extLst>
   </p:cSld>
@@ -1505,7 +2021,7 @@
     </p:spTree>
     <p:extLst>
       <p:ext uri="{BB962C8B-B14F-4D97-AF65-F5344CB8AC3E}">
-        <p14:creationId xmlns:p14="http://schemas.microsoft.com/office/powerpoint/2010/main" val="2648054851"/>
+        <p14:creationId xmlns:p14="http://schemas.microsoft.com/office/powerpoint/2010/main" val="3155964670"/>
       </p:ext>
     </p:extLst>
   </p:cSld>
@@ -5603,16 +6119,23 @@
           <a:lstStyle/>
           <a:p>
             <a:r>
-              <a:rPr lang="de-DE" dirty="0" smtClean="0"/>
-              <a:t>Empfehlenswerte Literatur</a:t>
-            </a:r>
-            <a:endParaRPr lang="de-DE" sz="1800" dirty="0"/>
-          </a:p>
-        </p:txBody>
-      </p:sp>
-      <p:sp>
-        <p:nvSpPr>
-          <p:cNvPr id="3" name="Inhaltsplatzhalter 2"/>
+              <a:rPr lang="de-DE" smtClean="0"/>
+              <a:t>Sicherheitsrisiken </a:t>
+            </a:r>
+            <a:br>
+              <a:rPr lang="de-DE" smtClean="0"/>
+            </a:br>
+            <a:r>
+              <a:rPr lang="de-DE" smtClean="0"/>
+              <a:t>technischer Art</a:t>
+            </a:r>
+            <a:endParaRPr lang="de-DE" dirty="0"/>
+          </a:p>
+        </p:txBody>
+      </p:sp>
+      <p:sp>
+        <p:nvSpPr>
+          <p:cNvPr id="10" name="Inhaltsplatzhalter 9"/>
           <p:cNvSpPr>
             <a:spLocks noGrp="1"/>
           </p:cNvSpPr>
@@ -5629,342 +6152,24 @@
               <a:buNone/>
             </a:pPr>
             <a:r>
-              <a:rPr lang="de-DE" sz="1600" b="1" dirty="0" smtClean="0"/>
-              <a:t>Sicherheitsaspekte virtueller Netzinfrastrukturen</a:t>
-            </a:r>
-          </a:p>
-          <a:p>
-            <a:r>
-              <a:rPr lang="de-DE" sz="1600" dirty="0"/>
-              <a:t>Kamal </a:t>
-            </a:r>
-            <a:r>
-              <a:rPr lang="de-DE" sz="1600" dirty="0" err="1"/>
-              <a:t>Dahbur</a:t>
-            </a:r>
-            <a:r>
-              <a:rPr lang="de-DE" sz="1600" dirty="0"/>
-              <a:t>, </a:t>
-            </a:r>
-            <a:r>
-              <a:rPr lang="de-DE" sz="1600" dirty="0" err="1"/>
-              <a:t>Bassil</a:t>
-            </a:r>
-            <a:r>
-              <a:rPr lang="de-DE" sz="1600" dirty="0"/>
-              <a:t> Mohammad und Ahmad Bisher </a:t>
-            </a:r>
-            <a:r>
-              <a:rPr lang="de-DE" sz="1600" dirty="0" err="1"/>
-              <a:t>Tarakji</a:t>
-            </a:r>
-            <a:r>
-              <a:rPr lang="de-DE" sz="1600" dirty="0"/>
-              <a:t>. A </a:t>
-            </a:r>
-            <a:r>
-              <a:rPr lang="de-DE" sz="1600" dirty="0" err="1"/>
-              <a:t>survey</a:t>
-            </a:r>
-            <a:r>
-              <a:rPr lang="de-DE" sz="1600" dirty="0"/>
-              <a:t> </a:t>
-            </a:r>
-            <a:r>
-              <a:rPr lang="de-DE" sz="1600" dirty="0" err="1"/>
-              <a:t>of</a:t>
-            </a:r>
-            <a:r>
-              <a:rPr lang="de-DE" sz="1600" dirty="0"/>
-              <a:t> </a:t>
-            </a:r>
-            <a:r>
-              <a:rPr lang="de-DE" sz="1600" dirty="0" err="1"/>
-              <a:t>risks</a:t>
-            </a:r>
-            <a:r>
-              <a:rPr lang="de-DE" sz="1600" dirty="0"/>
-              <a:t>, </a:t>
-            </a:r>
-            <a:r>
-              <a:rPr lang="en-US" sz="1600" dirty="0"/>
-              <a:t>threats and vulnerabilities in cloud computing. In </a:t>
-            </a:r>
-            <a:r>
-              <a:rPr lang="en-US" sz="1600" i="1" dirty="0"/>
-              <a:t>Proceedings of the 2011 International </a:t>
-            </a:r>
-            <a:r>
-              <a:rPr lang="de-DE" sz="1600" i="1" dirty="0" err="1"/>
-              <a:t>conference</a:t>
-            </a:r>
-            <a:r>
-              <a:rPr lang="de-DE" sz="1600" i="1" dirty="0"/>
-              <a:t> on intelligent </a:t>
-            </a:r>
-            <a:r>
-              <a:rPr lang="de-DE" sz="1600" i="1" dirty="0" err="1"/>
-              <a:t>semantic</a:t>
-            </a:r>
-            <a:r>
-              <a:rPr lang="de-DE" sz="1600" i="1" dirty="0"/>
-              <a:t> Web-services </a:t>
-            </a:r>
-            <a:r>
-              <a:rPr lang="de-DE" sz="1600" i="1" dirty="0" err="1"/>
-              <a:t>and</a:t>
-            </a:r>
-            <a:r>
-              <a:rPr lang="de-DE" sz="1600" i="1" dirty="0"/>
-              <a:t> </a:t>
-            </a:r>
-            <a:r>
-              <a:rPr lang="de-DE" sz="1600" i="1" dirty="0" err="1"/>
-              <a:t>applications</a:t>
-            </a:r>
-            <a:r>
-              <a:rPr lang="de-DE" sz="1600" dirty="0"/>
-              <a:t>, Seite 12. ACM, 2011.</a:t>
-            </a:r>
-          </a:p>
-          <a:p>
-            <a:r>
-              <a:rPr lang="de-DE" sz="1600" dirty="0" smtClean="0"/>
-              <a:t>Andreas </a:t>
-            </a:r>
-            <a:r>
-              <a:rPr lang="de-DE" sz="1600" dirty="0"/>
-              <a:t>Fischer, Juan Felipe Botero, Michael Till Beck, Hermann De Meer und </a:t>
-            </a:r>
-            <a:r>
-              <a:rPr lang="de-DE" sz="1600" dirty="0" smtClean="0"/>
-              <a:t>Xavier Hesselbach</a:t>
-            </a:r>
-            <a:r>
-              <a:rPr lang="de-DE" sz="1600" dirty="0"/>
-              <a:t>. Virtual </a:t>
-            </a:r>
-            <a:r>
-              <a:rPr lang="de-DE" sz="1600" dirty="0" err="1"/>
-              <a:t>network</a:t>
-            </a:r>
-            <a:r>
-              <a:rPr lang="de-DE" sz="1600" dirty="0"/>
-              <a:t> </a:t>
-            </a:r>
-            <a:r>
-              <a:rPr lang="de-DE" sz="1600" dirty="0" err="1"/>
-              <a:t>embedding</a:t>
-            </a:r>
-            <a:r>
-              <a:rPr lang="de-DE" sz="1600" dirty="0"/>
-              <a:t>: A </a:t>
-            </a:r>
-            <a:r>
-              <a:rPr lang="de-DE" sz="1600" dirty="0" err="1"/>
-              <a:t>survey</a:t>
-            </a:r>
-            <a:r>
-              <a:rPr lang="de-DE" sz="1600" dirty="0"/>
-              <a:t>. </a:t>
-            </a:r>
-            <a:r>
-              <a:rPr lang="de-DE" sz="1600" i="1" dirty="0"/>
-              <a:t>IEEE Communications Surveys </a:t>
-            </a:r>
-            <a:r>
-              <a:rPr lang="de-DE" sz="1600" i="1" dirty="0" smtClean="0"/>
-              <a:t>&amp; Tutorials</a:t>
-            </a:r>
-            <a:r>
-              <a:rPr lang="de-DE" sz="1600" dirty="0"/>
-              <a:t>, 15(4):1888–1906, 2013</a:t>
-            </a:r>
-            <a:r>
-              <a:rPr lang="de-DE" sz="1600" dirty="0" smtClean="0"/>
-              <a:t>.</a:t>
-            </a:r>
-            <a:endParaRPr lang="de-DE" sz="1600" dirty="0"/>
-          </a:p>
-          <a:p>
-            <a:r>
-              <a:rPr lang="de-DE" sz="1600" dirty="0" err="1" smtClean="0"/>
-              <a:t>Shuiqing</a:t>
-            </a:r>
-            <a:r>
-              <a:rPr lang="de-DE" sz="1600" dirty="0" smtClean="0"/>
-              <a:t> </a:t>
-            </a:r>
-            <a:r>
-              <a:rPr lang="de-DE" sz="1600" dirty="0"/>
-              <a:t>Gong, </a:t>
-            </a:r>
-            <a:r>
-              <a:rPr lang="de-DE" sz="1600" dirty="0" err="1"/>
-              <a:t>Jing</a:t>
-            </a:r>
-            <a:r>
-              <a:rPr lang="de-DE" sz="1600" dirty="0"/>
-              <a:t> Chen, </a:t>
-            </a:r>
-            <a:r>
-              <a:rPr lang="de-DE" sz="1600" dirty="0" err="1"/>
-              <a:t>Conghui</a:t>
-            </a:r>
-            <a:r>
-              <a:rPr lang="de-DE" sz="1600" dirty="0"/>
-              <a:t> Huang, </a:t>
-            </a:r>
-            <a:r>
-              <a:rPr lang="de-DE" sz="1600" dirty="0" err="1"/>
-              <a:t>Qingchao</a:t>
-            </a:r>
-            <a:r>
-              <a:rPr lang="de-DE" sz="1600" dirty="0"/>
-              <a:t> Zhu und </a:t>
-            </a:r>
-            <a:r>
-              <a:rPr lang="de-DE" sz="1600" dirty="0" err="1"/>
-              <a:t>Siyi</a:t>
-            </a:r>
-            <a:r>
-              <a:rPr lang="de-DE" sz="1600" dirty="0"/>
-              <a:t> Zhao. Virtual </a:t>
-            </a:r>
-            <a:r>
-              <a:rPr lang="en-US" sz="1600" dirty="0"/>
-              <a:t>Network Embedding through Security Risk Awareness and Optimization. </a:t>
-            </a:r>
-            <a:r>
-              <a:rPr lang="en-US" sz="1600" i="1" dirty="0"/>
-              <a:t>KSII Transactions </a:t>
-            </a:r>
-            <a:r>
-              <a:rPr lang="de-DE" sz="1600" i="1" dirty="0"/>
-              <a:t>on Internet &amp; Information Systems</a:t>
-            </a:r>
-            <a:r>
-              <a:rPr lang="de-DE" sz="1600" dirty="0"/>
-              <a:t>, 10(7), 2016.</a:t>
-            </a:r>
-            <a:endParaRPr lang="de-DE" sz="1600" dirty="0" smtClean="0"/>
-          </a:p>
-          <a:p>
-            <a:endParaRPr lang="de-DE" sz="1600" dirty="0" smtClean="0"/>
+              <a:rPr lang="de-DE" dirty="0" smtClean="0"/>
+              <a:t>Von VN/VM ausgehend…</a:t>
+            </a:r>
           </a:p>
           <a:p>
             <a:pPr marL="0" indent="0">
               <a:buNone/>
             </a:pPr>
             <a:r>
-              <a:rPr lang="de-DE" sz="1600" b="1" dirty="0" smtClean="0"/>
-              <a:t>Untersuchte Algorithmen</a:t>
-            </a:r>
-            <a:endParaRPr lang="de-DE" sz="1600" b="1" dirty="0" smtClean="0"/>
-          </a:p>
-          <a:p>
-            <a:r>
-              <a:rPr lang="de-DE" sz="1600" dirty="0" smtClean="0"/>
-              <a:t>Hong </a:t>
-            </a:r>
-            <a:r>
-              <a:rPr lang="de-DE" sz="1600" dirty="0" err="1"/>
-              <a:t>Xu</a:t>
-            </a:r>
-            <a:r>
-              <a:rPr lang="de-DE" sz="1600" dirty="0"/>
-              <a:t> Ming </a:t>
-            </a:r>
-            <a:r>
-              <a:rPr lang="de-DE" sz="1600" dirty="0" err="1"/>
-              <a:t>Xu</a:t>
-            </a:r>
-            <a:r>
-              <a:rPr lang="de-DE" sz="1600" dirty="0"/>
+              <a:rPr lang="de-DE" dirty="0" smtClean="0"/>
+              <a:t>	… gegen User</a:t>
+            </a:r>
+          </a:p>
+          <a:p>
+            <a:r>
+              <a:rPr lang="de-DE" dirty="0"/>
               <a:t> </a:t>
             </a:r>
-            <a:r>
-              <a:rPr lang="de-DE" sz="1600" dirty="0" err="1"/>
-              <a:t>Shuhao</a:t>
-            </a:r>
-            <a:r>
-              <a:rPr lang="de-DE" sz="1600" dirty="0"/>
-              <a:t> Liu, </a:t>
-            </a:r>
-            <a:r>
-              <a:rPr lang="de-DE" sz="1600" dirty="0" err="1"/>
-              <a:t>Zhiping</a:t>
-            </a:r>
-            <a:r>
-              <a:rPr lang="de-DE" sz="1600" dirty="0"/>
-              <a:t> Cai. </a:t>
-            </a:r>
-            <a:r>
-              <a:rPr lang="de-DE" sz="1600" dirty="0" err="1"/>
-              <a:t>Towards</a:t>
-            </a:r>
-            <a:r>
-              <a:rPr lang="de-DE" sz="1600" dirty="0"/>
-              <a:t> Security-aware Virtual </a:t>
-            </a:r>
-            <a:r>
-              <a:rPr lang="de-DE" sz="1600" dirty="0" smtClean="0"/>
-              <a:t>Network Embedding</a:t>
-            </a:r>
-            <a:r>
-              <a:rPr lang="de-DE" sz="1600" dirty="0"/>
-              <a:t>, 2015</a:t>
-            </a:r>
-            <a:r>
-              <a:rPr lang="de-DE" sz="1600" dirty="0" smtClean="0"/>
-              <a:t>.</a:t>
-            </a:r>
-          </a:p>
-          <a:p>
-            <a:r>
-              <a:rPr lang="en-US" sz="1600" dirty="0" smtClean="0"/>
-              <a:t>Yang </a:t>
-            </a:r>
-            <a:r>
-              <a:rPr lang="en-US" sz="1600" dirty="0"/>
-              <a:t>Wang, </a:t>
-            </a:r>
-            <a:r>
-              <a:rPr lang="en-US" sz="1600" dirty="0" err="1"/>
-              <a:t>Phanvu</a:t>
-            </a:r>
-            <a:r>
-              <a:rPr lang="en-US" sz="1600" dirty="0"/>
-              <a:t> Chau und </a:t>
-            </a:r>
-            <a:r>
-              <a:rPr lang="en-US" sz="1600" dirty="0" err="1"/>
-              <a:t>Fuyu</a:t>
-            </a:r>
-            <a:r>
-              <a:rPr lang="en-US" sz="1600" dirty="0"/>
-              <a:t> Chen. Towards a secured network </a:t>
-            </a:r>
-            <a:r>
-              <a:rPr lang="en-US" sz="1600" dirty="0" smtClean="0"/>
-              <a:t>virtualization. </a:t>
-            </a:r>
-            <a:r>
-              <a:rPr lang="de-DE" sz="1600" i="1" dirty="0" smtClean="0"/>
-              <a:t>Computer </a:t>
-            </a:r>
-            <a:r>
-              <a:rPr lang="de-DE" sz="1600" i="1" dirty="0"/>
-              <a:t>Networks</a:t>
-            </a:r>
-            <a:r>
-              <a:rPr lang="de-DE" sz="1600" dirty="0"/>
-              <a:t>, 104:55–65, 2016.</a:t>
-            </a:r>
-            <a:endParaRPr lang="de-DE" sz="1600" dirty="0" smtClean="0"/>
-          </a:p>
-          <a:p>
-            <a:endParaRPr lang="de-DE" sz="1600" dirty="0"/>
           </a:p>
         </p:txBody>
       </p:sp>
@@ -5983,14 +6188,9 @@
           <a:bodyPr/>
           <a:lstStyle/>
           <a:p>
-            <a:pPr>
-              <a:defRPr/>
-            </a:pPr>
             <a:fld id="{70BFFA52-4234-45F6-B1A6-074E24FF43A2}" type="slidenum">
               <a:rPr lang="de-DE" smtClean="0"/>
-              <a:pPr>
-                <a:defRPr/>
-              </a:pPr>
+              <a:pPr/>
               <a:t>10</a:t>
             </a:fld>
             <a:endParaRPr lang="de-DE" dirty="0"/>
@@ -6020,10 +6220,96 @@
           </a:p>
         </p:txBody>
       </p:sp>
+      <p:pic>
+        <p:nvPicPr>
+          <p:cNvPr id="14" name="Grafik 13"/>
+          <p:cNvPicPr>
+            <a:picLocks noChangeAspect="1"/>
+          </p:cNvPicPr>
+          <p:nvPr/>
+        </p:nvPicPr>
+        <p:blipFill rotWithShape="1">
+          <a:blip r:embed="rId3"/>
+          <a:srcRect l="34338" t="61198" r="34767"/>
+          <a:stretch/>
+        </p:blipFill>
+        <p:spPr>
+          <a:xfrm>
+            <a:off x="6876952" y="1347759"/>
+            <a:ext cx="2016224" cy="1963218"/>
+          </a:xfrm>
+          <a:prstGeom prst="rect">
+            <a:avLst/>
+          </a:prstGeom>
+        </p:spPr>
+      </p:pic>
+      <p:sp>
+        <p:nvSpPr>
+          <p:cNvPr id="3" name="Rechteck 2"/>
+          <p:cNvSpPr/>
+          <p:nvPr/>
+        </p:nvSpPr>
+        <p:spPr bwMode="auto">
+          <a:xfrm>
+            <a:off x="7452320" y="2898884"/>
+            <a:ext cx="1368152" cy="306000"/>
+          </a:xfrm>
+          <a:prstGeom prst="rect">
+            <a:avLst/>
+          </a:prstGeom>
+          <a:noFill/>
+          <a:ln w="38100" cap="flat" cmpd="sng" algn="ctr">
+            <a:solidFill>
+              <a:srgbClr val="006C30"/>
+            </a:solidFill>
+            <a:prstDash val="solid"/>
+            <a:round/>
+            <a:headEnd type="none" w="med" len="med"/>
+            <a:tailEnd type="none" w="med" len="med"/>
+          </a:ln>
+          <a:effectLst/>
+        </p:spPr>
+        <p:txBody>
+          <a:bodyPr vert="horz" wrap="square" lIns="91440" tIns="45720" rIns="91440" bIns="45720" numCol="1" rtlCol="0" anchor="ctr" anchorCtr="0" compatLnSpc="1">
+            <a:prstTxWarp prst="textNoShape">
+              <a:avLst/>
+            </a:prstTxWarp>
+          </a:bodyPr>
+          <a:lstStyle/>
+          <a:p>
+            <a:pPr marL="0" marR="0" indent="0" algn="l" defTabSz="914400" rtl="0" eaLnBrk="0" fontAlgn="base" latinLnBrk="0" hangingPunct="0">
+              <a:lnSpc>
+                <a:spcPct val="100000"/>
+              </a:lnSpc>
+              <a:spcBef>
+                <a:spcPct val="0"/>
+              </a:spcBef>
+              <a:spcAft>
+                <a:spcPct val="0"/>
+              </a:spcAft>
+              <a:buClrTx/>
+              <a:buSzTx/>
+              <a:buFontTx/>
+              <a:buNone/>
+              <a:tabLst/>
+            </a:pPr>
+            <a:endParaRPr kumimoji="0" lang="de-DE" sz="1400" b="0" i="0" u="none" strike="noStrike" cap="none" normalizeH="0" baseline="0" smtClean="0">
+              <a:ln>
+                <a:noFill/>
+              </a:ln>
+              <a:solidFill>
+                <a:schemeClr val="tx1"/>
+              </a:solidFill>
+              <a:effectLst/>
+              <a:latin typeface="LMU CompatilFact" pitchFamily="2" charset="0"/>
+            </a:endParaRPr>
+          </a:p>
+        </p:txBody>
+      </p:sp>
     </p:spTree>
     <p:extLst>
       <p:ext uri="{BB962C8B-B14F-4D97-AF65-F5344CB8AC3E}">
-        <p14:creationId xmlns:p14="http://schemas.microsoft.com/office/powerpoint/2010/main" val="2073930859"/>
+        <p14:creationId xmlns:p14="http://schemas.microsoft.com/office/powerpoint/2010/main" val="329269630"/>
       </p:ext>
     </p:extLst>
   </p:cSld>
@@ -6074,8 +6360,643 @@
           <a:lstStyle/>
           <a:p>
             <a:r>
+              <a:rPr lang="de-DE" smtClean="0"/>
+              <a:t>Sicherheitsrisiken </a:t>
+            </a:r>
+            <a:br>
+              <a:rPr lang="de-DE" smtClean="0"/>
+            </a:br>
+            <a:r>
+              <a:rPr lang="de-DE" smtClean="0"/>
+              <a:t>technischer Art</a:t>
+            </a:r>
+            <a:endParaRPr lang="de-DE" dirty="0"/>
+          </a:p>
+        </p:txBody>
+      </p:sp>
+      <p:sp>
+        <p:nvSpPr>
+          <p:cNvPr id="10" name="Inhaltsplatzhalter 9"/>
+          <p:cNvSpPr>
+            <a:spLocks noGrp="1"/>
+          </p:cNvSpPr>
+          <p:nvPr>
+            <p:ph idx="1"/>
+          </p:nvPr>
+        </p:nvSpPr>
+        <p:spPr/>
+        <p:txBody>
+          <a:bodyPr/>
+          <a:lstStyle/>
+          <a:p>
+            <a:pPr marL="0" indent="0">
+              <a:buNone/>
+            </a:pPr>
+            <a:r>
               <a:rPr lang="de-DE" dirty="0" smtClean="0"/>
-              <a:t>Diskussion</a:t>
+              <a:t>Vom User ausgehend…</a:t>
+            </a:r>
+          </a:p>
+          <a:p>
+            <a:pPr marL="0" indent="0">
+              <a:buNone/>
+            </a:pPr>
+            <a:r>
+              <a:rPr lang="de-DE" dirty="0" smtClean="0"/>
+              <a:t>	… gegen NI</a:t>
+            </a:r>
+          </a:p>
+          <a:p>
+            <a:r>
+              <a:rPr lang="de-DE" dirty="0"/>
+              <a:t> </a:t>
+            </a:r>
+          </a:p>
+        </p:txBody>
+      </p:sp>
+      <p:sp>
+        <p:nvSpPr>
+          <p:cNvPr id="4" name="Foliennummernplatzhalter 3"/>
+          <p:cNvSpPr>
+            <a:spLocks noGrp="1"/>
+          </p:cNvSpPr>
+          <p:nvPr>
+            <p:ph type="sldNum" sz="quarter" idx="4"/>
+          </p:nvPr>
+        </p:nvSpPr>
+        <p:spPr/>
+        <p:txBody>
+          <a:bodyPr/>
+          <a:lstStyle/>
+          <a:p>
+            <a:fld id="{70BFFA52-4234-45F6-B1A6-074E24FF43A2}" type="slidenum">
+              <a:rPr lang="de-DE" smtClean="0"/>
+              <a:pPr/>
+              <a:t>11</a:t>
+            </a:fld>
+            <a:endParaRPr lang="de-DE" dirty="0"/>
+          </a:p>
+        </p:txBody>
+      </p:sp>
+      <p:sp>
+        <p:nvSpPr>
+          <p:cNvPr id="5" name="Fußzeilenplatzhalter 4"/>
+          <p:cNvSpPr>
+            <a:spLocks noGrp="1"/>
+          </p:cNvSpPr>
+          <p:nvPr>
+            <p:ph type="ftr" sz="quarter" idx="3"/>
+          </p:nvPr>
+        </p:nvSpPr>
+        <p:spPr/>
+        <p:txBody>
+          <a:bodyPr/>
+          <a:lstStyle/>
+          <a:p>
+            <a:r>
+              <a:rPr lang="de-DE" smtClean="0"/>
+              <a:t>Sicherheitsaspekte beim Deployment virtueller Netzinfrastrukturen</a:t>
+            </a:r>
+            <a:endParaRPr lang="de-DE" dirty="0"/>
+          </a:p>
+        </p:txBody>
+      </p:sp>
+      <p:pic>
+        <p:nvPicPr>
+          <p:cNvPr id="14" name="Grafik 13"/>
+          <p:cNvPicPr>
+            <a:picLocks noChangeAspect="1"/>
+          </p:cNvPicPr>
+          <p:nvPr/>
+        </p:nvPicPr>
+        <p:blipFill rotWithShape="1">
+          <a:blip r:embed="rId3"/>
+          <a:srcRect l="69084" t="61198" r="572"/>
+          <a:stretch/>
+        </p:blipFill>
+        <p:spPr>
+          <a:xfrm>
+            <a:off x="6876256" y="1347759"/>
+            <a:ext cx="1980220" cy="1963218"/>
+          </a:xfrm>
+          <a:prstGeom prst="rect">
+            <a:avLst/>
+          </a:prstGeom>
+        </p:spPr>
+      </p:pic>
+      <p:sp>
+        <p:nvSpPr>
+          <p:cNvPr id="3" name="Rechteck 2"/>
+          <p:cNvSpPr/>
+          <p:nvPr/>
+        </p:nvSpPr>
+        <p:spPr bwMode="auto">
+          <a:xfrm>
+            <a:off x="7443084" y="2024844"/>
+            <a:ext cx="1368152" cy="306000"/>
+          </a:xfrm>
+          <a:prstGeom prst="rect">
+            <a:avLst/>
+          </a:prstGeom>
+          <a:noFill/>
+          <a:ln w="38100" cap="flat" cmpd="sng" algn="ctr">
+            <a:solidFill>
+              <a:srgbClr val="006C30"/>
+            </a:solidFill>
+            <a:prstDash val="solid"/>
+            <a:round/>
+            <a:headEnd type="none" w="med" len="med"/>
+            <a:tailEnd type="none" w="med" len="med"/>
+          </a:ln>
+          <a:effectLst/>
+        </p:spPr>
+        <p:txBody>
+          <a:bodyPr vert="horz" wrap="square" lIns="91440" tIns="45720" rIns="91440" bIns="45720" numCol="1" rtlCol="0" anchor="ctr" anchorCtr="0" compatLnSpc="1">
+            <a:prstTxWarp prst="textNoShape">
+              <a:avLst/>
+            </a:prstTxWarp>
+          </a:bodyPr>
+          <a:lstStyle/>
+          <a:p>
+            <a:pPr marL="0" marR="0" indent="0" algn="l" defTabSz="914400" rtl="0" eaLnBrk="0" fontAlgn="base" latinLnBrk="0" hangingPunct="0">
+              <a:lnSpc>
+                <a:spcPct val="100000"/>
+              </a:lnSpc>
+              <a:spcBef>
+                <a:spcPct val="0"/>
+              </a:spcBef>
+              <a:spcAft>
+                <a:spcPct val="0"/>
+              </a:spcAft>
+              <a:buClrTx/>
+              <a:buSzTx/>
+              <a:buFontTx/>
+              <a:buNone/>
+              <a:tabLst/>
+            </a:pPr>
+            <a:endParaRPr kumimoji="0" lang="de-DE" sz="1400" b="0" i="0" u="none" strike="noStrike" cap="none" normalizeH="0" baseline="0" smtClean="0">
+              <a:ln>
+                <a:noFill/>
+              </a:ln>
+              <a:solidFill>
+                <a:schemeClr val="tx1"/>
+              </a:solidFill>
+              <a:effectLst/>
+              <a:latin typeface="LMU CompatilFact" pitchFamily="2" charset="0"/>
+            </a:endParaRPr>
+          </a:p>
+        </p:txBody>
+      </p:sp>
+    </p:spTree>
+    <p:extLst>
+      <p:ext uri="{BB962C8B-B14F-4D97-AF65-F5344CB8AC3E}">
+        <p14:creationId xmlns:p14="http://schemas.microsoft.com/office/powerpoint/2010/main" val="1342727465"/>
+      </p:ext>
+    </p:extLst>
+  </p:cSld>
+  <p:clrMapOvr>
+    <a:masterClrMapping/>
+  </p:clrMapOvr>
+  <p:transition spd="med"/>
+  <p:timing>
+    <p:tnLst>
+      <p:par>
+        <p:cTn id="1" dur="indefinite" restart="never" nodeType="tmRoot"/>
+      </p:par>
+    </p:tnLst>
+  </p:timing>
+</p:sld>
+</file>
+
+<file path=ppt/slides/slide12.xml><?xml version="1.0" encoding="utf-8"?>
+<p:sld xmlns:a="http://schemas.openxmlformats.org/drawingml/2006/main" xmlns:r="http://schemas.openxmlformats.org/officeDocument/2006/relationships" xmlns:p="http://schemas.openxmlformats.org/presentationml/2006/main">
+  <p:cSld>
+    <p:spTree>
+      <p:nvGrpSpPr>
+        <p:cNvPr id="1" name=""/>
+        <p:cNvGrpSpPr/>
+        <p:nvPr/>
+      </p:nvGrpSpPr>
+      <p:grpSpPr>
+        <a:xfrm>
+          <a:off x="0" y="0"/>
+          <a:ext cx="0" cy="0"/>
+          <a:chOff x="0" y="0"/>
+          <a:chExt cx="0" cy="0"/>
+        </a:xfrm>
+      </p:grpSpPr>
+      <p:sp>
+        <p:nvSpPr>
+          <p:cNvPr id="2" name="Titel 1"/>
+          <p:cNvSpPr>
+            <a:spLocks noGrp="1"/>
+          </p:cNvSpPr>
+          <p:nvPr>
+            <p:ph type="title"/>
+          </p:nvPr>
+        </p:nvSpPr>
+        <p:spPr/>
+        <p:txBody>
+          <a:bodyPr/>
+          <a:lstStyle/>
+          <a:p>
+            <a:r>
+              <a:rPr lang="de-DE" smtClean="0"/>
+              <a:t>Sicherheitsrisiken </a:t>
+            </a:r>
+            <a:br>
+              <a:rPr lang="de-DE" smtClean="0"/>
+            </a:br>
+            <a:r>
+              <a:rPr lang="de-DE" smtClean="0"/>
+              <a:t>technischer Art</a:t>
+            </a:r>
+            <a:endParaRPr lang="de-DE" dirty="0"/>
+          </a:p>
+        </p:txBody>
+      </p:sp>
+      <p:sp>
+        <p:nvSpPr>
+          <p:cNvPr id="10" name="Inhaltsplatzhalter 9"/>
+          <p:cNvSpPr>
+            <a:spLocks noGrp="1"/>
+          </p:cNvSpPr>
+          <p:nvPr>
+            <p:ph idx="1"/>
+          </p:nvPr>
+        </p:nvSpPr>
+        <p:spPr/>
+        <p:txBody>
+          <a:bodyPr/>
+          <a:lstStyle/>
+          <a:p>
+            <a:pPr marL="0" indent="0">
+              <a:buNone/>
+            </a:pPr>
+            <a:r>
+              <a:rPr lang="de-DE" dirty="0" smtClean="0"/>
+              <a:t>Vom User ausgehend…</a:t>
+            </a:r>
+          </a:p>
+          <a:p>
+            <a:pPr marL="0" indent="0">
+              <a:buNone/>
+            </a:pPr>
+            <a:r>
+              <a:rPr lang="de-DE" dirty="0" smtClean="0"/>
+              <a:t>	… gegen VN/VM</a:t>
+            </a:r>
+          </a:p>
+          <a:p>
+            <a:r>
+              <a:rPr lang="de-DE" dirty="0"/>
+              <a:t> </a:t>
+            </a:r>
+          </a:p>
+        </p:txBody>
+      </p:sp>
+      <p:sp>
+        <p:nvSpPr>
+          <p:cNvPr id="4" name="Foliennummernplatzhalter 3"/>
+          <p:cNvSpPr>
+            <a:spLocks noGrp="1"/>
+          </p:cNvSpPr>
+          <p:nvPr>
+            <p:ph type="sldNum" sz="quarter" idx="4"/>
+          </p:nvPr>
+        </p:nvSpPr>
+        <p:spPr/>
+        <p:txBody>
+          <a:bodyPr/>
+          <a:lstStyle/>
+          <a:p>
+            <a:fld id="{70BFFA52-4234-45F6-B1A6-074E24FF43A2}" type="slidenum">
+              <a:rPr lang="de-DE" smtClean="0"/>
+              <a:pPr/>
+              <a:t>12</a:t>
+            </a:fld>
+            <a:endParaRPr lang="de-DE" dirty="0"/>
+          </a:p>
+        </p:txBody>
+      </p:sp>
+      <p:sp>
+        <p:nvSpPr>
+          <p:cNvPr id="5" name="Fußzeilenplatzhalter 4"/>
+          <p:cNvSpPr>
+            <a:spLocks noGrp="1"/>
+          </p:cNvSpPr>
+          <p:nvPr>
+            <p:ph type="ftr" sz="quarter" idx="3"/>
+          </p:nvPr>
+        </p:nvSpPr>
+        <p:spPr/>
+        <p:txBody>
+          <a:bodyPr/>
+          <a:lstStyle/>
+          <a:p>
+            <a:r>
+              <a:rPr lang="de-DE" smtClean="0"/>
+              <a:t>Sicherheitsaspekte beim Deployment virtueller Netzinfrastrukturen</a:t>
+            </a:r>
+            <a:endParaRPr lang="de-DE" dirty="0"/>
+          </a:p>
+        </p:txBody>
+      </p:sp>
+      <p:pic>
+        <p:nvPicPr>
+          <p:cNvPr id="14" name="Grafik 13"/>
+          <p:cNvPicPr>
+            <a:picLocks noChangeAspect="1"/>
+          </p:cNvPicPr>
+          <p:nvPr/>
+        </p:nvPicPr>
+        <p:blipFill rotWithShape="1">
+          <a:blip r:embed="rId3"/>
+          <a:srcRect l="69084" t="61198" r="572"/>
+          <a:stretch/>
+        </p:blipFill>
+        <p:spPr>
+          <a:xfrm>
+            <a:off x="6876256" y="1347759"/>
+            <a:ext cx="1980220" cy="1963218"/>
+          </a:xfrm>
+          <a:prstGeom prst="rect">
+            <a:avLst/>
+          </a:prstGeom>
+        </p:spPr>
+      </p:pic>
+      <p:sp>
+        <p:nvSpPr>
+          <p:cNvPr id="3" name="Rechteck 2"/>
+          <p:cNvSpPr/>
+          <p:nvPr/>
+        </p:nvSpPr>
+        <p:spPr bwMode="auto">
+          <a:xfrm>
+            <a:off x="7443084" y="2470746"/>
+            <a:ext cx="1368152" cy="306000"/>
+          </a:xfrm>
+          <a:prstGeom prst="rect">
+            <a:avLst/>
+          </a:prstGeom>
+          <a:noFill/>
+          <a:ln w="38100" cap="flat" cmpd="sng" algn="ctr">
+            <a:solidFill>
+              <a:srgbClr val="006C30"/>
+            </a:solidFill>
+            <a:prstDash val="solid"/>
+            <a:round/>
+            <a:headEnd type="none" w="med" len="med"/>
+            <a:tailEnd type="none" w="med" len="med"/>
+          </a:ln>
+          <a:effectLst/>
+        </p:spPr>
+        <p:txBody>
+          <a:bodyPr vert="horz" wrap="square" lIns="91440" tIns="45720" rIns="91440" bIns="45720" numCol="1" rtlCol="0" anchor="ctr" anchorCtr="0" compatLnSpc="1">
+            <a:prstTxWarp prst="textNoShape">
+              <a:avLst/>
+            </a:prstTxWarp>
+          </a:bodyPr>
+          <a:lstStyle/>
+          <a:p>
+            <a:pPr marL="0" marR="0" indent="0" algn="l" defTabSz="914400" rtl="0" eaLnBrk="0" fontAlgn="base" latinLnBrk="0" hangingPunct="0">
+              <a:lnSpc>
+                <a:spcPct val="100000"/>
+              </a:lnSpc>
+              <a:spcBef>
+                <a:spcPct val="0"/>
+              </a:spcBef>
+              <a:spcAft>
+                <a:spcPct val="0"/>
+              </a:spcAft>
+              <a:buClrTx/>
+              <a:buSzTx/>
+              <a:buFontTx/>
+              <a:buNone/>
+              <a:tabLst/>
+            </a:pPr>
+            <a:endParaRPr kumimoji="0" lang="de-DE" sz="1400" b="0" i="0" u="none" strike="noStrike" cap="none" normalizeH="0" baseline="0" smtClean="0">
+              <a:ln>
+                <a:noFill/>
+              </a:ln>
+              <a:solidFill>
+                <a:schemeClr val="tx1"/>
+              </a:solidFill>
+              <a:effectLst/>
+              <a:latin typeface="LMU CompatilFact" pitchFamily="2" charset="0"/>
+            </a:endParaRPr>
+          </a:p>
+        </p:txBody>
+      </p:sp>
+    </p:spTree>
+    <p:extLst>
+      <p:ext uri="{BB962C8B-B14F-4D97-AF65-F5344CB8AC3E}">
+        <p14:creationId xmlns:p14="http://schemas.microsoft.com/office/powerpoint/2010/main" val="999610874"/>
+      </p:ext>
+    </p:extLst>
+  </p:cSld>
+  <p:clrMapOvr>
+    <a:masterClrMapping/>
+  </p:clrMapOvr>
+  <p:transition spd="med"/>
+  <p:timing>
+    <p:tnLst>
+      <p:par>
+        <p:cTn id="1" dur="indefinite" restart="never" nodeType="tmRoot"/>
+      </p:par>
+    </p:tnLst>
+  </p:timing>
+</p:sld>
+</file>
+
+<file path=ppt/slides/slide13.xml><?xml version="1.0" encoding="utf-8"?>
+<p:sld xmlns:a="http://schemas.openxmlformats.org/drawingml/2006/main" xmlns:r="http://schemas.openxmlformats.org/officeDocument/2006/relationships" xmlns:p="http://schemas.openxmlformats.org/presentationml/2006/main">
+  <p:cSld>
+    <p:spTree>
+      <p:nvGrpSpPr>
+        <p:cNvPr id="1" name=""/>
+        <p:cNvGrpSpPr/>
+        <p:nvPr/>
+      </p:nvGrpSpPr>
+      <p:grpSpPr>
+        <a:xfrm>
+          <a:off x="0" y="0"/>
+          <a:ext cx="0" cy="0"/>
+          <a:chOff x="0" y="0"/>
+          <a:chExt cx="0" cy="0"/>
+        </a:xfrm>
+      </p:grpSpPr>
+      <p:sp>
+        <p:nvSpPr>
+          <p:cNvPr id="2" name="Titel 1"/>
+          <p:cNvSpPr>
+            <a:spLocks noGrp="1"/>
+          </p:cNvSpPr>
+          <p:nvPr>
+            <p:ph type="title"/>
+          </p:nvPr>
+        </p:nvSpPr>
+        <p:spPr/>
+        <p:txBody>
+          <a:bodyPr/>
+          <a:lstStyle/>
+          <a:p>
+            <a:r>
+              <a:rPr lang="de-DE" dirty="0" smtClean="0"/>
+              <a:t>Sicherheitsrisiken </a:t>
+            </a:r>
+            <a:br>
+              <a:rPr lang="de-DE" dirty="0" smtClean="0"/>
+            </a:br>
+            <a:r>
+              <a:rPr lang="de-DE" dirty="0" smtClean="0"/>
+              <a:t>organisatorischer un</a:t>
+            </a:r>
+            <a:r>
+              <a:rPr lang="de-DE" dirty="0" smtClean="0"/>
+              <a:t>d rechtlicher </a:t>
+            </a:r>
+            <a:r>
+              <a:rPr lang="de-DE" dirty="0" smtClean="0"/>
+              <a:t>Art</a:t>
+            </a:r>
+            <a:endParaRPr lang="de-DE" dirty="0"/>
+          </a:p>
+        </p:txBody>
+      </p:sp>
+      <p:sp>
+        <p:nvSpPr>
+          <p:cNvPr id="10" name="Inhaltsplatzhalter 9"/>
+          <p:cNvSpPr>
+            <a:spLocks noGrp="1"/>
+          </p:cNvSpPr>
+          <p:nvPr>
+            <p:ph idx="1"/>
+          </p:nvPr>
+        </p:nvSpPr>
+        <p:spPr/>
+        <p:txBody>
+          <a:bodyPr/>
+          <a:lstStyle/>
+          <a:p>
+            <a:endParaRPr lang="de-DE" dirty="0"/>
+          </a:p>
+        </p:txBody>
+      </p:sp>
+      <p:sp>
+        <p:nvSpPr>
+          <p:cNvPr id="4" name="Foliennummernplatzhalter 3"/>
+          <p:cNvSpPr>
+            <a:spLocks noGrp="1"/>
+          </p:cNvSpPr>
+          <p:nvPr>
+            <p:ph type="sldNum" sz="quarter" idx="4"/>
+          </p:nvPr>
+        </p:nvSpPr>
+        <p:spPr/>
+        <p:txBody>
+          <a:bodyPr/>
+          <a:lstStyle/>
+          <a:p>
+            <a:fld id="{70BFFA52-4234-45F6-B1A6-074E24FF43A2}" type="slidenum">
+              <a:rPr lang="de-DE" smtClean="0"/>
+              <a:pPr/>
+              <a:t>13</a:t>
+            </a:fld>
+            <a:endParaRPr lang="de-DE" dirty="0"/>
+          </a:p>
+        </p:txBody>
+      </p:sp>
+      <p:sp>
+        <p:nvSpPr>
+          <p:cNvPr id="5" name="Fußzeilenplatzhalter 4"/>
+          <p:cNvSpPr>
+            <a:spLocks noGrp="1"/>
+          </p:cNvSpPr>
+          <p:nvPr>
+            <p:ph type="ftr" sz="quarter" idx="3"/>
+          </p:nvPr>
+        </p:nvSpPr>
+        <p:spPr/>
+        <p:txBody>
+          <a:bodyPr/>
+          <a:lstStyle/>
+          <a:p>
+            <a:r>
+              <a:rPr lang="de-DE" smtClean="0"/>
+              <a:t>Sicherheitsaspekte beim Deployment virtueller Netzinfrastrukturen</a:t>
+            </a:r>
+            <a:endParaRPr lang="de-DE" dirty="0"/>
+          </a:p>
+        </p:txBody>
+      </p:sp>
+    </p:spTree>
+    <p:extLst>
+      <p:ext uri="{BB962C8B-B14F-4D97-AF65-F5344CB8AC3E}">
+        <p14:creationId xmlns:p14="http://schemas.microsoft.com/office/powerpoint/2010/main" val="4077777281"/>
+      </p:ext>
+    </p:extLst>
+  </p:cSld>
+  <p:clrMapOvr>
+    <a:masterClrMapping/>
+  </p:clrMapOvr>
+  <p:transition spd="med"/>
+  <p:timing>
+    <p:tnLst>
+      <p:par>
+        <p:cTn id="1" dur="indefinite" restart="never" nodeType="tmRoot"/>
+      </p:par>
+    </p:tnLst>
+  </p:timing>
+</p:sld>
+</file>
+
+<file path=ppt/slides/slide14.xml><?xml version="1.0" encoding="utf-8"?>
+<p:sld xmlns:a="http://schemas.openxmlformats.org/drawingml/2006/main" xmlns:r="http://schemas.openxmlformats.org/officeDocument/2006/relationships" xmlns:p="http://schemas.openxmlformats.org/presentationml/2006/main">
+  <p:cSld>
+    <p:spTree>
+      <p:nvGrpSpPr>
+        <p:cNvPr id="1" name=""/>
+        <p:cNvGrpSpPr/>
+        <p:nvPr/>
+      </p:nvGrpSpPr>
+      <p:grpSpPr>
+        <a:xfrm>
+          <a:off x="0" y="0"/>
+          <a:ext cx="0" cy="0"/>
+          <a:chOff x="0" y="0"/>
+          <a:chExt cx="0" cy="0"/>
+        </a:xfrm>
+      </p:grpSpPr>
+      <p:sp>
+        <p:nvSpPr>
+          <p:cNvPr id="2" name="Titel 1"/>
+          <p:cNvSpPr>
+            <a:spLocks noGrp="1"/>
+          </p:cNvSpPr>
+          <p:nvPr>
+            <p:ph type="title"/>
+          </p:nvPr>
+        </p:nvSpPr>
+        <p:spPr/>
+        <p:txBody>
+          <a:bodyPr/>
+          <a:lstStyle/>
+          <a:p>
+            <a:r>
+              <a:rPr lang="de-DE" dirty="0" smtClean="0"/>
+              <a:t>SVNE-Algorithmen:</a:t>
+            </a:r>
+            <a:br>
+              <a:rPr lang="de-DE" dirty="0" smtClean="0"/>
+            </a:br>
+            <a:r>
+              <a:rPr lang="de-DE" sz="1800" b="0" dirty="0"/>
+              <a:t>Strikte Trennung und </a:t>
+            </a:r>
+            <a:r>
+              <a:rPr lang="de-DE" sz="1800" b="0" dirty="0" err="1" smtClean="0"/>
+              <a:t>Preprocessing</a:t>
             </a:r>
             <a:endParaRPr lang="de-DE" sz="1800" dirty="0"/>
           </a:p>
@@ -6123,7 +7044,943 @@
               <a:pPr>
                 <a:defRPr/>
               </a:pPr>
-              <a:t>11</a:t>
+              <a:t>14</a:t>
+            </a:fld>
+            <a:endParaRPr lang="de-DE" dirty="0"/>
+          </a:p>
+        </p:txBody>
+      </p:sp>
+      <p:sp>
+        <p:nvSpPr>
+          <p:cNvPr id="5" name="Fußzeilenplatzhalter 4"/>
+          <p:cNvSpPr>
+            <a:spLocks noGrp="1"/>
+          </p:cNvSpPr>
+          <p:nvPr>
+            <p:ph type="ftr" sz="quarter" idx="3"/>
+          </p:nvPr>
+        </p:nvSpPr>
+        <p:spPr/>
+        <p:txBody>
+          <a:bodyPr/>
+          <a:lstStyle/>
+          <a:p>
+            <a:r>
+              <a:rPr lang="de-DE" smtClean="0"/>
+              <a:t>Sicherheitsaspekte beim Deployment virtueller Netzinfrastrukturen</a:t>
+            </a:r>
+            <a:endParaRPr lang="de-DE" dirty="0"/>
+          </a:p>
+        </p:txBody>
+      </p:sp>
+      <p:sp>
+        <p:nvSpPr>
+          <p:cNvPr id="6" name="Textfeld 5"/>
+          <p:cNvSpPr txBox="1"/>
+          <p:nvPr/>
+        </p:nvSpPr>
+        <p:spPr>
+          <a:xfrm>
+            <a:off x="143508" y="6225899"/>
+            <a:ext cx="7564763" cy="461665"/>
+          </a:xfrm>
+          <a:prstGeom prst="rect">
+            <a:avLst/>
+          </a:prstGeom>
+          <a:noFill/>
+        </p:spPr>
+        <p:txBody>
+          <a:bodyPr wrap="none" rtlCol="0">
+            <a:spAutoFit/>
+          </a:bodyPr>
+          <a:lstStyle/>
+          <a:p>
+            <a:r>
+              <a:rPr lang="de-DE" dirty="0" smtClean="0"/>
+              <a:t>[1] Hong </a:t>
+            </a:r>
+            <a:r>
+              <a:rPr lang="de-DE" dirty="0" err="1"/>
+              <a:t>Xu</a:t>
+            </a:r>
+            <a:r>
+              <a:rPr lang="de-DE" dirty="0"/>
+              <a:t> Ming </a:t>
+            </a:r>
+            <a:r>
+              <a:rPr lang="de-DE" dirty="0" err="1"/>
+              <a:t>Xu</a:t>
+            </a:r>
+            <a:r>
+              <a:rPr lang="de-DE" dirty="0"/>
+              <a:t> </a:t>
+            </a:r>
+            <a:r>
+              <a:rPr lang="de-DE" dirty="0" err="1"/>
+              <a:t>Shuhao</a:t>
+            </a:r>
+            <a:r>
+              <a:rPr lang="de-DE" dirty="0"/>
+              <a:t> Liu, </a:t>
+            </a:r>
+            <a:r>
+              <a:rPr lang="de-DE" dirty="0" err="1"/>
+              <a:t>Zhiping</a:t>
+            </a:r>
+            <a:r>
+              <a:rPr lang="de-DE" dirty="0"/>
+              <a:t> Cai. </a:t>
+            </a:r>
+            <a:r>
+              <a:rPr lang="de-DE" dirty="0" err="1"/>
+              <a:t>Towards</a:t>
+            </a:r>
+            <a:r>
+              <a:rPr lang="de-DE" dirty="0"/>
+              <a:t> Security-aware Virtual Network Embedding, 2015.</a:t>
+            </a:r>
+          </a:p>
+          <a:p>
+            <a:endParaRPr lang="de-DE" dirty="0"/>
+          </a:p>
+        </p:txBody>
+      </p:sp>
+      <p:sp>
+        <p:nvSpPr>
+          <p:cNvPr id="7" name="Textfeld 6"/>
+          <p:cNvSpPr txBox="1"/>
+          <p:nvPr/>
+        </p:nvSpPr>
+        <p:spPr>
+          <a:xfrm>
+            <a:off x="5778538" y="692696"/>
+            <a:ext cx="269626" cy="276999"/>
+          </a:xfrm>
+          <a:prstGeom prst="rect">
+            <a:avLst/>
+          </a:prstGeom>
+          <a:noFill/>
+        </p:spPr>
+        <p:txBody>
+          <a:bodyPr wrap="none" rtlCol="0">
+            <a:spAutoFit/>
+          </a:bodyPr>
+          <a:lstStyle/>
+          <a:p>
+            <a:r>
+              <a:rPr lang="de-DE" b="1" dirty="0" smtClean="0"/>
+              <a:t>1</a:t>
+            </a:r>
+            <a:endParaRPr lang="de-DE" b="1" dirty="0"/>
+          </a:p>
+        </p:txBody>
+      </p:sp>
+    </p:spTree>
+    <p:extLst>
+      <p:ext uri="{BB962C8B-B14F-4D97-AF65-F5344CB8AC3E}">
+        <p14:creationId xmlns:p14="http://schemas.microsoft.com/office/powerpoint/2010/main" val="3408010396"/>
+      </p:ext>
+    </p:extLst>
+  </p:cSld>
+  <p:clrMapOvr>
+    <a:masterClrMapping/>
+  </p:clrMapOvr>
+  <p:transition spd="med"/>
+  <p:timing>
+    <p:tnLst>
+      <p:par>
+        <p:cTn id="1" dur="indefinite" restart="never" nodeType="tmRoot"/>
+      </p:par>
+    </p:tnLst>
+  </p:timing>
+</p:sld>
+</file>
+
+<file path=ppt/slides/slide15.xml><?xml version="1.0" encoding="utf-8"?>
+<p:sld xmlns:a="http://schemas.openxmlformats.org/drawingml/2006/main" xmlns:r="http://schemas.openxmlformats.org/officeDocument/2006/relationships" xmlns:p="http://schemas.openxmlformats.org/presentationml/2006/main">
+  <p:cSld>
+    <p:spTree>
+      <p:nvGrpSpPr>
+        <p:cNvPr id="1" name=""/>
+        <p:cNvGrpSpPr/>
+        <p:nvPr/>
+      </p:nvGrpSpPr>
+      <p:grpSpPr>
+        <a:xfrm>
+          <a:off x="0" y="0"/>
+          <a:ext cx="0" cy="0"/>
+          <a:chOff x="0" y="0"/>
+          <a:chExt cx="0" cy="0"/>
+        </a:xfrm>
+      </p:grpSpPr>
+      <p:sp>
+        <p:nvSpPr>
+          <p:cNvPr id="2" name="Titel 1"/>
+          <p:cNvSpPr>
+            <a:spLocks noGrp="1"/>
+          </p:cNvSpPr>
+          <p:nvPr>
+            <p:ph type="title"/>
+          </p:nvPr>
+        </p:nvSpPr>
+        <p:spPr/>
+        <p:txBody>
+          <a:bodyPr/>
+          <a:lstStyle/>
+          <a:p>
+            <a:r>
+              <a:rPr lang="de-DE" dirty="0" smtClean="0"/>
+              <a:t>SVNE-Algorithmen:</a:t>
+            </a:r>
+            <a:br>
+              <a:rPr lang="de-DE" dirty="0" smtClean="0"/>
+            </a:br>
+            <a:r>
+              <a:rPr lang="de-DE" sz="1800" b="0" dirty="0"/>
+              <a:t>Sicherheitsvektoren und doppelte Berechnung</a:t>
+            </a:r>
+            <a:endParaRPr lang="de-DE" sz="1800" dirty="0"/>
+          </a:p>
+        </p:txBody>
+      </p:sp>
+      <p:sp>
+        <p:nvSpPr>
+          <p:cNvPr id="3" name="Inhaltsplatzhalter 2"/>
+          <p:cNvSpPr>
+            <a:spLocks noGrp="1"/>
+          </p:cNvSpPr>
+          <p:nvPr>
+            <p:ph idx="1"/>
+          </p:nvPr>
+        </p:nvSpPr>
+        <p:spPr/>
+        <p:txBody>
+          <a:bodyPr/>
+          <a:lstStyle/>
+          <a:p>
+            <a:endParaRPr lang="de-DE"/>
+          </a:p>
+        </p:txBody>
+      </p:sp>
+      <p:sp>
+        <p:nvSpPr>
+          <p:cNvPr id="4" name="Foliennummernplatzhalter 3"/>
+          <p:cNvSpPr>
+            <a:spLocks noGrp="1"/>
+          </p:cNvSpPr>
+          <p:nvPr>
+            <p:ph type="sldNum" sz="quarter" idx="4"/>
+          </p:nvPr>
+        </p:nvSpPr>
+        <p:spPr/>
+        <p:txBody>
+          <a:bodyPr/>
+          <a:lstStyle/>
+          <a:p>
+            <a:pPr>
+              <a:defRPr/>
+            </a:pPr>
+            <a:fld id="{70BFFA52-4234-45F6-B1A6-074E24FF43A2}" type="slidenum">
+              <a:rPr lang="de-DE" smtClean="0"/>
+              <a:pPr>
+                <a:defRPr/>
+              </a:pPr>
+              <a:t>15</a:t>
+            </a:fld>
+            <a:endParaRPr lang="de-DE" dirty="0"/>
+          </a:p>
+        </p:txBody>
+      </p:sp>
+      <p:sp>
+        <p:nvSpPr>
+          <p:cNvPr id="5" name="Fußzeilenplatzhalter 4"/>
+          <p:cNvSpPr>
+            <a:spLocks noGrp="1"/>
+          </p:cNvSpPr>
+          <p:nvPr>
+            <p:ph type="ftr" sz="quarter" idx="3"/>
+          </p:nvPr>
+        </p:nvSpPr>
+        <p:spPr/>
+        <p:txBody>
+          <a:bodyPr/>
+          <a:lstStyle/>
+          <a:p>
+            <a:r>
+              <a:rPr lang="de-DE" smtClean="0"/>
+              <a:t>Sicherheitsaspekte beim Deployment virtueller Netzinfrastrukturen</a:t>
+            </a:r>
+            <a:endParaRPr lang="de-DE" dirty="0"/>
+          </a:p>
+        </p:txBody>
+      </p:sp>
+      <p:sp>
+        <p:nvSpPr>
+          <p:cNvPr id="6" name="Textfeld 5"/>
+          <p:cNvSpPr txBox="1"/>
+          <p:nvPr/>
+        </p:nvSpPr>
+        <p:spPr>
+          <a:xfrm>
+            <a:off x="143508" y="6225899"/>
+            <a:ext cx="8944821" cy="276999"/>
+          </a:xfrm>
+          <a:prstGeom prst="rect">
+            <a:avLst/>
+          </a:prstGeom>
+          <a:noFill/>
+        </p:spPr>
+        <p:txBody>
+          <a:bodyPr wrap="none" rtlCol="0">
+            <a:spAutoFit/>
+          </a:bodyPr>
+          <a:lstStyle/>
+          <a:p>
+            <a:r>
+              <a:rPr lang="de-DE" dirty="0" smtClean="0"/>
+              <a:t>[1] </a:t>
+            </a:r>
+            <a:r>
+              <a:rPr lang="en-US" dirty="0"/>
+              <a:t>Yang Wang, </a:t>
+            </a:r>
+            <a:r>
+              <a:rPr lang="en-US" dirty="0" err="1"/>
+              <a:t>Phanvu</a:t>
+            </a:r>
+            <a:r>
+              <a:rPr lang="en-US" dirty="0"/>
+              <a:t> Chau und </a:t>
+            </a:r>
+            <a:r>
+              <a:rPr lang="en-US" dirty="0" err="1"/>
+              <a:t>Fuyu</a:t>
+            </a:r>
+            <a:r>
+              <a:rPr lang="en-US" dirty="0"/>
+              <a:t> Chen. Towards a secured network virtualization. </a:t>
+            </a:r>
+            <a:r>
+              <a:rPr lang="de-DE" i="1" dirty="0"/>
+              <a:t>Computer Networks</a:t>
+            </a:r>
+            <a:r>
+              <a:rPr lang="de-DE" dirty="0"/>
+              <a:t>, 104:55–65, 2016</a:t>
+            </a:r>
+            <a:r>
+              <a:rPr lang="de-DE" dirty="0" smtClean="0"/>
+              <a:t>.</a:t>
+            </a:r>
+            <a:endParaRPr lang="de-DE" dirty="0"/>
+          </a:p>
+        </p:txBody>
+      </p:sp>
+      <p:sp>
+        <p:nvSpPr>
+          <p:cNvPr id="7" name="Textfeld 6"/>
+          <p:cNvSpPr txBox="1"/>
+          <p:nvPr/>
+        </p:nvSpPr>
+        <p:spPr>
+          <a:xfrm>
+            <a:off x="3330266" y="692696"/>
+            <a:ext cx="269626" cy="276999"/>
+          </a:xfrm>
+          <a:prstGeom prst="rect">
+            <a:avLst/>
+          </a:prstGeom>
+          <a:noFill/>
+        </p:spPr>
+        <p:txBody>
+          <a:bodyPr wrap="none" rtlCol="0">
+            <a:spAutoFit/>
+          </a:bodyPr>
+          <a:lstStyle/>
+          <a:p>
+            <a:r>
+              <a:rPr lang="de-DE" b="1" dirty="0" smtClean="0"/>
+              <a:t>1</a:t>
+            </a:r>
+            <a:endParaRPr lang="de-DE" b="1" dirty="0"/>
+          </a:p>
+        </p:txBody>
+      </p:sp>
+    </p:spTree>
+    <p:extLst>
+      <p:ext uri="{BB962C8B-B14F-4D97-AF65-F5344CB8AC3E}">
+        <p14:creationId xmlns:p14="http://schemas.microsoft.com/office/powerpoint/2010/main" val="3079377498"/>
+      </p:ext>
+    </p:extLst>
+  </p:cSld>
+  <p:clrMapOvr>
+    <a:masterClrMapping/>
+  </p:clrMapOvr>
+  <p:transition spd="med"/>
+  <p:timing>
+    <p:tnLst>
+      <p:par>
+        <p:cTn id="1" dur="indefinite" restart="never" nodeType="tmRoot"/>
+      </p:par>
+    </p:tnLst>
+  </p:timing>
+</p:sld>
+</file>
+
+<file path=ppt/slides/slide16.xml><?xml version="1.0" encoding="utf-8"?>
+<p:sld xmlns:a="http://schemas.openxmlformats.org/drawingml/2006/main" xmlns:r="http://schemas.openxmlformats.org/officeDocument/2006/relationships" xmlns:p="http://schemas.openxmlformats.org/presentationml/2006/main">
+  <p:cSld>
+    <p:spTree>
+      <p:nvGrpSpPr>
+        <p:cNvPr id="1" name=""/>
+        <p:cNvGrpSpPr/>
+        <p:nvPr/>
+      </p:nvGrpSpPr>
+      <p:grpSpPr>
+        <a:xfrm>
+          <a:off x="0" y="0"/>
+          <a:ext cx="0" cy="0"/>
+          <a:chOff x="0" y="0"/>
+          <a:chExt cx="0" cy="0"/>
+        </a:xfrm>
+      </p:grpSpPr>
+      <p:sp>
+        <p:nvSpPr>
+          <p:cNvPr id="2" name="Titel 1"/>
+          <p:cNvSpPr>
+            <a:spLocks noGrp="1"/>
+          </p:cNvSpPr>
+          <p:nvPr>
+            <p:ph type="title"/>
+          </p:nvPr>
+        </p:nvSpPr>
+        <p:spPr/>
+        <p:txBody>
+          <a:bodyPr/>
+          <a:lstStyle/>
+          <a:p>
+            <a:r>
+              <a:rPr lang="de-DE" dirty="0" smtClean="0"/>
+              <a:t>Empfehlenswerte Literatur</a:t>
+            </a:r>
+            <a:endParaRPr lang="de-DE" sz="1800" dirty="0"/>
+          </a:p>
+        </p:txBody>
+      </p:sp>
+      <p:sp>
+        <p:nvSpPr>
+          <p:cNvPr id="3" name="Inhaltsplatzhalter 2"/>
+          <p:cNvSpPr>
+            <a:spLocks noGrp="1"/>
+          </p:cNvSpPr>
+          <p:nvPr>
+            <p:ph idx="1"/>
+          </p:nvPr>
+        </p:nvSpPr>
+        <p:spPr/>
+        <p:txBody>
+          <a:bodyPr/>
+          <a:lstStyle/>
+          <a:p>
+            <a:pPr marL="0" indent="0">
+              <a:buNone/>
+            </a:pPr>
+            <a:r>
+              <a:rPr lang="de-DE" sz="1600" b="1" dirty="0" smtClean="0"/>
+              <a:t>Sicherheitsaspekte virtueller Netzinfrastrukturen</a:t>
+            </a:r>
+          </a:p>
+          <a:p>
+            <a:r>
+              <a:rPr lang="de-DE" sz="1600" dirty="0"/>
+              <a:t>Kamal </a:t>
+            </a:r>
+            <a:r>
+              <a:rPr lang="de-DE" sz="1600" dirty="0" err="1"/>
+              <a:t>Dahbur</a:t>
+            </a:r>
+            <a:r>
+              <a:rPr lang="de-DE" sz="1600" dirty="0"/>
+              <a:t>, </a:t>
+            </a:r>
+            <a:r>
+              <a:rPr lang="de-DE" sz="1600" dirty="0" err="1"/>
+              <a:t>Bassil</a:t>
+            </a:r>
+            <a:r>
+              <a:rPr lang="de-DE" sz="1600" dirty="0"/>
+              <a:t> Mohammad und Ahmad Bisher </a:t>
+            </a:r>
+            <a:r>
+              <a:rPr lang="de-DE" sz="1600" dirty="0" err="1"/>
+              <a:t>Tarakji</a:t>
+            </a:r>
+            <a:r>
+              <a:rPr lang="de-DE" sz="1600" dirty="0"/>
+              <a:t>. A </a:t>
+            </a:r>
+            <a:r>
+              <a:rPr lang="de-DE" sz="1600" dirty="0" err="1"/>
+              <a:t>survey</a:t>
+            </a:r>
+            <a:r>
+              <a:rPr lang="de-DE" sz="1600" dirty="0"/>
+              <a:t> </a:t>
+            </a:r>
+            <a:r>
+              <a:rPr lang="de-DE" sz="1600" dirty="0" err="1"/>
+              <a:t>of</a:t>
+            </a:r>
+            <a:r>
+              <a:rPr lang="de-DE" sz="1600" dirty="0"/>
+              <a:t> </a:t>
+            </a:r>
+            <a:r>
+              <a:rPr lang="de-DE" sz="1600" dirty="0" err="1"/>
+              <a:t>risks</a:t>
+            </a:r>
+            <a:r>
+              <a:rPr lang="de-DE" sz="1600" dirty="0"/>
+              <a:t>, </a:t>
+            </a:r>
+            <a:r>
+              <a:rPr lang="en-US" sz="1600" dirty="0"/>
+              <a:t>threats and vulnerabilities in cloud computing. In </a:t>
+            </a:r>
+            <a:r>
+              <a:rPr lang="en-US" sz="1600" i="1" dirty="0"/>
+              <a:t>Proceedings of the 2011 International </a:t>
+            </a:r>
+            <a:r>
+              <a:rPr lang="de-DE" sz="1600" i="1" dirty="0" err="1"/>
+              <a:t>conference</a:t>
+            </a:r>
+            <a:r>
+              <a:rPr lang="de-DE" sz="1600" i="1" dirty="0"/>
+              <a:t> on intelligent </a:t>
+            </a:r>
+            <a:r>
+              <a:rPr lang="de-DE" sz="1600" i="1" dirty="0" err="1"/>
+              <a:t>semantic</a:t>
+            </a:r>
+            <a:r>
+              <a:rPr lang="de-DE" sz="1600" i="1" dirty="0"/>
+              <a:t> Web-services </a:t>
+            </a:r>
+            <a:r>
+              <a:rPr lang="de-DE" sz="1600" i="1" dirty="0" err="1"/>
+              <a:t>and</a:t>
+            </a:r>
+            <a:r>
+              <a:rPr lang="de-DE" sz="1600" i="1" dirty="0"/>
+              <a:t> </a:t>
+            </a:r>
+            <a:r>
+              <a:rPr lang="de-DE" sz="1600" i="1" dirty="0" err="1"/>
+              <a:t>applications</a:t>
+            </a:r>
+            <a:r>
+              <a:rPr lang="de-DE" sz="1600" dirty="0"/>
+              <a:t>, Seite 12. ACM, 2011.</a:t>
+            </a:r>
+          </a:p>
+          <a:p>
+            <a:r>
+              <a:rPr lang="de-DE" sz="1600" dirty="0" smtClean="0"/>
+              <a:t>Andreas </a:t>
+            </a:r>
+            <a:r>
+              <a:rPr lang="de-DE" sz="1600" dirty="0"/>
+              <a:t>Fischer, Juan Felipe Botero, Michael Till Beck, Hermann De Meer und </a:t>
+            </a:r>
+            <a:r>
+              <a:rPr lang="de-DE" sz="1600" dirty="0" smtClean="0"/>
+              <a:t>Xavier Hesselbach</a:t>
+            </a:r>
+            <a:r>
+              <a:rPr lang="de-DE" sz="1600" dirty="0"/>
+              <a:t>. Virtual </a:t>
+            </a:r>
+            <a:r>
+              <a:rPr lang="de-DE" sz="1600" dirty="0" err="1"/>
+              <a:t>network</a:t>
+            </a:r>
+            <a:r>
+              <a:rPr lang="de-DE" sz="1600" dirty="0"/>
+              <a:t> </a:t>
+            </a:r>
+            <a:r>
+              <a:rPr lang="de-DE" sz="1600" dirty="0" err="1"/>
+              <a:t>embedding</a:t>
+            </a:r>
+            <a:r>
+              <a:rPr lang="de-DE" sz="1600" dirty="0"/>
+              <a:t>: A </a:t>
+            </a:r>
+            <a:r>
+              <a:rPr lang="de-DE" sz="1600" dirty="0" err="1"/>
+              <a:t>survey</a:t>
+            </a:r>
+            <a:r>
+              <a:rPr lang="de-DE" sz="1600" dirty="0"/>
+              <a:t>. </a:t>
+            </a:r>
+            <a:r>
+              <a:rPr lang="de-DE" sz="1600" i="1" dirty="0"/>
+              <a:t>IEEE Communications Surveys </a:t>
+            </a:r>
+            <a:r>
+              <a:rPr lang="de-DE" sz="1600" i="1" dirty="0" smtClean="0"/>
+              <a:t>&amp; Tutorials</a:t>
+            </a:r>
+            <a:r>
+              <a:rPr lang="de-DE" sz="1600" dirty="0"/>
+              <a:t>, 15(4):1888–1906, 2013</a:t>
+            </a:r>
+            <a:r>
+              <a:rPr lang="de-DE" sz="1600" dirty="0" smtClean="0"/>
+              <a:t>.</a:t>
+            </a:r>
+            <a:endParaRPr lang="de-DE" sz="1600" dirty="0"/>
+          </a:p>
+          <a:p>
+            <a:r>
+              <a:rPr lang="de-DE" sz="1600" dirty="0" err="1" smtClean="0"/>
+              <a:t>Shuiqing</a:t>
+            </a:r>
+            <a:r>
+              <a:rPr lang="de-DE" sz="1600" dirty="0" smtClean="0"/>
+              <a:t> </a:t>
+            </a:r>
+            <a:r>
+              <a:rPr lang="de-DE" sz="1600" dirty="0"/>
+              <a:t>Gong, </a:t>
+            </a:r>
+            <a:r>
+              <a:rPr lang="de-DE" sz="1600" dirty="0" err="1"/>
+              <a:t>Jing</a:t>
+            </a:r>
+            <a:r>
+              <a:rPr lang="de-DE" sz="1600" dirty="0"/>
+              <a:t> Chen, </a:t>
+            </a:r>
+            <a:r>
+              <a:rPr lang="de-DE" sz="1600" dirty="0" err="1"/>
+              <a:t>Conghui</a:t>
+            </a:r>
+            <a:r>
+              <a:rPr lang="de-DE" sz="1600" dirty="0"/>
+              <a:t> Huang, </a:t>
+            </a:r>
+            <a:r>
+              <a:rPr lang="de-DE" sz="1600" dirty="0" err="1"/>
+              <a:t>Qingchao</a:t>
+            </a:r>
+            <a:r>
+              <a:rPr lang="de-DE" sz="1600" dirty="0"/>
+              <a:t> Zhu und </a:t>
+            </a:r>
+            <a:r>
+              <a:rPr lang="de-DE" sz="1600" dirty="0" err="1"/>
+              <a:t>Siyi</a:t>
+            </a:r>
+            <a:r>
+              <a:rPr lang="de-DE" sz="1600" dirty="0"/>
+              <a:t> Zhao. Virtual </a:t>
+            </a:r>
+            <a:r>
+              <a:rPr lang="en-US" sz="1600" dirty="0"/>
+              <a:t>Network Embedding through Security Risk Awareness and Optimization. </a:t>
+            </a:r>
+            <a:r>
+              <a:rPr lang="en-US" sz="1600" i="1" dirty="0"/>
+              <a:t>KSII Transactions </a:t>
+            </a:r>
+            <a:r>
+              <a:rPr lang="de-DE" sz="1600" i="1" dirty="0"/>
+              <a:t>on Internet &amp; Information Systems</a:t>
+            </a:r>
+            <a:r>
+              <a:rPr lang="de-DE" sz="1600" dirty="0"/>
+              <a:t>, 10(7), 2016.</a:t>
+            </a:r>
+            <a:endParaRPr lang="de-DE" sz="1600" dirty="0" smtClean="0"/>
+          </a:p>
+          <a:p>
+            <a:endParaRPr lang="de-DE" sz="1600" dirty="0" smtClean="0"/>
+          </a:p>
+          <a:p>
+            <a:pPr marL="0" indent="0">
+              <a:buNone/>
+            </a:pPr>
+            <a:r>
+              <a:rPr lang="de-DE" sz="1600" b="1" dirty="0" smtClean="0"/>
+              <a:t>Untersuchte Algorithmen</a:t>
+            </a:r>
+            <a:endParaRPr lang="de-DE" sz="1600" b="1" dirty="0" smtClean="0"/>
+          </a:p>
+          <a:p>
+            <a:r>
+              <a:rPr lang="de-DE" sz="1600" dirty="0" smtClean="0"/>
+              <a:t>Hong </a:t>
+            </a:r>
+            <a:r>
+              <a:rPr lang="de-DE" sz="1600" dirty="0" err="1"/>
+              <a:t>Xu</a:t>
+            </a:r>
+            <a:r>
+              <a:rPr lang="de-DE" sz="1600" dirty="0"/>
+              <a:t> Ming </a:t>
+            </a:r>
+            <a:r>
+              <a:rPr lang="de-DE" sz="1600" dirty="0" err="1"/>
+              <a:t>Xu</a:t>
+            </a:r>
+            <a:r>
+              <a:rPr lang="de-DE" sz="1600" dirty="0"/>
+              <a:t> </a:t>
+            </a:r>
+            <a:r>
+              <a:rPr lang="de-DE" sz="1600" dirty="0" err="1"/>
+              <a:t>Shuhao</a:t>
+            </a:r>
+            <a:r>
+              <a:rPr lang="de-DE" sz="1600" dirty="0"/>
+              <a:t> Liu, </a:t>
+            </a:r>
+            <a:r>
+              <a:rPr lang="de-DE" sz="1600" dirty="0" err="1"/>
+              <a:t>Zhiping</a:t>
+            </a:r>
+            <a:r>
+              <a:rPr lang="de-DE" sz="1600" dirty="0"/>
+              <a:t> Cai. </a:t>
+            </a:r>
+            <a:r>
+              <a:rPr lang="de-DE" sz="1600" dirty="0" err="1"/>
+              <a:t>Towards</a:t>
+            </a:r>
+            <a:r>
+              <a:rPr lang="de-DE" sz="1600" dirty="0"/>
+              <a:t> Security-aware Virtual </a:t>
+            </a:r>
+            <a:r>
+              <a:rPr lang="de-DE" sz="1600" dirty="0" smtClean="0"/>
+              <a:t>Network Embedding</a:t>
+            </a:r>
+            <a:r>
+              <a:rPr lang="de-DE" sz="1600" dirty="0"/>
+              <a:t>, 2015</a:t>
+            </a:r>
+            <a:r>
+              <a:rPr lang="de-DE" sz="1600" dirty="0" smtClean="0"/>
+              <a:t>.</a:t>
+            </a:r>
+          </a:p>
+          <a:p>
+            <a:r>
+              <a:rPr lang="en-US" sz="1600" dirty="0" smtClean="0"/>
+              <a:t>Yang </a:t>
+            </a:r>
+            <a:r>
+              <a:rPr lang="en-US" sz="1600" dirty="0"/>
+              <a:t>Wang, </a:t>
+            </a:r>
+            <a:r>
+              <a:rPr lang="en-US" sz="1600" dirty="0" err="1"/>
+              <a:t>Phanvu</a:t>
+            </a:r>
+            <a:r>
+              <a:rPr lang="en-US" sz="1600" dirty="0"/>
+              <a:t> Chau und </a:t>
+            </a:r>
+            <a:r>
+              <a:rPr lang="en-US" sz="1600" dirty="0" err="1"/>
+              <a:t>Fuyu</a:t>
+            </a:r>
+            <a:r>
+              <a:rPr lang="en-US" sz="1600" dirty="0"/>
+              <a:t> Chen. Towards a secured network </a:t>
+            </a:r>
+            <a:r>
+              <a:rPr lang="en-US" sz="1600" dirty="0" smtClean="0"/>
+              <a:t>virtualization. </a:t>
+            </a:r>
+            <a:r>
+              <a:rPr lang="de-DE" sz="1600" i="1" dirty="0" smtClean="0"/>
+              <a:t>Computer </a:t>
+            </a:r>
+            <a:r>
+              <a:rPr lang="de-DE" sz="1600" i="1" dirty="0"/>
+              <a:t>Networks</a:t>
+            </a:r>
+            <a:r>
+              <a:rPr lang="de-DE" sz="1600" dirty="0"/>
+              <a:t>, 104:55–65, 2016.</a:t>
+            </a:r>
+            <a:endParaRPr lang="de-DE" sz="1600" dirty="0" smtClean="0"/>
+          </a:p>
+          <a:p>
+            <a:endParaRPr lang="de-DE" sz="1600" dirty="0"/>
+          </a:p>
+        </p:txBody>
+      </p:sp>
+      <p:sp>
+        <p:nvSpPr>
+          <p:cNvPr id="4" name="Foliennummernplatzhalter 3"/>
+          <p:cNvSpPr>
+            <a:spLocks noGrp="1"/>
+          </p:cNvSpPr>
+          <p:nvPr>
+            <p:ph type="sldNum" sz="quarter" idx="4"/>
+          </p:nvPr>
+        </p:nvSpPr>
+        <p:spPr/>
+        <p:txBody>
+          <a:bodyPr/>
+          <a:lstStyle/>
+          <a:p>
+            <a:pPr>
+              <a:defRPr/>
+            </a:pPr>
+            <a:fld id="{70BFFA52-4234-45F6-B1A6-074E24FF43A2}" type="slidenum">
+              <a:rPr lang="de-DE" smtClean="0"/>
+              <a:pPr>
+                <a:defRPr/>
+              </a:pPr>
+              <a:t>16</a:t>
+            </a:fld>
+            <a:endParaRPr lang="de-DE" dirty="0"/>
+          </a:p>
+        </p:txBody>
+      </p:sp>
+      <p:sp>
+        <p:nvSpPr>
+          <p:cNvPr id="5" name="Fußzeilenplatzhalter 4"/>
+          <p:cNvSpPr>
+            <a:spLocks noGrp="1"/>
+          </p:cNvSpPr>
+          <p:nvPr>
+            <p:ph type="ftr" sz="quarter" idx="3"/>
+          </p:nvPr>
+        </p:nvSpPr>
+        <p:spPr/>
+        <p:txBody>
+          <a:bodyPr/>
+          <a:lstStyle/>
+          <a:p>
+            <a:r>
+              <a:rPr lang="de-DE" smtClean="0"/>
+              <a:t>Sicherheitsaspekte beim Deployment virtueller Netzinfrastrukturen</a:t>
+            </a:r>
+            <a:endParaRPr lang="de-DE" dirty="0"/>
+          </a:p>
+        </p:txBody>
+      </p:sp>
+    </p:spTree>
+    <p:extLst>
+      <p:ext uri="{BB962C8B-B14F-4D97-AF65-F5344CB8AC3E}">
+        <p14:creationId xmlns:p14="http://schemas.microsoft.com/office/powerpoint/2010/main" val="2073930859"/>
+      </p:ext>
+    </p:extLst>
+  </p:cSld>
+  <p:clrMapOvr>
+    <a:masterClrMapping/>
+  </p:clrMapOvr>
+  <p:transition spd="med"/>
+  <p:timing>
+    <p:tnLst>
+      <p:par>
+        <p:cTn id="1" dur="indefinite" restart="never" nodeType="tmRoot"/>
+      </p:par>
+    </p:tnLst>
+  </p:timing>
+</p:sld>
+</file>
+
+<file path=ppt/slides/slide17.xml><?xml version="1.0" encoding="utf-8"?>
+<p:sld xmlns:a="http://schemas.openxmlformats.org/drawingml/2006/main" xmlns:r="http://schemas.openxmlformats.org/officeDocument/2006/relationships" xmlns:p="http://schemas.openxmlformats.org/presentationml/2006/main">
+  <p:cSld>
+    <p:spTree>
+      <p:nvGrpSpPr>
+        <p:cNvPr id="1" name=""/>
+        <p:cNvGrpSpPr/>
+        <p:nvPr/>
+      </p:nvGrpSpPr>
+      <p:grpSpPr>
+        <a:xfrm>
+          <a:off x="0" y="0"/>
+          <a:ext cx="0" cy="0"/>
+          <a:chOff x="0" y="0"/>
+          <a:chExt cx="0" cy="0"/>
+        </a:xfrm>
+      </p:grpSpPr>
+      <p:sp>
+        <p:nvSpPr>
+          <p:cNvPr id="2" name="Titel 1"/>
+          <p:cNvSpPr>
+            <a:spLocks noGrp="1"/>
+          </p:cNvSpPr>
+          <p:nvPr>
+            <p:ph type="title"/>
+          </p:nvPr>
+        </p:nvSpPr>
+        <p:spPr/>
+        <p:txBody>
+          <a:bodyPr/>
+          <a:lstStyle/>
+          <a:p>
+            <a:r>
+              <a:rPr lang="de-DE" dirty="0" smtClean="0"/>
+              <a:t>Diskussion</a:t>
+            </a:r>
+            <a:endParaRPr lang="de-DE" sz="1800" dirty="0"/>
+          </a:p>
+        </p:txBody>
+      </p:sp>
+      <p:sp>
+        <p:nvSpPr>
+          <p:cNvPr id="3" name="Inhaltsplatzhalter 2"/>
+          <p:cNvSpPr>
+            <a:spLocks noGrp="1"/>
+          </p:cNvSpPr>
+          <p:nvPr>
+            <p:ph idx="1"/>
+          </p:nvPr>
+        </p:nvSpPr>
+        <p:spPr/>
+        <p:txBody>
+          <a:bodyPr/>
+          <a:lstStyle/>
+          <a:p>
+            <a:endParaRPr lang="de-DE" dirty="0"/>
+          </a:p>
+        </p:txBody>
+      </p:sp>
+      <p:sp>
+        <p:nvSpPr>
+          <p:cNvPr id="4" name="Foliennummernplatzhalter 3"/>
+          <p:cNvSpPr>
+            <a:spLocks noGrp="1"/>
+          </p:cNvSpPr>
+          <p:nvPr>
+            <p:ph type="sldNum" sz="quarter" idx="4"/>
+          </p:nvPr>
+        </p:nvSpPr>
+        <p:spPr/>
+        <p:txBody>
+          <a:bodyPr/>
+          <a:lstStyle/>
+          <a:p>
+            <a:pPr>
+              <a:defRPr/>
+            </a:pPr>
+            <a:fld id="{70BFFA52-4234-45F6-B1A6-074E24FF43A2}" type="slidenum">
+              <a:rPr lang="de-DE" smtClean="0"/>
+              <a:pPr>
+                <a:defRPr/>
+              </a:pPr>
+              <a:t>17</a:t>
             </a:fld>
             <a:endParaRPr lang="de-DE" dirty="0"/>
           </a:p>
@@ -6669,35 +8526,6 @@
           </a:p>
         </p:txBody>
       </p:sp>
-      <p:pic>
-        <p:nvPicPr>
-          <p:cNvPr id="6" name="Inhaltsplatzhalter 5"/>
-          <p:cNvPicPr>
-            <a:picLocks noGrp="1" noChangeAspect="1"/>
-          </p:cNvPicPr>
-          <p:nvPr>
-            <p:ph idx="1"/>
-          </p:nvPr>
-        </p:nvPicPr>
-        <p:blipFill>
-          <a:blip r:embed="rId3" cstate="print">
-            <a:extLst>
-              <a:ext uri="{28A0092B-C50C-407E-A947-70E740481C1C}">
-                <a14:useLocalDpi xmlns:a14="http://schemas.microsoft.com/office/drawing/2010/main" val="0"/>
-              </a:ext>
-            </a:extLst>
-          </a:blip>
-          <a:stretch>
-            <a:fillRect/>
-          </a:stretch>
-        </p:blipFill>
-        <p:spPr>
-          <a:xfrm>
-            <a:off x="920974" y="1347788"/>
-            <a:ext cx="7278239" cy="4900612"/>
-          </a:xfrm>
-        </p:spPr>
-      </p:pic>
       <p:sp>
         <p:nvSpPr>
           <p:cNvPr id="4" name="Foliennummernplatzhalter 3"/>
@@ -6722,150 +8550,6 @@
                 <a:defRPr/>
               </a:pPr>
               <a:t>5</a:t>
-            </a:fld>
-            <a:endParaRPr lang="de-DE" dirty="0"/>
-          </a:p>
-        </p:txBody>
-      </p:sp>
-      <p:sp>
-        <p:nvSpPr>
-          <p:cNvPr id="5" name="Fußzeilenplatzhalter 4"/>
-          <p:cNvSpPr>
-            <a:spLocks noGrp="1"/>
-          </p:cNvSpPr>
-          <p:nvPr>
-            <p:ph type="ftr" sz="quarter" idx="3"/>
-          </p:nvPr>
-        </p:nvSpPr>
-        <p:spPr/>
-        <p:txBody>
-          <a:bodyPr/>
-          <a:lstStyle/>
-          <a:p>
-            <a:r>
-              <a:rPr lang="de-DE" smtClean="0"/>
-              <a:t>Sicherheitsaspekte beim Deployment virtueller Netzinfrastrukturen</a:t>
-            </a:r>
-            <a:endParaRPr lang="de-DE" dirty="0"/>
-          </a:p>
-        </p:txBody>
-      </p:sp>
-      <p:sp>
-        <p:nvSpPr>
-          <p:cNvPr id="7" name="Textfeld 6"/>
-          <p:cNvSpPr txBox="1"/>
-          <p:nvPr/>
-        </p:nvSpPr>
-        <p:spPr>
-          <a:xfrm>
-            <a:off x="1031567" y="6182580"/>
-            <a:ext cx="7057060" cy="276999"/>
-          </a:xfrm>
-          <a:prstGeom prst="rect">
-            <a:avLst/>
-          </a:prstGeom>
-          <a:noFill/>
-        </p:spPr>
-        <p:txBody>
-          <a:bodyPr wrap="none" rtlCol="0">
-            <a:spAutoFit/>
-          </a:bodyPr>
-          <a:lstStyle/>
-          <a:p>
-            <a:pPr algn="ctr"/>
-            <a:r>
-              <a:rPr lang="de-DE" dirty="0" smtClean="0"/>
-              <a:t>Die Substratnetze zweier Infrastructure Provider hosten zwei virtuelle Netze eines Service Providers.</a:t>
-            </a:r>
-            <a:endParaRPr lang="de-DE" dirty="0"/>
-          </a:p>
-        </p:txBody>
-      </p:sp>
-    </p:spTree>
-    <p:extLst>
-      <p:ext uri="{BB962C8B-B14F-4D97-AF65-F5344CB8AC3E}">
-        <p14:creationId xmlns:p14="http://schemas.microsoft.com/office/powerpoint/2010/main" val="664013948"/>
-      </p:ext>
-    </p:extLst>
-  </p:cSld>
-  <p:clrMapOvr>
-    <a:masterClrMapping/>
-  </p:clrMapOvr>
-  <p:transition spd="med"/>
-  <p:timing>
-    <p:tnLst>
-      <p:par>
-        <p:cTn id="1" dur="indefinite" restart="never" nodeType="tmRoot"/>
-      </p:par>
-    </p:tnLst>
-  </p:timing>
-</p:sld>
-</file>
-
-<file path=ppt/slides/slide6.xml><?xml version="1.0" encoding="utf-8"?>
-<p:sld xmlns:a="http://schemas.openxmlformats.org/drawingml/2006/main" xmlns:r="http://schemas.openxmlformats.org/officeDocument/2006/relationships" xmlns:p="http://schemas.openxmlformats.org/presentationml/2006/main">
-  <p:cSld>
-    <p:spTree>
-      <p:nvGrpSpPr>
-        <p:cNvPr id="1" name=""/>
-        <p:cNvGrpSpPr/>
-        <p:nvPr/>
-      </p:nvGrpSpPr>
-      <p:grpSpPr>
-        <a:xfrm>
-          <a:off x="0" y="0"/>
-          <a:ext cx="0" cy="0"/>
-          <a:chOff x="0" y="0"/>
-          <a:chExt cx="0" cy="0"/>
-        </a:xfrm>
-      </p:grpSpPr>
-      <p:sp>
-        <p:nvSpPr>
-          <p:cNvPr id="2" name="Titel 1"/>
-          <p:cNvSpPr>
-            <a:spLocks noGrp="1"/>
-          </p:cNvSpPr>
-          <p:nvPr>
-            <p:ph type="title"/>
-          </p:nvPr>
-        </p:nvSpPr>
-        <p:spPr/>
-        <p:txBody>
-          <a:bodyPr/>
-          <a:lstStyle/>
-          <a:p>
-            <a:r>
-              <a:rPr lang="de-DE" dirty="0" smtClean="0"/>
-              <a:t>Klassifizierung von Sicherheitsrisiken</a:t>
-            </a:r>
-            <a:endParaRPr lang="de-DE" dirty="0"/>
-          </a:p>
-        </p:txBody>
-      </p:sp>
-      <p:sp>
-        <p:nvSpPr>
-          <p:cNvPr id="4" name="Foliennummernplatzhalter 3"/>
-          <p:cNvSpPr>
-            <a:spLocks noGrp="1"/>
-          </p:cNvSpPr>
-          <p:nvPr>
-            <p:ph type="sldNum" sz="quarter" idx="4"/>
-          </p:nvPr>
-        </p:nvSpPr>
-        <p:spPr/>
-        <p:txBody>
-          <a:bodyPr/>
-          <a:lstStyle/>
-          <a:p>
-            <a:pPr>
-              <a:defRPr/>
-            </a:pPr>
-            <a:fld id="{70BFFA52-4234-45F6-B1A6-074E24FF43A2}" type="slidenum">
-              <a:rPr lang="de-DE" smtClean="0"/>
-              <a:pPr>
-                <a:defRPr/>
-              </a:pPr>
-              <a:t>6</a:t>
             </a:fld>
             <a:endParaRPr lang="de-DE" dirty="0"/>
           </a:p>
@@ -6970,7 +8654,7 @@
 </p:sld>
 </file>
 
-<file path=ppt/slides/slide7.xml><?xml version="1.0" encoding="utf-8"?>
+<file path=ppt/slides/slide6.xml><?xml version="1.0" encoding="utf-8"?>
 <p:sld xmlns:a="http://schemas.openxmlformats.org/drawingml/2006/main" xmlns:r="http://schemas.openxmlformats.org/officeDocument/2006/relationships" xmlns:p="http://schemas.openxmlformats.org/presentationml/2006/main">
   <p:cSld>
     <p:spTree>
@@ -7033,7 +8717,7 @@
               <a:pPr>
                 <a:defRPr/>
               </a:pPr>
-              <a:t>7</a:t>
+              <a:t>6</a:t>
             </a:fld>
             <a:endParaRPr lang="de-DE" dirty="0"/>
           </a:p>
@@ -7492,6 +9176,315 @@
 </p:sld>
 </file>
 
+<file path=ppt/slides/slide7.xml><?xml version="1.0" encoding="utf-8"?>
+<p:sld xmlns:a="http://schemas.openxmlformats.org/drawingml/2006/main" xmlns:r="http://schemas.openxmlformats.org/officeDocument/2006/relationships" xmlns:p="http://schemas.openxmlformats.org/presentationml/2006/main">
+  <p:cSld>
+    <p:spTree>
+      <p:nvGrpSpPr>
+        <p:cNvPr id="1" name=""/>
+        <p:cNvGrpSpPr/>
+        <p:nvPr/>
+      </p:nvGrpSpPr>
+      <p:grpSpPr>
+        <a:xfrm>
+          <a:off x="0" y="0"/>
+          <a:ext cx="0" cy="0"/>
+          <a:chOff x="0" y="0"/>
+          <a:chExt cx="0" cy="0"/>
+        </a:xfrm>
+      </p:grpSpPr>
+      <p:sp>
+        <p:nvSpPr>
+          <p:cNvPr id="2" name="Titel 1"/>
+          <p:cNvSpPr>
+            <a:spLocks noGrp="1"/>
+          </p:cNvSpPr>
+          <p:nvPr>
+            <p:ph type="title"/>
+          </p:nvPr>
+        </p:nvSpPr>
+        <p:spPr/>
+        <p:txBody>
+          <a:bodyPr/>
+          <a:lstStyle/>
+          <a:p>
+            <a:r>
+              <a:rPr lang="de-DE" smtClean="0"/>
+              <a:t>Sicherheitsrisiken </a:t>
+            </a:r>
+            <a:br>
+              <a:rPr lang="de-DE" smtClean="0"/>
+            </a:br>
+            <a:r>
+              <a:rPr lang="de-DE" smtClean="0"/>
+              <a:t>technischer Art</a:t>
+            </a:r>
+            <a:endParaRPr lang="de-DE" dirty="0"/>
+          </a:p>
+        </p:txBody>
+      </p:sp>
+      <p:sp>
+        <p:nvSpPr>
+          <p:cNvPr id="10" name="Inhaltsplatzhalter 9"/>
+          <p:cNvSpPr>
+            <a:spLocks noGrp="1"/>
+          </p:cNvSpPr>
+          <p:nvPr>
+            <p:ph idx="1"/>
+          </p:nvPr>
+        </p:nvSpPr>
+        <p:spPr/>
+        <p:txBody>
+          <a:bodyPr/>
+          <a:lstStyle/>
+          <a:p>
+            <a:pPr marL="0" indent="0">
+              <a:buNone/>
+            </a:pPr>
+            <a:r>
+              <a:rPr lang="de-DE" dirty="0" smtClean="0"/>
+              <a:t>Von NI ausgehend…</a:t>
+            </a:r>
+          </a:p>
+          <a:p>
+            <a:pPr marL="0" indent="0">
+              <a:buNone/>
+            </a:pPr>
+            <a:r>
+              <a:rPr lang="de-DE" dirty="0"/>
+              <a:t>	</a:t>
+            </a:r>
+            <a:r>
+              <a:rPr lang="de-DE" dirty="0" smtClean="0"/>
+              <a:t>… gegen VN/VM und User</a:t>
+            </a:r>
+          </a:p>
+          <a:p>
+            <a:r>
+              <a:rPr lang="de-DE" dirty="0"/>
+              <a:t> </a:t>
+            </a:r>
+            <a:endParaRPr lang="de-DE" dirty="0" smtClean="0"/>
+          </a:p>
+        </p:txBody>
+      </p:sp>
+      <p:sp>
+        <p:nvSpPr>
+          <p:cNvPr id="4" name="Foliennummernplatzhalter 3"/>
+          <p:cNvSpPr>
+            <a:spLocks noGrp="1"/>
+          </p:cNvSpPr>
+          <p:nvPr>
+            <p:ph type="sldNum" sz="quarter" idx="4"/>
+          </p:nvPr>
+        </p:nvSpPr>
+        <p:spPr/>
+        <p:txBody>
+          <a:bodyPr/>
+          <a:lstStyle/>
+          <a:p>
+            <a:fld id="{70BFFA52-4234-45F6-B1A6-074E24FF43A2}" type="slidenum">
+              <a:rPr lang="de-DE" smtClean="0"/>
+              <a:pPr/>
+              <a:t>7</a:t>
+            </a:fld>
+            <a:endParaRPr lang="de-DE" dirty="0"/>
+          </a:p>
+        </p:txBody>
+      </p:sp>
+      <p:sp>
+        <p:nvSpPr>
+          <p:cNvPr id="5" name="Fußzeilenplatzhalter 4"/>
+          <p:cNvSpPr>
+            <a:spLocks noGrp="1"/>
+          </p:cNvSpPr>
+          <p:nvPr>
+            <p:ph type="ftr" sz="quarter" idx="3"/>
+          </p:nvPr>
+        </p:nvSpPr>
+        <p:spPr/>
+        <p:txBody>
+          <a:bodyPr/>
+          <a:lstStyle/>
+          <a:p>
+            <a:r>
+              <a:rPr lang="de-DE" smtClean="0"/>
+              <a:t>Sicherheitsaspekte beim Deployment virtueller Netzinfrastrukturen</a:t>
+            </a:r>
+            <a:endParaRPr lang="de-DE" dirty="0"/>
+          </a:p>
+        </p:txBody>
+      </p:sp>
+      <p:pic>
+        <p:nvPicPr>
+          <p:cNvPr id="14" name="Grafik 13"/>
+          <p:cNvPicPr>
+            <a:picLocks noChangeAspect="1"/>
+          </p:cNvPicPr>
+          <p:nvPr/>
+        </p:nvPicPr>
+        <p:blipFill rotWithShape="1">
+          <a:blip r:embed="rId3"/>
+          <a:srcRect t="61198" r="69524"/>
+          <a:stretch/>
+        </p:blipFill>
+        <p:spPr>
+          <a:xfrm>
+            <a:off x="6904248" y="1347759"/>
+            <a:ext cx="1988928" cy="1963218"/>
+          </a:xfrm>
+          <a:prstGeom prst="rect">
+            <a:avLst/>
+          </a:prstGeom>
+        </p:spPr>
+      </p:pic>
+      <p:sp>
+        <p:nvSpPr>
+          <p:cNvPr id="15" name="Rechteck 14"/>
+          <p:cNvSpPr/>
+          <p:nvPr/>
+        </p:nvSpPr>
+        <p:spPr bwMode="auto">
+          <a:xfrm>
+            <a:off x="7466174" y="2456456"/>
+            <a:ext cx="1368152" cy="306000"/>
+          </a:xfrm>
+          <a:prstGeom prst="rect">
+            <a:avLst/>
+          </a:prstGeom>
+          <a:noFill/>
+          <a:ln w="38100" cap="flat" cmpd="sng" algn="ctr">
+            <a:solidFill>
+              <a:srgbClr val="006C30"/>
+            </a:solidFill>
+            <a:prstDash val="solid"/>
+            <a:round/>
+            <a:headEnd type="none" w="med" len="med"/>
+            <a:tailEnd type="none" w="med" len="med"/>
+          </a:ln>
+          <a:effectLst/>
+        </p:spPr>
+        <p:txBody>
+          <a:bodyPr vert="horz" wrap="square" lIns="91440" tIns="45720" rIns="91440" bIns="45720" numCol="1" rtlCol="0" anchor="ctr" anchorCtr="0" compatLnSpc="1">
+            <a:prstTxWarp prst="textNoShape">
+              <a:avLst/>
+            </a:prstTxWarp>
+          </a:bodyPr>
+          <a:lstStyle/>
+          <a:p>
+            <a:pPr marL="0" marR="0" indent="0" algn="l" defTabSz="914400" rtl="0" eaLnBrk="0" fontAlgn="base" latinLnBrk="0" hangingPunct="0">
+              <a:lnSpc>
+                <a:spcPct val="100000"/>
+              </a:lnSpc>
+              <a:spcBef>
+                <a:spcPct val="0"/>
+              </a:spcBef>
+              <a:spcAft>
+                <a:spcPct val="0"/>
+              </a:spcAft>
+              <a:buClrTx/>
+              <a:buSzTx/>
+              <a:buFontTx/>
+              <a:buNone/>
+              <a:tabLst/>
+            </a:pPr>
+            <a:endParaRPr kumimoji="0" lang="de-DE" sz="1400" b="0" i="0" u="none" strike="noStrike" cap="none" normalizeH="0" baseline="0" smtClean="0">
+              <a:ln>
+                <a:noFill/>
+              </a:ln>
+              <a:solidFill>
+                <a:schemeClr val="tx1"/>
+              </a:solidFill>
+              <a:effectLst/>
+              <a:latin typeface="LMU CompatilFact" pitchFamily="2" charset="0"/>
+            </a:endParaRPr>
+          </a:p>
+        </p:txBody>
+      </p:sp>
+      <p:sp>
+        <p:nvSpPr>
+          <p:cNvPr id="16" name="Rechteck 15"/>
+          <p:cNvSpPr/>
+          <p:nvPr/>
+        </p:nvSpPr>
+        <p:spPr bwMode="auto">
+          <a:xfrm>
+            <a:off x="7466174" y="2893122"/>
+            <a:ext cx="1368152" cy="306000"/>
+          </a:xfrm>
+          <a:prstGeom prst="rect">
+            <a:avLst/>
+          </a:prstGeom>
+          <a:noFill/>
+          <a:ln w="38100" cap="flat" cmpd="sng" algn="ctr">
+            <a:solidFill>
+              <a:srgbClr val="006C30"/>
+            </a:solidFill>
+            <a:prstDash val="solid"/>
+            <a:round/>
+            <a:headEnd type="none" w="med" len="med"/>
+            <a:tailEnd type="none" w="med" len="med"/>
+          </a:ln>
+          <a:effectLst/>
+        </p:spPr>
+        <p:txBody>
+          <a:bodyPr vert="horz" wrap="square" lIns="91440" tIns="45720" rIns="91440" bIns="45720" numCol="1" rtlCol="0" anchor="ctr" anchorCtr="0" compatLnSpc="1">
+            <a:prstTxWarp prst="textNoShape">
+              <a:avLst/>
+            </a:prstTxWarp>
+          </a:bodyPr>
+          <a:lstStyle/>
+          <a:p>
+            <a:pPr marL="0" marR="0" indent="0" algn="l" defTabSz="914400" rtl="0" eaLnBrk="0" fontAlgn="base" latinLnBrk="0" hangingPunct="0">
+              <a:lnSpc>
+                <a:spcPct val="100000"/>
+              </a:lnSpc>
+              <a:spcBef>
+                <a:spcPct val="0"/>
+              </a:spcBef>
+              <a:spcAft>
+                <a:spcPct val="0"/>
+              </a:spcAft>
+              <a:buClrTx/>
+              <a:buSzTx/>
+              <a:buFontTx/>
+              <a:buNone/>
+              <a:tabLst/>
+            </a:pPr>
+            <a:endParaRPr kumimoji="0" lang="de-DE" sz="1400" b="0" i="0" u="none" strike="noStrike" cap="none" normalizeH="0" baseline="0" smtClean="0">
+              <a:ln>
+                <a:noFill/>
+              </a:ln>
+              <a:solidFill>
+                <a:schemeClr val="tx1"/>
+              </a:solidFill>
+              <a:effectLst/>
+              <a:latin typeface="LMU CompatilFact" pitchFamily="2" charset="0"/>
+            </a:endParaRPr>
+          </a:p>
+        </p:txBody>
+      </p:sp>
+    </p:spTree>
+    <p:extLst>
+      <p:ext uri="{BB962C8B-B14F-4D97-AF65-F5344CB8AC3E}">
+        <p14:creationId xmlns:p14="http://schemas.microsoft.com/office/powerpoint/2010/main" val="1202343622"/>
+      </p:ext>
+    </p:extLst>
+  </p:cSld>
+  <p:clrMapOvr>
+    <a:masterClrMapping/>
+  </p:clrMapOvr>
+  <p:transition spd="med"/>
+  <p:timing>
+    <p:tnLst>
+      <p:par>
+        <p:cTn id="1" dur="indefinite" restart="never" nodeType="tmRoot"/>
+      </p:par>
+    </p:tnLst>
+  </p:timing>
+</p:sld>
+</file>
+
 <file path=ppt/slides/slide8.xml><?xml version="1.0" encoding="utf-8"?>
 <p:sld xmlns:a="http://schemas.openxmlformats.org/drawingml/2006/main" xmlns:r="http://schemas.openxmlformats.org/officeDocument/2006/relationships" xmlns:p="http://schemas.openxmlformats.org/presentationml/2006/main">
   <p:cSld>
@@ -7525,32 +9518,68 @@
           <a:lstStyle/>
           <a:p>
             <a:r>
+              <a:rPr lang="de-DE" smtClean="0"/>
+              <a:t>Sicherheitsrisiken </a:t>
+            </a:r>
+            <a:br>
+              <a:rPr lang="de-DE" smtClean="0"/>
+            </a:br>
+            <a:r>
+              <a:rPr lang="de-DE" smtClean="0"/>
+              <a:t>technischer Art</a:t>
+            </a:r>
+            <a:endParaRPr lang="de-DE" dirty="0"/>
+          </a:p>
+        </p:txBody>
+      </p:sp>
+      <p:sp>
+        <p:nvSpPr>
+          <p:cNvPr id="10" name="Inhaltsplatzhalter 9"/>
+          <p:cNvSpPr>
+            <a:spLocks noGrp="1"/>
+          </p:cNvSpPr>
+          <p:nvPr>
+            <p:ph idx="1"/>
+          </p:nvPr>
+        </p:nvSpPr>
+        <p:spPr/>
+        <p:txBody>
+          <a:bodyPr/>
+          <a:lstStyle/>
+          <a:p>
+            <a:pPr marL="0" indent="0">
+              <a:buNone/>
+            </a:pPr>
+            <a:r>
               <a:rPr lang="de-DE" dirty="0" smtClean="0"/>
-              <a:t>SVNE-Algorithmen:</a:t>
-            </a:r>
-            <a:br>
+              <a:t>Von VN/VM ausgehend…</a:t>
+            </a:r>
+          </a:p>
+          <a:p>
+            <a:pPr marL="0" indent="0">
+              <a:buNone/>
+            </a:pPr>
+            <a:r>
               <a:rPr lang="de-DE" dirty="0" smtClean="0"/>
-            </a:br>
-            <a:r>
-              <a:rPr lang="de-DE" sz="1800" b="0" dirty="0"/>
-              <a:t>Strikte Trennung und </a:t>
-            </a:r>
-            <a:r>
-              <a:rPr lang="de-DE" sz="1800" b="0" dirty="0" err="1" smtClean="0"/>
-              <a:t>Preprocessing</a:t>
-            </a:r>
-            <a:endParaRPr lang="de-DE" sz="1800" dirty="0"/>
-          </a:p>
-        </p:txBody>
-      </p:sp>
-      <p:sp>
-        <p:nvSpPr>
-          <p:cNvPr id="3" name="Inhaltsplatzhalter 2"/>
+              <a:t>	… gegen NI</a:t>
+            </a:r>
+          </a:p>
+          <a:p>
+            <a:r>
+              <a:rPr lang="de-DE" dirty="0"/>
+              <a:t> </a:t>
+            </a:r>
+          </a:p>
+        </p:txBody>
+      </p:sp>
+      <p:sp>
+        <p:nvSpPr>
+          <p:cNvPr id="4" name="Foliennummernplatzhalter 3"/>
           <p:cNvSpPr>
             <a:spLocks noGrp="1"/>
           </p:cNvSpPr>
           <p:nvPr>
-            <p:ph idx="1"/>
+            <p:ph type="sldNum" sz="quarter" idx="4"/>
           </p:nvPr>
         </p:nvSpPr>
         <p:spPr/>
@@ -7558,33 +9587,9 @@
           <a:bodyPr/>
           <a:lstStyle/>
           <a:p>
-            <a:endParaRPr lang="de-DE" dirty="0"/>
-          </a:p>
-        </p:txBody>
-      </p:sp>
-      <p:sp>
-        <p:nvSpPr>
-          <p:cNvPr id="4" name="Foliennummernplatzhalter 3"/>
-          <p:cNvSpPr>
-            <a:spLocks noGrp="1"/>
-          </p:cNvSpPr>
-          <p:nvPr>
-            <p:ph type="sldNum" sz="quarter" idx="4"/>
-          </p:nvPr>
-        </p:nvSpPr>
-        <p:spPr/>
-        <p:txBody>
-          <a:bodyPr/>
-          <a:lstStyle/>
-          <a:p>
-            <a:pPr>
-              <a:defRPr/>
-            </a:pPr>
             <a:fld id="{70BFFA52-4234-45F6-B1A6-074E24FF43A2}" type="slidenum">
               <a:rPr lang="de-DE" smtClean="0"/>
-              <a:pPr>
-                <a:defRPr/>
-              </a:pPr>
+              <a:pPr/>
               <a:t>8</a:t>
             </a:fld>
             <a:endParaRPr lang="de-DE" dirty="0"/>
@@ -7614,112 +9619,96 @@
           </a:p>
         </p:txBody>
       </p:sp>
-      <p:sp>
-        <p:nvSpPr>
-          <p:cNvPr id="6" name="Textfeld 5"/>
-          <p:cNvSpPr txBox="1"/>
+      <p:pic>
+        <p:nvPicPr>
+          <p:cNvPr id="14" name="Grafik 13"/>
+          <p:cNvPicPr>
+            <a:picLocks noChangeAspect="1"/>
+          </p:cNvPicPr>
           <p:nvPr/>
-        </p:nvSpPr>
+        </p:nvPicPr>
+        <p:blipFill rotWithShape="1">
+          <a:blip r:embed="rId3"/>
+          <a:srcRect l="34338" t="61198" r="34767"/>
+          <a:stretch/>
+        </p:blipFill>
         <p:spPr>
           <a:xfrm>
-            <a:off x="143508" y="6225899"/>
-            <a:ext cx="7564763" cy="461665"/>
+            <a:off x="6876952" y="1347759"/>
+            <a:ext cx="2016224" cy="1963218"/>
+          </a:xfrm>
+          <a:prstGeom prst="rect">
+            <a:avLst/>
+          </a:prstGeom>
+        </p:spPr>
+      </p:pic>
+      <p:sp>
+        <p:nvSpPr>
+          <p:cNvPr id="3" name="Rechteck 2"/>
+          <p:cNvSpPr/>
+          <p:nvPr/>
+        </p:nvSpPr>
+        <p:spPr bwMode="auto">
+          <a:xfrm>
+            <a:off x="7452320" y="2016752"/>
+            <a:ext cx="1368152" cy="306000"/>
           </a:xfrm>
           <a:prstGeom prst="rect">
             <a:avLst/>
           </a:prstGeom>
           <a:noFill/>
+          <a:ln w="38100" cap="flat" cmpd="sng" algn="ctr">
+            <a:solidFill>
+              <a:srgbClr val="006C30"/>
+            </a:solidFill>
+            <a:prstDash val="solid"/>
+            <a:round/>
+            <a:headEnd type="none" w="med" len="med"/>
+            <a:tailEnd type="none" w="med" len="med"/>
+          </a:ln>
+          <a:effectLst/>
         </p:spPr>
         <p:txBody>
-          <a:bodyPr wrap="none" rtlCol="0">
-            <a:spAutoFit/>
+          <a:bodyPr vert="horz" wrap="square" lIns="91440" tIns="45720" rIns="91440" bIns="45720" numCol="1" rtlCol="0" anchor="ctr" anchorCtr="0" compatLnSpc="1">
+            <a:prstTxWarp prst="textNoShape">
+              <a:avLst/>
+            </a:prstTxWarp>
           </a:bodyPr>
           <a:lstStyle/>
           <a:p>
-            <a:r>
-              <a:rPr lang="de-DE" dirty="0" smtClean="0"/>
-              <a:t>[1] Hong </a:t>
-            </a:r>
-            <a:r>
-              <a:rPr lang="de-DE" dirty="0" err="1"/>
-              <a:t>Xu</a:t>
-            </a:r>
-            <a:r>
-              <a:rPr lang="de-DE" dirty="0"/>
-              <a:t> Ming </a:t>
-            </a:r>
-            <a:r>
-              <a:rPr lang="de-DE" dirty="0" err="1"/>
-              <a:t>Xu</a:t>
-            </a:r>
-            <a:r>
-              <a:rPr lang="de-DE" dirty="0"/>
-              <a:t> </a:t>
-            </a:r>
-            <a:r>
-              <a:rPr lang="de-DE" dirty="0" err="1"/>
-              <a:t>Shuhao</a:t>
-            </a:r>
-            <a:r>
-              <a:rPr lang="de-DE" dirty="0"/>
-              <a:t> Liu, </a:t>
-            </a:r>
-            <a:r>
-              <a:rPr lang="de-DE" dirty="0" err="1"/>
-              <a:t>Zhiping</a:t>
-            </a:r>
-            <a:r>
-              <a:rPr lang="de-DE" dirty="0"/>
-              <a:t> Cai. </a:t>
-            </a:r>
-            <a:r>
-              <a:rPr lang="de-DE" dirty="0" err="1"/>
-              <a:t>Towards</a:t>
-            </a:r>
-            <a:r>
-              <a:rPr lang="de-DE" dirty="0"/>
-              <a:t> Security-aware Virtual Network Embedding, 2015.</a:t>
-            </a:r>
-          </a:p>
-          <a:p>
-            <a:endParaRPr lang="de-DE" dirty="0"/>
-          </a:p>
-        </p:txBody>
-      </p:sp>
-      <p:sp>
-        <p:nvSpPr>
-          <p:cNvPr id="7" name="Textfeld 6"/>
-          <p:cNvSpPr txBox="1"/>
-          <p:nvPr/>
-        </p:nvSpPr>
-        <p:spPr>
-          <a:xfrm>
-            <a:off x="5778538" y="692696"/>
-            <a:ext cx="269626" cy="276999"/>
-          </a:xfrm>
-          <a:prstGeom prst="rect">
-            <a:avLst/>
-          </a:prstGeom>
-          <a:noFill/>
-        </p:spPr>
-        <p:txBody>
-          <a:bodyPr wrap="none" rtlCol="0">
-            <a:spAutoFit/>
-          </a:bodyPr>
-          <a:lstStyle/>
-          <a:p>
-            <a:r>
-              <a:rPr lang="de-DE" b="1" dirty="0" smtClean="0"/>
-              <a:t>1</a:t>
-            </a:r>
-            <a:endParaRPr lang="de-DE" b="1" dirty="0"/>
+            <a:pPr marL="0" marR="0" indent="0" algn="l" defTabSz="914400" rtl="0" eaLnBrk="0" fontAlgn="base" latinLnBrk="0" hangingPunct="0">
+              <a:lnSpc>
+                <a:spcPct val="100000"/>
+              </a:lnSpc>
+              <a:spcBef>
+                <a:spcPct val="0"/>
+              </a:spcBef>
+              <a:spcAft>
+                <a:spcPct val="0"/>
+              </a:spcAft>
+              <a:buClrTx/>
+              <a:buSzTx/>
+              <a:buFontTx/>
+              <a:buNone/>
+              <a:tabLst/>
+            </a:pPr>
+            <a:endParaRPr kumimoji="0" lang="de-DE" sz="1400" b="0" i="0" u="none" strike="noStrike" cap="none" normalizeH="0" baseline="0" smtClean="0">
+              <a:ln>
+                <a:noFill/>
+              </a:ln>
+              <a:solidFill>
+                <a:schemeClr val="tx1"/>
+              </a:solidFill>
+              <a:effectLst/>
+              <a:latin typeface="LMU CompatilFact" pitchFamily="2" charset="0"/>
+            </a:endParaRPr>
           </a:p>
         </p:txBody>
       </p:sp>
     </p:spTree>
     <p:extLst>
       <p:ext uri="{BB962C8B-B14F-4D97-AF65-F5344CB8AC3E}">
-        <p14:creationId xmlns:p14="http://schemas.microsoft.com/office/powerpoint/2010/main" val="3408010396"/>
+        <p14:creationId xmlns:p14="http://schemas.microsoft.com/office/powerpoint/2010/main" val="3038497749"/>
       </p:ext>
     </p:extLst>
   </p:cSld>
@@ -7770,28 +9759,68 @@
           <a:lstStyle/>
           <a:p>
             <a:r>
+              <a:rPr lang="de-DE" smtClean="0"/>
+              <a:t>Sicherheitsrisiken </a:t>
+            </a:r>
+            <a:br>
+              <a:rPr lang="de-DE" smtClean="0"/>
+            </a:br>
+            <a:r>
+              <a:rPr lang="de-DE" smtClean="0"/>
+              <a:t>technischer Art</a:t>
+            </a:r>
+            <a:endParaRPr lang="de-DE" dirty="0"/>
+          </a:p>
+        </p:txBody>
+      </p:sp>
+      <p:sp>
+        <p:nvSpPr>
+          <p:cNvPr id="10" name="Inhaltsplatzhalter 9"/>
+          <p:cNvSpPr>
+            <a:spLocks noGrp="1"/>
+          </p:cNvSpPr>
+          <p:nvPr>
+            <p:ph idx="1"/>
+          </p:nvPr>
+        </p:nvSpPr>
+        <p:spPr/>
+        <p:txBody>
+          <a:bodyPr/>
+          <a:lstStyle/>
+          <a:p>
+            <a:pPr marL="0" indent="0">
+              <a:buNone/>
+            </a:pPr>
+            <a:r>
               <a:rPr lang="de-DE" dirty="0" smtClean="0"/>
-              <a:t>SVNE-Algorithmen:</a:t>
-            </a:r>
-            <a:br>
+              <a:t>Von VN/VM ausgehend…</a:t>
+            </a:r>
+          </a:p>
+          <a:p>
+            <a:pPr marL="0" indent="0">
+              <a:buNone/>
+            </a:pPr>
+            <a:r>
               <a:rPr lang="de-DE" dirty="0" smtClean="0"/>
-            </a:br>
-            <a:r>
-              <a:rPr lang="de-DE" sz="1800" b="0" dirty="0"/>
-              <a:t>Sicherheitsvektoren und doppelte Berechnung</a:t>
-            </a:r>
-            <a:endParaRPr lang="de-DE" sz="1800" dirty="0"/>
-          </a:p>
-        </p:txBody>
-      </p:sp>
-      <p:sp>
-        <p:nvSpPr>
-          <p:cNvPr id="3" name="Inhaltsplatzhalter 2"/>
+              <a:t>	… gegen VN/VM</a:t>
+            </a:r>
+          </a:p>
+          <a:p>
+            <a:r>
+              <a:rPr lang="de-DE" dirty="0"/>
+              <a:t> </a:t>
+            </a:r>
+          </a:p>
+        </p:txBody>
+      </p:sp>
+      <p:sp>
+        <p:nvSpPr>
+          <p:cNvPr id="4" name="Foliennummernplatzhalter 3"/>
           <p:cNvSpPr>
             <a:spLocks noGrp="1"/>
           </p:cNvSpPr>
           <p:nvPr>
-            <p:ph idx="1"/>
+            <p:ph type="sldNum" sz="quarter" idx="4"/>
           </p:nvPr>
         </p:nvSpPr>
         <p:spPr/>
@@ -7799,33 +9828,9 @@
           <a:bodyPr/>
           <a:lstStyle/>
           <a:p>
-            <a:endParaRPr lang="de-DE"/>
-          </a:p>
-        </p:txBody>
-      </p:sp>
-      <p:sp>
-        <p:nvSpPr>
-          <p:cNvPr id="4" name="Foliennummernplatzhalter 3"/>
-          <p:cNvSpPr>
-            <a:spLocks noGrp="1"/>
-          </p:cNvSpPr>
-          <p:nvPr>
-            <p:ph type="sldNum" sz="quarter" idx="4"/>
-          </p:nvPr>
-        </p:nvSpPr>
-        <p:spPr/>
-        <p:txBody>
-          <a:bodyPr/>
-          <a:lstStyle/>
-          <a:p>
-            <a:pPr>
-              <a:defRPr/>
-            </a:pPr>
             <a:fld id="{70BFFA52-4234-45F6-B1A6-074E24FF43A2}" type="slidenum">
               <a:rPr lang="de-DE" smtClean="0"/>
-              <a:pPr>
-                <a:defRPr/>
-              </a:pPr>
+              <a:pPr/>
               <a:t>9</a:t>
             </a:fld>
             <a:endParaRPr lang="de-DE" dirty="0"/>
@@ -7855,102 +9860,96 @@
           </a:p>
         </p:txBody>
       </p:sp>
-      <p:sp>
-        <p:nvSpPr>
-          <p:cNvPr id="6" name="Textfeld 5"/>
-          <p:cNvSpPr txBox="1"/>
+      <p:pic>
+        <p:nvPicPr>
+          <p:cNvPr id="14" name="Grafik 13"/>
+          <p:cNvPicPr>
+            <a:picLocks noChangeAspect="1"/>
+          </p:cNvPicPr>
           <p:nvPr/>
-        </p:nvSpPr>
+        </p:nvPicPr>
+        <p:blipFill rotWithShape="1">
+          <a:blip r:embed="rId3"/>
+          <a:srcRect l="34338" t="61198" r="34767"/>
+          <a:stretch/>
+        </p:blipFill>
         <p:spPr>
           <a:xfrm>
-            <a:off x="143508" y="6225899"/>
-            <a:ext cx="8944821" cy="276999"/>
+            <a:off x="6876952" y="1347759"/>
+            <a:ext cx="2016224" cy="1963218"/>
+          </a:xfrm>
+          <a:prstGeom prst="rect">
+            <a:avLst/>
+          </a:prstGeom>
+        </p:spPr>
+      </p:pic>
+      <p:sp>
+        <p:nvSpPr>
+          <p:cNvPr id="3" name="Rechteck 2"/>
+          <p:cNvSpPr/>
+          <p:nvPr/>
+        </p:nvSpPr>
+        <p:spPr bwMode="auto">
+          <a:xfrm>
+            <a:off x="7452320" y="2456892"/>
+            <a:ext cx="1368152" cy="306000"/>
           </a:xfrm>
           <a:prstGeom prst="rect">
             <a:avLst/>
           </a:prstGeom>
           <a:noFill/>
+          <a:ln w="38100" cap="flat" cmpd="sng" algn="ctr">
+            <a:solidFill>
+              <a:srgbClr val="006C30"/>
+            </a:solidFill>
+            <a:prstDash val="solid"/>
+            <a:round/>
+            <a:headEnd type="none" w="med" len="med"/>
+            <a:tailEnd type="none" w="med" len="med"/>
+          </a:ln>
+          <a:effectLst/>
         </p:spPr>
         <p:txBody>
-          <a:bodyPr wrap="none" rtlCol="0">
-            <a:spAutoFit/>
+          <a:bodyPr vert="horz" wrap="square" lIns="91440" tIns="45720" rIns="91440" bIns="45720" numCol="1" rtlCol="0" anchor="ctr" anchorCtr="0" compatLnSpc="1">
+            <a:prstTxWarp prst="textNoShape">
+              <a:avLst/>
+            </a:prstTxWarp>
           </a:bodyPr>
           <a:lstStyle/>
           <a:p>
-            <a:r>
-              <a:rPr lang="de-DE" dirty="0" smtClean="0"/>
-              <a:t>[1] </a:t>
-            </a:r>
-            <a:r>
-              <a:rPr lang="en-US" dirty="0"/>
-              <a:t>Yang Wang, </a:t>
-            </a:r>
-            <a:r>
-              <a:rPr lang="en-US" dirty="0" err="1"/>
-              <a:t>Phanvu</a:t>
-            </a:r>
-            <a:r>
-              <a:rPr lang="en-US" dirty="0"/>
-              <a:t> Chau und </a:t>
-            </a:r>
-            <a:r>
-              <a:rPr lang="en-US" dirty="0" err="1"/>
-              <a:t>Fuyu</a:t>
-            </a:r>
-            <a:r>
-              <a:rPr lang="en-US" dirty="0"/>
-              <a:t> Chen. Towards a secured network virtualization. </a:t>
-            </a:r>
-            <a:r>
-              <a:rPr lang="de-DE" i="1" dirty="0"/>
-              <a:t>Computer Networks</a:t>
-            </a:r>
-            <a:r>
-              <a:rPr lang="de-DE" dirty="0"/>
-              <a:t>, 104:55–65, 2016</a:t>
-            </a:r>
-            <a:r>
-              <a:rPr lang="de-DE" dirty="0" smtClean="0"/>
-              <a:t>.</a:t>
-            </a:r>
-            <a:endParaRPr lang="de-DE" dirty="0"/>
-          </a:p>
-        </p:txBody>
-      </p:sp>
-      <p:sp>
-        <p:nvSpPr>
-          <p:cNvPr id="7" name="Textfeld 6"/>
-          <p:cNvSpPr txBox="1"/>
-          <p:nvPr/>
-        </p:nvSpPr>
-        <p:spPr>
-          <a:xfrm>
-            <a:off x="3330266" y="692696"/>
-            <a:ext cx="269626" cy="276999"/>
-          </a:xfrm>
-          <a:prstGeom prst="rect">
-            <a:avLst/>
-          </a:prstGeom>
-          <a:noFill/>
-        </p:spPr>
-        <p:txBody>
-          <a:bodyPr wrap="none" rtlCol="0">
-            <a:spAutoFit/>
-          </a:bodyPr>
-          <a:lstStyle/>
-          <a:p>
-            <a:r>
-              <a:rPr lang="de-DE" b="1" dirty="0" smtClean="0"/>
-              <a:t>1</a:t>
-            </a:r>
-            <a:endParaRPr lang="de-DE" b="1" dirty="0"/>
+            <a:pPr marL="0" marR="0" indent="0" algn="l" defTabSz="914400" rtl="0" eaLnBrk="0" fontAlgn="base" latinLnBrk="0" hangingPunct="0">
+              <a:lnSpc>
+                <a:spcPct val="100000"/>
+              </a:lnSpc>
+              <a:spcBef>
+                <a:spcPct val="0"/>
+              </a:spcBef>
+              <a:spcAft>
+                <a:spcPct val="0"/>
+              </a:spcAft>
+              <a:buClrTx/>
+              <a:buSzTx/>
+              <a:buFontTx/>
+              <a:buNone/>
+              <a:tabLst/>
+            </a:pPr>
+            <a:endParaRPr kumimoji="0" lang="de-DE" sz="1400" b="0" i="0" u="none" strike="noStrike" cap="none" normalizeH="0" baseline="0" smtClean="0">
+              <a:ln>
+                <a:noFill/>
+              </a:ln>
+              <a:solidFill>
+                <a:schemeClr val="tx1"/>
+              </a:solidFill>
+              <a:effectLst/>
+              <a:latin typeface="LMU CompatilFact" pitchFamily="2" charset="0"/>
+            </a:endParaRPr>
           </a:p>
         </p:txBody>
       </p:sp>
     </p:spTree>
     <p:extLst>
       <p:ext uri="{BB962C8B-B14F-4D97-AF65-F5344CB8AC3E}">
-        <p14:creationId xmlns:p14="http://schemas.microsoft.com/office/powerpoint/2010/main" val="3079377498"/>
+        <p14:creationId xmlns:p14="http://schemas.microsoft.com/office/powerpoint/2010/main" val="1810539594"/>
       </p:ext>
     </p:extLst>
   </p:cSld>

</xml_diff>

<commit_message>
Folien zu Risiken mit Stichpunkten gefüllt
</commit_message>
<xml_diff>
--- a/Referat/PowerPoint/TimvS_SVNE.pptx
+++ b/Referat/PowerPoint/TimvS_SVNE.pptx
@@ -411,7 +411,7 @@
             <a:fld id="{AE02961B-B228-4466-84E5-B65BB245109F}" type="datetimeFigureOut">
               <a:rPr lang="de-DE"/>
               <a:pPr/>
-              <a:t>13.02.2017</a:t>
+              <a:t>14.02.2017</a:t>
             </a:fld>
             <a:endParaRPr lang="de-DE"/>
           </a:p>
@@ -6166,10 +6166,44 @@
             </a:r>
           </a:p>
           <a:p>
-            <a:r>
-              <a:rPr lang="de-DE" dirty="0"/>
-              <a:t> </a:t>
-            </a:r>
+            <a:endParaRPr lang="de-DE" dirty="0" smtClean="0"/>
+          </a:p>
+          <a:p>
+            <a:r>
+              <a:rPr lang="de-DE" dirty="0" smtClean="0"/>
+              <a:t>Monitoring</a:t>
+            </a:r>
+          </a:p>
+          <a:p>
+            <a:r>
+              <a:rPr lang="de-DE" dirty="0" smtClean="0"/>
+              <a:t>Einschleusen konstruierter Nachrichten zum </a:t>
+            </a:r>
+            <a:br>
+              <a:rPr lang="de-DE" dirty="0" smtClean="0"/>
+            </a:br>
+            <a:r>
+              <a:rPr lang="de-DE" dirty="0" smtClean="0"/>
+              <a:t>Abbruch von Peer-</a:t>
+            </a:r>
+            <a:r>
+              <a:rPr lang="de-DE" dirty="0" err="1" smtClean="0"/>
+              <a:t>to</a:t>
+            </a:r>
+            <a:r>
+              <a:rPr lang="de-DE" dirty="0" smtClean="0"/>
+              <a:t>-Peer-Verbindungen</a:t>
+            </a:r>
+          </a:p>
+          <a:p>
+            <a:r>
+              <a:rPr lang="de-DE" dirty="0" smtClean="0"/>
+              <a:t>etc.</a:t>
+            </a:r>
+            <a:endParaRPr lang="de-DE" dirty="0" smtClean="0"/>
+          </a:p>
+          <a:p>
+            <a:endParaRPr lang="de-DE" dirty="0"/>
           </a:p>
         </p:txBody>
       </p:sp>
@@ -6407,10 +6441,50 @@
             </a:r>
           </a:p>
           <a:p>
-            <a:r>
-              <a:rPr lang="de-DE" dirty="0"/>
-              <a:t> </a:t>
-            </a:r>
+            <a:endParaRPr lang="de-DE" dirty="0"/>
+          </a:p>
+          <a:p>
+            <a:r>
+              <a:rPr lang="de-DE" dirty="0" smtClean="0"/>
+              <a:t>Angriffe gegen dynamisch </a:t>
+            </a:r>
+            <a:r>
+              <a:rPr lang="de-DE" dirty="0" err="1" smtClean="0"/>
+              <a:t>umprogrammierbare</a:t>
+            </a:r>
+            <a:r>
+              <a:rPr lang="de-DE" dirty="0" smtClean="0"/>
+              <a:t/>
+            </a:r>
+            <a:br>
+              <a:rPr lang="de-DE" dirty="0" smtClean="0"/>
+            </a:br>
+            <a:r>
+              <a:rPr lang="de-DE" dirty="0" smtClean="0"/>
+              <a:t>Router und Switches</a:t>
+            </a:r>
+          </a:p>
+          <a:p>
+            <a:r>
+              <a:rPr lang="de-DE" dirty="0" smtClean="0"/>
+              <a:t>VM als </a:t>
+            </a:r>
+            <a:r>
+              <a:rPr lang="de-DE" dirty="0" err="1" smtClean="0"/>
+              <a:t>Rootkit</a:t>
+            </a:r>
+            <a:endParaRPr lang="de-DE" dirty="0" smtClean="0"/>
+          </a:p>
+          <a:p>
+            <a:r>
+              <a:rPr lang="de-DE" dirty="0" smtClean="0"/>
+              <a:t>BluePill</a:t>
+            </a:r>
+            <a:r>
+              <a:rPr lang="de-DE" b="1" baseline="30000" dirty="0" smtClean="0"/>
+              <a:t>1</a:t>
+            </a:r>
+            <a:endParaRPr lang="de-DE" b="1" baseline="30000" dirty="0"/>
           </a:p>
         </p:txBody>
       </p:sp>
@@ -6544,6 +6618,96 @@
               <a:effectLst/>
               <a:latin typeface="LMU CompatilFact" pitchFamily="2" charset="0"/>
             </a:endParaRPr>
+          </a:p>
+        </p:txBody>
+      </p:sp>
+      <p:sp>
+        <p:nvSpPr>
+          <p:cNvPr id="6" name="Textfeld 5"/>
+          <p:cNvSpPr txBox="1"/>
+          <p:nvPr/>
+        </p:nvSpPr>
+        <p:spPr>
+          <a:xfrm>
+            <a:off x="143508" y="6176337"/>
+            <a:ext cx="8749668" cy="276999"/>
+          </a:xfrm>
+          <a:prstGeom prst="rect">
+            <a:avLst/>
+          </a:prstGeom>
+          <a:noFill/>
+        </p:spPr>
+        <p:txBody>
+          <a:bodyPr wrap="square" rtlCol="0">
+            <a:spAutoFit/>
+          </a:bodyPr>
+          <a:lstStyle/>
+          <a:p>
+            <a:r>
+              <a:rPr lang="de-DE" dirty="0" smtClean="0"/>
+              <a:t>[1] Joanna </a:t>
+            </a:r>
+            <a:r>
+              <a:rPr lang="de-DE" dirty="0" err="1"/>
+              <a:t>Rutkowska</a:t>
+            </a:r>
+            <a:r>
+              <a:rPr lang="de-DE" dirty="0"/>
+              <a:t> und Alexander </a:t>
+            </a:r>
+            <a:r>
+              <a:rPr lang="de-DE" dirty="0" err="1"/>
+              <a:t>Tereshkin</a:t>
+            </a:r>
+            <a:r>
+              <a:rPr lang="de-DE" dirty="0"/>
+              <a:t>. </a:t>
+            </a:r>
+            <a:r>
+              <a:rPr lang="de-DE" dirty="0" err="1"/>
+              <a:t>Bluepilling</a:t>
+            </a:r>
+            <a:r>
+              <a:rPr lang="de-DE" dirty="0"/>
+              <a:t> </a:t>
+            </a:r>
+            <a:r>
+              <a:rPr lang="de-DE" dirty="0" err="1"/>
+              <a:t>the</a:t>
+            </a:r>
+            <a:r>
+              <a:rPr lang="de-DE" dirty="0"/>
+              <a:t> </a:t>
+            </a:r>
+            <a:r>
+              <a:rPr lang="de-DE" dirty="0" err="1"/>
+              <a:t>xen</a:t>
+            </a:r>
+            <a:r>
+              <a:rPr lang="de-DE" dirty="0"/>
+              <a:t> </a:t>
+            </a:r>
+            <a:r>
+              <a:rPr lang="de-DE" dirty="0" err="1"/>
+              <a:t>hypervisor</a:t>
+            </a:r>
+            <a:r>
+              <a:rPr lang="de-DE" dirty="0"/>
+              <a:t>. </a:t>
+            </a:r>
+            <a:r>
+              <a:rPr lang="de-DE" i="1" dirty="0" smtClean="0"/>
+              <a:t>Black Hat </a:t>
+            </a:r>
+            <a:r>
+              <a:rPr lang="de-DE" i="1" dirty="0"/>
+              <a:t>USA</a:t>
+            </a:r>
+            <a:r>
+              <a:rPr lang="de-DE" dirty="0"/>
+              <a:t>, 2008.</a:t>
+            </a:r>
+            <a:endParaRPr lang="de-DE" dirty="0"/>
           </a:p>
         </p:txBody>
       </p:sp>
@@ -6648,10 +6812,62 @@
             </a:r>
           </a:p>
           <a:p>
+            <a:endParaRPr lang="de-DE" dirty="0"/>
+          </a:p>
+          <a:p>
+            <a:r>
+              <a:rPr lang="de-DE" dirty="0" smtClean="0"/>
+              <a:t>Man-in-</a:t>
+            </a:r>
+            <a:r>
+              <a:rPr lang="de-DE" dirty="0" err="1" smtClean="0"/>
+              <a:t>the</a:t>
+            </a:r>
+            <a:r>
+              <a:rPr lang="de-DE" dirty="0" smtClean="0"/>
+              <a:t>-</a:t>
+            </a:r>
+            <a:r>
+              <a:rPr lang="de-DE" dirty="0" err="1" smtClean="0"/>
+              <a:t>Middle</a:t>
+            </a:r>
+            <a:r>
+              <a:rPr lang="de-DE" dirty="0" smtClean="0"/>
+              <a:t> während Migration des VNs</a:t>
+            </a:r>
+            <a:br>
+              <a:rPr lang="de-DE" dirty="0" smtClean="0"/>
+            </a:br>
+            <a:r>
+              <a:rPr lang="de-DE" dirty="0" smtClean="0"/>
+              <a:t>im Livebetrieb</a:t>
+            </a:r>
+          </a:p>
+          <a:p>
+            <a:r>
+              <a:rPr lang="de-DE" dirty="0" smtClean="0"/>
+              <a:t>Angriffe gegen das VN-Managementtool (XSS, CRSF,</a:t>
+            </a:r>
+            <a:br>
+              <a:rPr lang="de-DE" dirty="0" smtClean="0"/>
+            </a:br>
+            <a:r>
+              <a:rPr lang="de-DE" dirty="0" smtClean="0"/>
+              <a:t>SQL-</a:t>
+            </a:r>
+            <a:r>
+              <a:rPr lang="de-DE" dirty="0" err="1" smtClean="0"/>
+              <a:t>Injection</a:t>
+            </a:r>
             <a:r>
               <a:rPr lang="de-DE" dirty="0"/>
               <a:t> </a:t>
             </a:r>
+            <a:r>
+              <a:rPr lang="de-DE" dirty="0" smtClean="0"/>
+              <a:t>etc.)</a:t>
+            </a:r>
+            <a:endParaRPr lang="de-DE" dirty="0"/>
           </a:p>
         </p:txBody>
       </p:sp>
@@ -6850,35 +7066,8 @@
             </a:br>
             <a:r>
               <a:rPr lang="de-DE" dirty="0" smtClean="0"/>
-              <a:t>organisatorischer un</a:t>
-            </a:r>
-            <a:r>
-              <a:rPr lang="de-DE" dirty="0" smtClean="0"/>
-              <a:t>d rechtlicher </a:t>
-            </a:r>
-            <a:r>
-              <a:rPr lang="de-DE" dirty="0" smtClean="0"/>
-              <a:t>Art</a:t>
-            </a:r>
-            <a:endParaRPr lang="de-DE" dirty="0"/>
-          </a:p>
-        </p:txBody>
-      </p:sp>
-      <p:sp>
-        <p:nvSpPr>
-          <p:cNvPr id="10" name="Inhaltsplatzhalter 9"/>
-          <p:cNvSpPr>
-            <a:spLocks noGrp="1"/>
-          </p:cNvSpPr>
-          <p:nvPr>
-            <p:ph idx="1"/>
-          </p:nvPr>
-        </p:nvSpPr>
-        <p:spPr/>
-        <p:txBody>
-          <a:bodyPr/>
-          <a:lstStyle/>
-          <a:p>
+              <a:t>organisatorischer und rechtlicher Art</a:t>
+            </a:r>
             <a:endParaRPr lang="de-DE" dirty="0"/>
           </a:p>
         </p:txBody>
@@ -6927,6 +7116,25 @@
               <a:t>Sicherheitsaspekte beim Deployment virtueller Netzinfrastrukturen</a:t>
             </a:r>
             <a:endParaRPr lang="de-DE" dirty="0"/>
+          </a:p>
+        </p:txBody>
+      </p:sp>
+      <p:sp>
+        <p:nvSpPr>
+          <p:cNvPr id="6" name="Inhaltsplatzhalter 5"/>
+          <p:cNvSpPr>
+            <a:spLocks noGrp="1"/>
+          </p:cNvSpPr>
+          <p:nvPr>
+            <p:ph idx="1"/>
+          </p:nvPr>
+        </p:nvSpPr>
+        <p:spPr/>
+        <p:txBody>
+          <a:bodyPr/>
+          <a:lstStyle/>
+          <a:p>
+            <a:endParaRPr lang="de-DE"/>
           </a:p>
         </p:txBody>
       </p:sp>
@@ -7717,7 +7925,6 @@
               <a:rPr lang="de-DE" sz="1600" b="1" dirty="0" smtClean="0"/>
               <a:t>Untersuchte Algorithmen</a:t>
             </a:r>
-            <a:endParaRPr lang="de-DE" sz="1600" b="1" dirty="0" smtClean="0"/>
           </a:p>
           <a:p>
             <a:r>
@@ -8080,11 +8287,7 @@
             </a:r>
             <a:r>
               <a:rPr lang="de-DE" dirty="0" smtClean="0"/>
-              <a:t>Systemen</a:t>
-            </a:r>
-            <a:r>
-              <a:rPr lang="de-DE" dirty="0" smtClean="0"/>
-              <a:t>“</a:t>
+              <a:t>Systemen“</a:t>
             </a:r>
             <a:br>
               <a:rPr lang="de-DE" dirty="0" smtClean="0"/>
@@ -9260,9 +9463,28 @@
             </a:r>
           </a:p>
           <a:p>
-            <a:r>
-              <a:rPr lang="de-DE" dirty="0"/>
-              <a:t> </a:t>
+            <a:endParaRPr lang="de-DE" dirty="0" smtClean="0"/>
+          </a:p>
+          <a:p>
+            <a:r>
+              <a:rPr lang="de-DE" dirty="0" smtClean="0"/>
+              <a:t>Monitoring der VM-Aktivitäten</a:t>
+            </a:r>
+          </a:p>
+          <a:p>
+            <a:r>
+              <a:rPr lang="de-DE" dirty="0" err="1" smtClean="0"/>
+              <a:t>Sniffing</a:t>
+            </a:r>
+            <a:r>
+              <a:rPr lang="de-DE" dirty="0" smtClean="0"/>
+              <a:t>, Spoofing</a:t>
+            </a:r>
+          </a:p>
+          <a:p>
+            <a:r>
+              <a:rPr lang="de-DE" dirty="0" smtClean="0"/>
+              <a:t>Manipulation des legitimen Datenverkehrs</a:t>
             </a:r>
             <a:endParaRPr lang="de-DE" dirty="0" smtClean="0"/>
           </a:p>
@@ -9561,13 +9783,57 @@
             </a:pPr>
             <a:r>
               <a:rPr lang="de-DE" dirty="0" smtClean="0"/>
-              <a:t>	… gegen NI</a:t>
-            </a:r>
-          </a:p>
-          <a:p>
-            <a:r>
-              <a:rPr lang="de-DE" dirty="0"/>
+              <a:t>	… gegen </a:t>
+            </a:r>
+            <a:r>
+              <a:rPr lang="de-DE" dirty="0" smtClean="0"/>
+              <a:t>NI / ihren physischen Host</a:t>
+            </a:r>
+            <a:endParaRPr lang="de-DE" dirty="0" smtClean="0"/>
+          </a:p>
+          <a:p>
+            <a:endParaRPr lang="de-DE" dirty="0" smtClean="0"/>
+          </a:p>
+          <a:p>
+            <a:r>
+              <a:rPr lang="de-DE" dirty="0" smtClean="0"/>
+              <a:t>Verwundbarkeiten des Hosts über gemeinsam</a:t>
+            </a:r>
+            <a:br>
+              <a:rPr lang="de-DE" dirty="0" smtClean="0"/>
+            </a:br>
+            <a:r>
+              <a:rPr lang="de-DE" dirty="0" smtClean="0"/>
+              <a:t>genutzte Ressourcen ausnutzen</a:t>
+            </a:r>
+          </a:p>
+          <a:p>
+            <a:r>
+              <a:rPr lang="de-DE" dirty="0" err="1" smtClean="0"/>
+              <a:t>DoS</a:t>
+            </a:r>
+            <a:endParaRPr lang="de-DE" dirty="0" smtClean="0"/>
+          </a:p>
+          <a:p>
+            <a:r>
+              <a:rPr lang="de-DE" dirty="0" smtClean="0"/>
+              <a:t>„break </a:t>
+            </a:r>
+            <a:r>
+              <a:rPr lang="de-DE" dirty="0" err="1" smtClean="0"/>
+              <a:t>of</a:t>
+            </a:r>
+            <a:r>
+              <a:rPr lang="de-DE" dirty="0" smtClean="0"/>
               <a:t> </a:t>
+            </a:r>
+            <a:r>
+              <a:rPr lang="de-DE" dirty="0" err="1" smtClean="0"/>
+              <a:t>isolation</a:t>
+            </a:r>
+            <a:r>
+              <a:rPr lang="de-DE" dirty="0" smtClean="0"/>
+              <a:t>“</a:t>
             </a:r>
           </a:p>
         </p:txBody>
@@ -9806,10 +10072,43 @@
             </a:r>
           </a:p>
           <a:p>
+            <a:endParaRPr lang="de-DE" dirty="0" smtClean="0"/>
+          </a:p>
+          <a:p>
+            <a:r>
+              <a:rPr lang="de-DE" dirty="0" smtClean="0"/>
+              <a:t>Erleichterter Zugang zu Verwundbarkeiten</a:t>
+            </a:r>
+            <a:br>
+              <a:rPr lang="de-DE" dirty="0" smtClean="0"/>
+            </a:br>
+            <a:r>
+              <a:rPr lang="de-DE" dirty="0" smtClean="0"/>
+              <a:t>durch </a:t>
+            </a:r>
             <a:r>
               <a:rPr lang="de-DE" dirty="0"/>
-              <a:t> </a:t>
-            </a:r>
+              <a:t>gemeinsam genutzte Ressourcen </a:t>
+            </a:r>
+          </a:p>
+          <a:p>
+            <a:r>
+              <a:rPr lang="de-DE" dirty="0" smtClean="0"/>
+              <a:t>Virtuelle Netzwerkkarten =&gt; Monitoring anderer VNs/VMs</a:t>
+            </a:r>
+          </a:p>
+          <a:p>
+            <a:r>
+              <a:rPr lang="de-DE" dirty="0" smtClean="0"/>
+              <a:t>Einschleusen </a:t>
+            </a:r>
+            <a:r>
+              <a:rPr lang="de-DE" dirty="0"/>
+              <a:t>von Nachrichten des Netzwerkmanagement-protokolls</a:t>
+            </a:r>
+          </a:p>
+          <a:p>
+            <a:endParaRPr lang="de-DE" dirty="0"/>
           </a:p>
         </p:txBody>
       </p:sp>
@@ -11356,4 +11655,24 @@
   <a:objectDefaults/>
   <a:extraClrSchemeLst/>
 </a:theme>
+</file>
+
+<file path=ppt/webextensions/taskpanes.xml><?xml version="1.0" encoding="utf-8"?>
+<wetp:taskpanes xmlns:wetp="http://schemas.microsoft.com/office/webextensions/taskpanes/2010/11">
+  <wetp:taskpane dockstate="right" visibility="0" width="437" row="3">
+    <wetp:webextensionref xmlns:r="http://schemas.openxmlformats.org/officeDocument/2006/relationships" r:id="rId1"/>
+  </wetp:taskpane>
+</wetp:taskpanes>
+</file>
+
+<file path=ppt/webextensions/webextension1.xml><?xml version="1.0" encoding="utf-8"?>
+<we:webextension xmlns:we="http://schemas.microsoft.com/office/webextensions/webextension/2010/11" id="{ED52F984-82B8-4DBD-8CD7-0C7D9ACB5D81}">
+  <we:reference id="wa104379791" version="1.0.0.0" store="de-DE" storeType="OMEX"/>
+  <we:alternateReferences>
+    <we:reference id="WA104379791" version="1.0.0.0" store="WA104379791" storeType="OMEX"/>
+  </we:alternateReferences>
+  <we:properties/>
+  <we:bindings/>
+  <we:snapshot xmlns:r="http://schemas.openxmlformats.org/officeDocument/2006/relationships"/>
+</we:webextension>
 </file>
</xml_diff>

<commit_message>
Notizen + kleine Formatierungen
</commit_message>
<xml_diff>
--- a/Referat/PowerPoint/TimvS_SVNE.pptx
+++ b/Referat/PowerPoint/TimvS_SVNE.pptx
@@ -173,7 +173,7 @@
   </p:defaultTextStyle>
   <p:extLst>
     <p:ext uri="{EFAFB233-063F-42B5-8137-9DF3F51BA10A}">
-      <p15:sldGuideLst xmlns:p15="http://schemas.microsoft.com/office/powerpoint/2012/main" xmlns="">
+      <p15:sldGuideLst xmlns:p15="http://schemas.microsoft.com/office/powerpoint/2012/main">
         <p15:guide id="1" orient="horz" pos="4042" userDrawn="1">
           <p15:clr>
             <a:srgbClr val="A4A3A4"/>
@@ -187,7 +187,7 @@
       </p15:sldGuideLst>
     </p:ext>
     <p:ext uri="{2D200454-40CA-4A62-9FC3-DE9A4176ACB9}">
-      <p15:notesGuideLst xmlns:p15="http://schemas.microsoft.com/office/powerpoint/2012/main" xmlns="">
+      <p15:notesGuideLst xmlns:p15="http://schemas.microsoft.com/office/powerpoint/2012/main">
         <p15:guide id="1" orient="horz" pos="3103">
           <p15:clr>
             <a:srgbClr val="A4A3A4"/>
@@ -426,7 +426,7 @@
             <a:fld id="{AE02961B-B228-4466-84E5-B65BB245109F}" type="datetimeFigureOut">
               <a:rPr lang="de-DE"/>
               <a:pPr/>
-              <a:t>14.02.2017</a:t>
+              <a:t>15.02.2017</a:t>
             </a:fld>
             <a:endParaRPr lang="de-DE"/>
           </a:p>
@@ -3602,7 +3602,18 @@
   <p:clrMapOvr>
     <a:masterClrMapping/>
   </p:clrMapOvr>
-  <p:transition spd="med"/>
+  <mc:AlternateContent xmlns:mc="http://schemas.openxmlformats.org/markup-compatibility/2006">
+    <mc:Choice xmlns:p14="http://schemas.microsoft.com/office/powerpoint/2010/main" Requires="p14">
+      <p:transition spd="med" p14:dur="700">
+        <p:fade/>
+      </p:transition>
+    </mc:Choice>
+    <mc:Fallback>
+      <p:transition spd="med">
+        <p:fade/>
+      </p:transition>
+    </mc:Fallback>
+  </mc:AlternateContent>
   <p:timing>
     <p:tnLst>
       <p:par>
@@ -3981,7 +3992,18 @@
   <p:clrMapOvr>
     <a:masterClrMapping/>
   </p:clrMapOvr>
-  <p:transition spd="med"/>
+  <mc:AlternateContent xmlns:mc="http://schemas.openxmlformats.org/markup-compatibility/2006">
+    <mc:Choice xmlns:p14="http://schemas.microsoft.com/office/powerpoint/2010/main" Requires="p14">
+      <p:transition spd="med" p14:dur="700">
+        <p:fade/>
+      </p:transition>
+    </mc:Choice>
+    <mc:Fallback>
+      <p:transition spd="med">
+        <p:fade/>
+      </p:transition>
+    </mc:Fallback>
+  </mc:AlternateContent>
   <p:timing>
     <p:tnLst>
       <p:par>
@@ -4223,7 +4245,18 @@
   <p:clrMapOvr>
     <a:masterClrMapping/>
   </p:clrMapOvr>
-  <p:transition spd="med"/>
+  <mc:AlternateContent xmlns:mc="http://schemas.openxmlformats.org/markup-compatibility/2006">
+    <mc:Choice xmlns:p14="http://schemas.microsoft.com/office/powerpoint/2010/main" Requires="p14">
+      <p:transition spd="med" p14:dur="700">
+        <p:fade/>
+      </p:transition>
+    </mc:Choice>
+    <mc:Fallback>
+      <p:transition spd="med">
+        <p:fade/>
+      </p:transition>
+    </mc:Fallback>
+  </mc:AlternateContent>
   <p:timing>
     <p:tnLst>
       <p:par>
@@ -4474,7 +4507,18 @@
   <p:clrMapOvr>
     <a:masterClrMapping/>
   </p:clrMapOvr>
-  <p:transition spd="med"/>
+  <mc:AlternateContent xmlns:mc="http://schemas.openxmlformats.org/markup-compatibility/2006">
+    <mc:Choice xmlns:p14="http://schemas.microsoft.com/office/powerpoint/2010/main" Requires="p14">
+      <p:transition spd="med" p14:dur="700">
+        <p:fade/>
+      </p:transition>
+    </mc:Choice>
+    <mc:Fallback>
+      <p:transition spd="med">
+        <p:fade/>
+      </p:transition>
+    </mc:Fallback>
+  </mc:AlternateContent>
   <p:timing>
     <p:tnLst>
       <p:par>
@@ -4729,7 +4773,18 @@
   <p:clrMapOvr>
     <a:masterClrMapping/>
   </p:clrMapOvr>
-  <p:transition spd="med"/>
+  <mc:AlternateContent xmlns:mc="http://schemas.openxmlformats.org/markup-compatibility/2006">
+    <mc:Choice xmlns:p14="http://schemas.microsoft.com/office/powerpoint/2010/main" Requires="p14">
+      <p:transition spd="med" p14:dur="700">
+        <p:fade/>
+      </p:transition>
+    </mc:Choice>
+    <mc:Fallback>
+      <p:transition spd="med">
+        <p:fade/>
+      </p:transition>
+    </mc:Fallback>
+  </mc:AlternateContent>
   <p:timing>
     <p:tnLst>
       <p:par>
@@ -4984,7 +5039,18 @@
   <p:clrMapOvr>
     <a:masterClrMapping/>
   </p:clrMapOvr>
-  <p:transition spd="med"/>
+  <mc:AlternateContent xmlns:mc="http://schemas.openxmlformats.org/markup-compatibility/2006">
+    <mc:Choice xmlns:p14="http://schemas.microsoft.com/office/powerpoint/2010/main" Requires="p14">
+      <p:transition spd="med" p14:dur="700">
+        <p:fade/>
+      </p:transition>
+    </mc:Choice>
+    <mc:Fallback>
+      <p:transition spd="med">
+        <p:fade/>
+      </p:transition>
+    </mc:Fallback>
+  </mc:AlternateContent>
   <p:timing>
     <p:tnLst>
       <p:par>
@@ -5235,7 +5301,18 @@
   <p:clrMapOvr>
     <a:masterClrMapping/>
   </p:clrMapOvr>
-  <p:transition spd="med"/>
+  <mc:AlternateContent xmlns:mc="http://schemas.openxmlformats.org/markup-compatibility/2006">
+    <mc:Choice xmlns:p14="http://schemas.microsoft.com/office/powerpoint/2010/main" Requires="p14">
+      <p:transition spd="med" p14:dur="700">
+        <p:fade/>
+      </p:transition>
+    </mc:Choice>
+    <mc:Fallback>
+      <p:transition spd="med">
+        <p:fade/>
+      </p:transition>
+    </mc:Fallback>
+  </mc:AlternateContent>
   <p:timing>
     <p:tnLst>
       <p:par>
@@ -5614,7 +5691,18 @@
   <p:clrMapOvr>
     <a:masterClrMapping/>
   </p:clrMapOvr>
-  <p:transition spd="med"/>
+  <mc:AlternateContent xmlns:mc="http://schemas.openxmlformats.org/markup-compatibility/2006">
+    <mc:Choice xmlns:p14="http://schemas.microsoft.com/office/powerpoint/2010/main" Requires="p14">
+      <p:transition spd="med" p14:dur="700">
+        <p:fade/>
+      </p:transition>
+    </mc:Choice>
+    <mc:Fallback>
+      <p:transition spd="med">
+        <p:fade/>
+      </p:transition>
+    </mc:Fallback>
+  </mc:AlternateContent>
   <p:timing>
     <p:tnLst>
       <p:par>
@@ -5997,7 +6085,18 @@
   <p:clrMapOvr>
     <a:masterClrMapping/>
   </p:clrMapOvr>
-  <p:transition spd="med"/>
+  <mc:AlternateContent xmlns:mc="http://schemas.openxmlformats.org/markup-compatibility/2006">
+    <mc:Choice xmlns:p14="http://schemas.microsoft.com/office/powerpoint/2010/main" Requires="p14">
+      <p:transition spd="med" p14:dur="700">
+        <p:fade/>
+      </p:transition>
+    </mc:Choice>
+    <mc:Fallback>
+      <p:transition spd="med">
+        <p:fade/>
+      </p:transition>
+    </mc:Fallback>
+  </mc:AlternateContent>
   <p:timing>
     <p:tnLst>
       <p:par>
@@ -6380,7 +6479,18 @@
   <p:clrMapOvr>
     <a:masterClrMapping/>
   </p:clrMapOvr>
-  <p:transition spd="med"/>
+  <mc:AlternateContent xmlns:mc="http://schemas.openxmlformats.org/markup-compatibility/2006">
+    <mc:Choice xmlns:p14="http://schemas.microsoft.com/office/powerpoint/2010/main" Requires="p14">
+      <p:transition spd="med" p14:dur="700">
+        <p:fade/>
+      </p:transition>
+    </mc:Choice>
+    <mc:Fallback>
+      <p:transition spd="med">
+        <p:fade/>
+      </p:transition>
+    </mc:Fallback>
+  </mc:AlternateContent>
   <p:timing>
     <p:tnLst>
       <p:par>
@@ -6879,7 +6989,18 @@
     <p:sldLayoutId id="2147483695" r:id="rId9"/>
     <p:sldLayoutId id="2147483696" r:id="rId10"/>
   </p:sldLayoutIdLst>
-  <p:transition spd="med"/>
+  <mc:AlternateContent xmlns:mc="http://schemas.openxmlformats.org/markup-compatibility/2006">
+    <mc:Choice xmlns:p14="http://schemas.microsoft.com/office/powerpoint/2010/main" Requires="p14">
+      <p:transition spd="med" p14:dur="700">
+        <p:fade/>
+      </p:transition>
+    </mc:Choice>
+    <mc:Fallback>
+      <p:transition spd="med">
+        <p:fade/>
+      </p:transition>
+    </mc:Fallback>
+  </mc:AlternateContent>
   <p:timing>
     <p:tnLst>
       <p:par>
@@ -7365,7 +7486,18 @@
   <p:clrMapOvr>
     <a:masterClrMapping/>
   </p:clrMapOvr>
-  <p:transition spd="med"/>
+  <mc:AlternateContent xmlns:mc="http://schemas.openxmlformats.org/markup-compatibility/2006">
+    <mc:Choice xmlns:p14="http://schemas.microsoft.com/office/powerpoint/2010/main" Requires="p14">
+      <p:transition spd="med" p14:dur="700">
+        <p:fade/>
+      </p:transition>
+    </mc:Choice>
+    <mc:Fallback>
+      <p:transition spd="med">
+        <p:fade/>
+      </p:transition>
+    </mc:Fallback>
+  </mc:AlternateContent>
   <p:timing>
     <p:tnLst>
       <p:par>
@@ -7641,7 +7773,7 @@
         </p:blipFill>
         <p:spPr bwMode="auto">
           <a:xfrm>
-            <a:off x="6896" y="1183534"/>
+            <a:off x="6896" y="1199349"/>
             <a:ext cx="2714102" cy="861499"/>
           </a:xfrm>
           <a:prstGeom prst="rect">
@@ -8024,7 +8156,7 @@
         </p:blipFill>
         <p:spPr bwMode="auto">
           <a:xfrm>
-            <a:off x="6896" y="1183534"/>
+            <a:off x="6896" y="1199349"/>
             <a:ext cx="2714102" cy="861499"/>
           </a:xfrm>
           <a:prstGeom prst="rect">
@@ -8174,8 +8306,8 @@
         </p:nvSpPr>
         <p:spPr>
           <a:xfrm>
-            <a:off x="1031567" y="6182580"/>
-            <a:ext cx="7057060" cy="276999"/>
+            <a:off x="55276" y="6182580"/>
+            <a:ext cx="9009646" cy="276999"/>
           </a:xfrm>
           <a:prstGeom prst="rect">
             <a:avLst/>
@@ -8191,7 +8323,11 @@
             <a:pPr algn="ctr"/>
             <a:r>
               <a:rPr lang="de-DE" dirty="0" smtClean="0"/>
-              <a:t>Die Substratnetze zweier Infrastructure Provider hosten zwei virtuelle Netze eines Service Providers.</a:t>
+              <a:t>Drei-Schichten-Architektur. Die </a:t>
+            </a:r>
+            <a:r>
+              <a:rPr lang="de-DE" dirty="0" smtClean="0"/>
+              <a:t>Substratnetze zweier Infrastructure Provider hosten zwei virtuelle Netze eines Service Providers.</a:t>
             </a:r>
             <a:endParaRPr lang="de-DE" dirty="0"/>
           </a:p>
@@ -8231,7 +8367,18 @@
   <p:clrMapOvr>
     <a:masterClrMapping/>
   </p:clrMapOvr>
-  <p:transition spd="med"/>
+  <mc:AlternateContent xmlns:mc="http://schemas.openxmlformats.org/markup-compatibility/2006">
+    <mc:Choice xmlns:p14="http://schemas.microsoft.com/office/powerpoint/2010/main" Requires="p14">
+      <p:transition spd="med" p14:dur="700">
+        <p:fade/>
+      </p:transition>
+    </mc:Choice>
+    <mc:Fallback>
+      <p:transition spd="med">
+        <p:fade/>
+      </p:transition>
+    </mc:Fallback>
+  </mc:AlternateContent>
   <p:timing>
     <p:tnLst>
       <p:par>
@@ -8620,7 +8767,18 @@
   <p:clrMapOvr>
     <a:masterClrMapping/>
   </p:clrMapOvr>
-  <p:transition spd="med"/>
+  <mc:AlternateContent xmlns:mc="http://schemas.openxmlformats.org/markup-compatibility/2006">
+    <mc:Choice xmlns:p14="http://schemas.microsoft.com/office/powerpoint/2010/main" Requires="p14">
+      <p:transition spd="med" p14:dur="700">
+        <p:fade/>
+      </p:transition>
+    </mc:Choice>
+    <mc:Fallback>
+      <p:transition spd="med">
+        <p:fade/>
+      </p:transition>
+    </mc:Fallback>
+  </mc:AlternateContent>
   <p:timing>
     <p:tnLst>
       <p:par>
@@ -8830,7 +8988,7 @@
               <a:buNone/>
             </a:pPr>
             <a:r>
-              <a:rPr lang="de-DE" dirty="0" smtClean="0"/>
+              <a:rPr lang="de-DE" b="1" dirty="0" smtClean="0"/>
               <a:t>Von NI ausgehend…</a:t>
             </a:r>
           </a:p>
@@ -8839,11 +8997,11 @@
               <a:buNone/>
             </a:pPr>
             <a:r>
-              <a:rPr lang="de-DE" dirty="0"/>
+              <a:rPr lang="de-DE" b="1" dirty="0"/>
               <a:t>	</a:t>
             </a:r>
             <a:r>
-              <a:rPr lang="de-DE" dirty="0" smtClean="0"/>
+              <a:rPr lang="de-DE" b="1" dirty="0" smtClean="0"/>
               <a:t>… gegen VN/VM und User</a:t>
             </a:r>
           </a:p>
@@ -9080,7 +9238,18 @@
   <p:clrMapOvr>
     <a:masterClrMapping/>
   </p:clrMapOvr>
-  <p:transition spd="med"/>
+  <mc:AlternateContent xmlns:mc="http://schemas.openxmlformats.org/markup-compatibility/2006">
+    <mc:Choice xmlns:p14="http://schemas.microsoft.com/office/powerpoint/2010/main" Requires="p14">
+      <p:transition spd="med" p14:dur="700">
+        <p:fade/>
+      </p:transition>
+    </mc:Choice>
+    <mc:Fallback>
+      <p:transition spd="med">
+        <p:fade/>
+      </p:transition>
+    </mc:Fallback>
+  </mc:AlternateContent>
   <p:timing>
     <p:tnLst>
       <p:par>
@@ -9157,7 +9326,7 @@
               <a:buNone/>
             </a:pPr>
             <a:r>
-              <a:rPr lang="de-DE" dirty="0" smtClean="0"/>
+              <a:rPr lang="de-DE" b="1" dirty="0" smtClean="0"/>
               <a:t>Von VN/VM ausgehend…</a:t>
             </a:r>
           </a:p>
@@ -9166,24 +9335,32 @@
               <a:buNone/>
             </a:pPr>
             <a:r>
+              <a:rPr lang="de-DE" b="1" dirty="0" smtClean="0"/>
+              <a:t>	… gegen NI / ihren physischen Host</a:t>
+            </a:r>
+          </a:p>
+          <a:p>
+            <a:endParaRPr lang="de-DE" dirty="0" smtClean="0"/>
+          </a:p>
+          <a:p>
+            <a:r>
               <a:rPr lang="de-DE" dirty="0" smtClean="0"/>
-              <a:t>	… gegen NI / ihren physischen Host</a:t>
-            </a:r>
-          </a:p>
-          <a:p>
-            <a:endParaRPr lang="de-DE" dirty="0" smtClean="0"/>
-          </a:p>
-          <a:p>
+              <a:t>Verwundbarkeiten des Hosts über </a:t>
+            </a:r>
             <a:r>
               <a:rPr lang="de-DE" dirty="0" smtClean="0"/>
-              <a:t>Verwundbarkeiten des Hosts über gemeinsam</a:t>
+              <a:t>zur </a:t>
             </a:r>
             <a:br>
               <a:rPr lang="de-DE" dirty="0" smtClean="0"/>
             </a:br>
             <a:r>
               <a:rPr lang="de-DE" dirty="0" smtClean="0"/>
-              <a:t>genutzte Ressourcen ausnutzen</a:t>
+              <a:t>Verfügung gestellte </a:t>
+            </a:r>
+            <a:r>
+              <a:rPr lang="de-DE" dirty="0" smtClean="0"/>
+              <a:t>Ressourcen ausnutzen</a:t>
             </a:r>
           </a:p>
           <a:p>
@@ -9360,7 +9537,18 @@
   <p:clrMapOvr>
     <a:masterClrMapping/>
   </p:clrMapOvr>
-  <p:transition spd="med"/>
+  <mc:AlternateContent xmlns:mc="http://schemas.openxmlformats.org/markup-compatibility/2006">
+    <mc:Choice xmlns:p14="http://schemas.microsoft.com/office/powerpoint/2010/main" Requires="p14">
+      <p:transition spd="med" p14:dur="700">
+        <p:fade/>
+      </p:transition>
+    </mc:Choice>
+    <mc:Fallback>
+      <p:transition spd="med">
+        <p:fade/>
+      </p:transition>
+    </mc:Fallback>
+  </mc:AlternateContent>
   <p:timing>
     <p:tnLst>
       <p:par>
@@ -9437,7 +9625,7 @@
               <a:buNone/>
             </a:pPr>
             <a:r>
-              <a:rPr lang="de-DE" dirty="0" smtClean="0"/>
+              <a:rPr lang="de-DE" b="1" dirty="0" smtClean="0"/>
               <a:t>Von VN/VM ausgehend…</a:t>
             </a:r>
           </a:p>
@@ -9446,7 +9634,7 @@
               <a:buNone/>
             </a:pPr>
             <a:r>
-              <a:rPr lang="de-DE" dirty="0" smtClean="0"/>
+              <a:rPr lang="de-DE" b="1" dirty="0" smtClean="0"/>
               <a:t>	… gegen VN/VM</a:t>
             </a:r>
           </a:p>
@@ -9634,7 +9822,18 @@
   <p:clrMapOvr>
     <a:masterClrMapping/>
   </p:clrMapOvr>
-  <p:transition spd="med"/>
+  <mc:AlternateContent xmlns:mc="http://schemas.openxmlformats.org/markup-compatibility/2006">
+    <mc:Choice xmlns:p14="http://schemas.microsoft.com/office/powerpoint/2010/main" Requires="p14">
+      <p:transition spd="med" p14:dur="700">
+        <p:fade/>
+      </p:transition>
+    </mc:Choice>
+    <mc:Fallback>
+      <p:transition spd="med">
+        <p:fade/>
+      </p:transition>
+    </mc:Fallback>
+  </mc:AlternateContent>
   <p:timing>
     <p:tnLst>
       <p:par>
@@ -9711,7 +9910,7 @@
               <a:buNone/>
             </a:pPr>
             <a:r>
-              <a:rPr lang="de-DE" dirty="0" smtClean="0"/>
+              <a:rPr lang="de-DE" b="1" dirty="0" smtClean="0"/>
               <a:t>Von VN/VM ausgehend…</a:t>
             </a:r>
           </a:p>
@@ -9720,7 +9919,7 @@
               <a:buNone/>
             </a:pPr>
             <a:r>
-              <a:rPr lang="de-DE" dirty="0" smtClean="0"/>
+              <a:rPr lang="de-DE" b="1" dirty="0" smtClean="0"/>
               <a:t>	… gegen User</a:t>
             </a:r>
           </a:p>
@@ -9908,7 +10107,18 @@
   <p:clrMapOvr>
     <a:masterClrMapping/>
   </p:clrMapOvr>
-  <p:transition spd="med"/>
+  <mc:AlternateContent xmlns:mc="http://schemas.openxmlformats.org/markup-compatibility/2006">
+    <mc:Choice xmlns:p14="http://schemas.microsoft.com/office/powerpoint/2010/main" Requires="p14">
+      <p:transition spd="med" p14:dur="700">
+        <p:fade/>
+      </p:transition>
+    </mc:Choice>
+    <mc:Fallback>
+      <p:transition spd="med">
+        <p:fade/>
+      </p:transition>
+    </mc:Fallback>
+  </mc:AlternateContent>
   <p:timing>
     <p:tnLst>
       <p:par>
@@ -9985,7 +10195,7 @@
               <a:buNone/>
             </a:pPr>
             <a:r>
-              <a:rPr lang="de-DE" dirty="0" smtClean="0"/>
+              <a:rPr lang="de-DE" b="1" dirty="0" smtClean="0"/>
               <a:t>Vom User ausgehend…</a:t>
             </a:r>
           </a:p>
@@ -9994,7 +10204,7 @@
               <a:buNone/>
             </a:pPr>
             <a:r>
-              <a:rPr lang="de-DE" dirty="0" smtClean="0"/>
+              <a:rPr lang="de-DE" b="1" dirty="0" smtClean="0"/>
               <a:t>	… gegen NI</a:t>
             </a:r>
           </a:p>
@@ -10005,10 +10215,6 @@
             <a:r>
               <a:rPr lang="de-DE" dirty="0" smtClean="0"/>
               <a:t>Angriffe gegen dynamisch </a:t>
-            </a:r>
-            <a:r>
-              <a:rPr lang="de-DE" dirty="0" err="1" smtClean="0"/>
-              <a:t>umprogrammierbare</a:t>
             </a:r>
             <a:r>
               <a:rPr lang="de-DE" dirty="0" smtClean="0"/>
@@ -10018,8 +10224,16 @@
               <a:rPr lang="de-DE" dirty="0" smtClean="0"/>
             </a:br>
             <a:r>
+              <a:rPr lang="de-DE" dirty="0" err="1" smtClean="0"/>
+              <a:t>umprogrammierbare</a:t>
+            </a:r>
+            <a:r>
               <a:rPr lang="de-DE" dirty="0" smtClean="0"/>
-              <a:t>Router und Switches</a:t>
+              <a:t> Router </a:t>
+            </a:r>
+            <a:r>
+              <a:rPr lang="de-DE" dirty="0" smtClean="0"/>
+              <a:t>und Switches</a:t>
             </a:r>
           </a:p>
           <a:p>
@@ -10278,7 +10492,18 @@
   <p:clrMapOvr>
     <a:masterClrMapping/>
   </p:clrMapOvr>
-  <p:transition spd="med"/>
+  <mc:AlternateContent xmlns:mc="http://schemas.openxmlformats.org/markup-compatibility/2006">
+    <mc:Choice xmlns:p14="http://schemas.microsoft.com/office/powerpoint/2010/main" Requires="p14">
+      <p:transition spd="med" p14:dur="700">
+        <p:fade/>
+      </p:transition>
+    </mc:Choice>
+    <mc:Fallback>
+      <p:transition spd="med">
+        <p:fade/>
+      </p:transition>
+    </mc:Fallback>
+  </mc:AlternateContent>
   <p:timing>
     <p:tnLst>
       <p:par>
@@ -10355,7 +10580,7 @@
               <a:buNone/>
             </a:pPr>
             <a:r>
-              <a:rPr lang="de-DE" dirty="0" smtClean="0"/>
+              <a:rPr lang="de-DE" b="1" dirty="0" smtClean="0"/>
               <a:t>Vom User ausgehend…</a:t>
             </a:r>
           </a:p>
@@ -10364,7 +10589,7 @@
               <a:buNone/>
             </a:pPr>
             <a:r>
-              <a:rPr lang="de-DE" dirty="0" smtClean="0"/>
+              <a:rPr lang="de-DE" b="1" dirty="0" smtClean="0"/>
               <a:t>	… gegen VN/VM</a:t>
             </a:r>
           </a:p>
@@ -10390,20 +10615,41 @@
             </a:r>
             <a:r>
               <a:rPr lang="de-DE" dirty="0" smtClean="0"/>
-              <a:t> während Migration des VNs</a:t>
+              <a:t> während Migration </a:t>
+            </a:r>
+            <a:r>
+              <a:rPr lang="de-DE" dirty="0" smtClean="0"/>
+              <a:t/>
             </a:r>
             <a:br>
               <a:rPr lang="de-DE" dirty="0" smtClean="0"/>
             </a:br>
             <a:r>
               <a:rPr lang="de-DE" dirty="0" smtClean="0"/>
-              <a:t>im Livebetrieb</a:t>
-            </a:r>
+              <a:t>des VNs im Livebetrieb</a:t>
+            </a:r>
+            <a:r>
+              <a:rPr lang="de-DE" b="1" baseline="30000" dirty="0" smtClean="0"/>
+              <a:t>1</a:t>
+            </a:r>
+            <a:endParaRPr lang="de-DE" b="1" baseline="30000" dirty="0" smtClean="0"/>
           </a:p>
           <a:p>
             <a:r>
               <a:rPr lang="de-DE" dirty="0" smtClean="0"/>
-              <a:t>Angriffe gegen das VN-Managementtool (XSS, CRSF,</a:t>
+              <a:t>Angriffe gegen das VN-Managementtool </a:t>
+            </a:r>
+            <a:r>
+              <a:rPr lang="de-DE" dirty="0" smtClean="0"/>
+              <a:t>(</a:t>
+            </a:r>
+            <a:r>
+              <a:rPr lang="de-DE" dirty="0" smtClean="0"/>
+              <a:t>XSS, </a:t>
+            </a:r>
+            <a:r>
+              <a:rPr lang="de-DE" dirty="0" smtClean="0"/>
+              <a:t>CRSF,</a:t>
             </a:r>
             <a:br>
               <a:rPr lang="de-DE" dirty="0" smtClean="0"/>
@@ -10417,7 +10663,7 @@
               <a:t>Injection</a:t>
             </a:r>
             <a:r>
-              <a:rPr lang="de-DE" dirty="0"/>
+              <a:rPr lang="de-DE" dirty="0" smtClean="0"/>
               <a:t> </a:t>
             </a:r>
             <a:r>
@@ -10561,6 +10807,68 @@
           </a:p>
         </p:txBody>
       </p:sp>
+      <p:sp>
+        <p:nvSpPr>
+          <p:cNvPr id="6" name="Textfeld 5"/>
+          <p:cNvSpPr txBox="1"/>
+          <p:nvPr/>
+        </p:nvSpPr>
+        <p:spPr>
+          <a:xfrm>
+            <a:off x="143508" y="6215490"/>
+            <a:ext cx="8449502" cy="276999"/>
+          </a:xfrm>
+          <a:prstGeom prst="rect">
+            <a:avLst/>
+          </a:prstGeom>
+          <a:noFill/>
+        </p:spPr>
+        <p:txBody>
+          <a:bodyPr wrap="square" rtlCol="0">
+            <a:spAutoFit/>
+          </a:bodyPr>
+          <a:lstStyle/>
+          <a:p>
+            <a:r>
+              <a:rPr lang="en-US" dirty="0" smtClean="0"/>
+              <a:t>[1] </a:t>
+            </a:r>
+            <a:r>
+              <a:rPr lang="en-US" dirty="0" err="1" smtClean="0"/>
+              <a:t>Sriram</a:t>
+            </a:r>
+            <a:r>
+              <a:rPr lang="en-US" dirty="0" smtClean="0"/>
+              <a:t> </a:t>
+            </a:r>
+            <a:r>
+              <a:rPr lang="en-US" dirty="0"/>
+              <a:t>Natarajan und </a:t>
+            </a:r>
+            <a:r>
+              <a:rPr lang="en-US" dirty="0" err="1"/>
+              <a:t>Tilman</a:t>
+            </a:r>
+            <a:r>
+              <a:rPr lang="en-US" dirty="0"/>
+              <a:t> Wolf. Security Issues in Network Virtualization for </a:t>
+            </a:r>
+            <a:r>
+              <a:rPr lang="en-US" dirty="0" smtClean="0"/>
+              <a:t>the </a:t>
+            </a:r>
+            <a:r>
+              <a:rPr lang="de-DE" dirty="0" smtClean="0"/>
+              <a:t>Future </a:t>
+            </a:r>
+            <a:r>
+              <a:rPr lang="de-DE" dirty="0"/>
+              <a:t>Internet.</a:t>
+            </a:r>
+            <a:endParaRPr lang="de-DE" dirty="0"/>
+          </a:p>
+        </p:txBody>
+      </p:sp>
     </p:spTree>
     <p:extLst>
       <p:ext uri="{BB962C8B-B14F-4D97-AF65-F5344CB8AC3E}">
@@ -10571,7 +10879,18 @@
   <p:clrMapOvr>
     <a:masterClrMapping/>
   </p:clrMapOvr>
-  <p:transition spd="med"/>
+  <mc:AlternateContent xmlns:mc="http://schemas.openxmlformats.org/markup-compatibility/2006">
+    <mc:Choice xmlns:p14="http://schemas.microsoft.com/office/powerpoint/2010/main" Requires="p14">
+      <p:transition spd="med" p14:dur="700">
+        <p:fade/>
+      </p:transition>
+    </mc:Choice>
+    <mc:Fallback>
+      <p:transition spd="med">
+        <p:fade/>
+      </p:transition>
+    </mc:Fallback>
+  </mc:AlternateContent>
   <p:timing>
     <p:tnLst>
       <p:par>
@@ -10697,14 +11016,11 @@
             </a:r>
             <a:r>
               <a:rPr lang="de-DE" dirty="0"/>
-              <a:t> virtueller</a:t>
-            </a:r>
-            <a:br>
-              <a:rPr lang="de-DE" dirty="0"/>
-            </a:br>
+              <a:t> </a:t>
+            </a:r>
             <a:r>
               <a:rPr lang="de-DE" dirty="0" smtClean="0"/>
-              <a:t>Netzinfrastrukturen</a:t>
+              <a:t>virtueller Netzinfrastrukturen</a:t>
             </a:r>
             <a:endParaRPr lang="de-DE" dirty="0"/>
           </a:p>
@@ -10751,7 +11067,18 @@
   <p:clrMapOvr>
     <a:masterClrMapping/>
   </p:clrMapOvr>
-  <p:transition spd="med"/>
+  <mc:AlternateContent xmlns:mc="http://schemas.openxmlformats.org/markup-compatibility/2006">
+    <mc:Choice xmlns:p14="http://schemas.microsoft.com/office/powerpoint/2010/main" Requires="p14">
+      <p:transition spd="med" p14:dur="700">
+        <p:fade/>
+      </p:transition>
+    </mc:Choice>
+    <mc:Fallback>
+      <p:transition spd="med">
+        <p:fade/>
+      </p:transition>
+    </mc:Fallback>
+  </mc:AlternateContent>
   <p:timing>
     <p:tnLst>
       <p:par>
@@ -10885,7 +11212,18 @@
   <p:clrMapOvr>
     <a:masterClrMapping/>
   </p:clrMapOvr>
-  <p:transition spd="med"/>
+  <mc:AlternateContent xmlns:mc="http://schemas.openxmlformats.org/markup-compatibility/2006">
+    <mc:Choice xmlns:p14="http://schemas.microsoft.com/office/powerpoint/2010/main" Requires="p14">
+      <p:transition spd="med" p14:dur="700">
+        <p:fade/>
+      </p:transition>
+    </mc:Choice>
+    <mc:Fallback>
+      <p:transition spd="med">
+        <p:fade/>
+      </p:transition>
+    </mc:Fallback>
+  </mc:AlternateContent>
   <p:timing>
     <p:tnLst>
       <p:par>
@@ -11049,7 +11387,18 @@
   <p:clrMapOvr>
     <a:masterClrMapping/>
   </p:clrMapOvr>
-  <p:transition spd="med"/>
+  <mc:AlternateContent xmlns:mc="http://schemas.openxmlformats.org/markup-compatibility/2006">
+    <mc:Choice xmlns:p14="http://schemas.microsoft.com/office/powerpoint/2010/main" Requires="p14">
+      <p:transition spd="med" p14:dur="700">
+        <p:fade/>
+      </p:transition>
+    </mc:Choice>
+    <mc:Fallback>
+      <p:transition spd="med">
+        <p:fade/>
+      </p:transition>
+    </mc:Fallback>
+  </mc:AlternateContent>
   <p:timing>
     <p:tnLst>
       <p:par>
@@ -11524,7 +11873,18 @@
   <p:clrMapOvr>
     <a:masterClrMapping/>
   </p:clrMapOvr>
-  <p:transition spd="med"/>
+  <mc:AlternateContent xmlns:mc="http://schemas.openxmlformats.org/markup-compatibility/2006">
+    <mc:Choice xmlns:p14="http://schemas.microsoft.com/office/powerpoint/2010/main" Requires="p14">
+      <p:transition spd="med" p14:dur="700">
+        <p:fade/>
+      </p:transition>
+    </mc:Choice>
+    <mc:Fallback>
+      <p:transition spd="med">
+        <p:fade/>
+      </p:transition>
+    </mc:Fallback>
+  </mc:AlternateContent>
   <p:timing>
     <p:tnLst>
       <p:par>
@@ -12003,7 +12363,18 @@
   <p:clrMapOvr>
     <a:masterClrMapping/>
   </p:clrMapOvr>
-  <p:transition spd="med"/>
+  <mc:AlternateContent xmlns:mc="http://schemas.openxmlformats.org/markup-compatibility/2006">
+    <mc:Choice xmlns:p14="http://schemas.microsoft.com/office/powerpoint/2010/main" Requires="p14">
+      <p:transition spd="med" p14:dur="700">
+        <p:fade/>
+      </p:transition>
+    </mc:Choice>
+    <mc:Fallback>
+      <p:transition spd="med">
+        <p:fade/>
+      </p:transition>
+    </mc:Fallback>
+  </mc:AlternateContent>
   <p:timing>
     <p:tnLst>
       <p:par>
@@ -12358,7 +12729,18 @@
   <p:clrMapOvr>
     <a:masterClrMapping/>
   </p:clrMapOvr>
-  <p:transition spd="med"/>
+  <mc:AlternateContent xmlns:mc="http://schemas.openxmlformats.org/markup-compatibility/2006">
+    <mc:Choice xmlns:p14="http://schemas.microsoft.com/office/powerpoint/2010/main" Requires="p14">
+      <p:transition spd="med" p14:dur="700">
+        <p:fade/>
+      </p:transition>
+    </mc:Choice>
+    <mc:Fallback>
+      <p:transition spd="med">
+        <p:fade/>
+      </p:transition>
+    </mc:Fallback>
+  </mc:AlternateContent>
   <p:timing>
     <p:tnLst>
       <p:par>
@@ -12788,7 +13170,18 @@
   <p:clrMapOvr>
     <a:masterClrMapping/>
   </p:clrMapOvr>
-  <p:transition spd="med"/>
+  <mc:AlternateContent xmlns:mc="http://schemas.openxmlformats.org/markup-compatibility/2006">
+    <mc:Choice xmlns:p14="http://schemas.microsoft.com/office/powerpoint/2010/main" Requires="p14">
+      <p:transition spd="med" p14:dur="700">
+        <p:fade/>
+      </p:transition>
+    </mc:Choice>
+    <mc:Fallback>
+      <p:transition spd="med">
+        <p:fade/>
+      </p:transition>
+    </mc:Fallback>
+  </mc:AlternateContent>
   <p:timing>
     <p:tnLst>
       <p:par>
@@ -13265,7 +13658,18 @@
   <p:clrMapOvr>
     <a:masterClrMapping/>
   </p:clrMapOvr>
-  <p:transition spd="med"/>
+  <mc:AlternateContent xmlns:mc="http://schemas.openxmlformats.org/markup-compatibility/2006">
+    <mc:Choice xmlns:p14="http://schemas.microsoft.com/office/powerpoint/2010/main" Requires="p14">
+      <p:transition spd="med" p14:dur="700">
+        <p:fade/>
+      </p:transition>
+    </mc:Choice>
+    <mc:Fallback>
+      <p:transition spd="med">
+        <p:fade/>
+      </p:transition>
+    </mc:Fallback>
+  </mc:AlternateContent>
   <p:timing>
     <p:tnLst>
       <p:par>
@@ -13742,7 +14146,18 @@
   <p:clrMapOvr>
     <a:masterClrMapping/>
   </p:clrMapOvr>
-  <p:transition spd="med"/>
+  <mc:AlternateContent xmlns:mc="http://schemas.openxmlformats.org/markup-compatibility/2006">
+    <mc:Choice xmlns:p14="http://schemas.microsoft.com/office/powerpoint/2010/main" Requires="p14">
+      <p:transition spd="med" p14:dur="700">
+        <p:fade/>
+      </p:transition>
+    </mc:Choice>
+    <mc:Fallback>
+      <p:transition spd="med">
+        <p:fade/>
+      </p:transition>
+    </mc:Fallback>
+  </mc:AlternateContent>
   <p:timing>
     <p:tnLst>
       <p:par>
@@ -14219,7 +14634,18 @@
   <p:clrMapOvr>
     <a:masterClrMapping/>
   </p:clrMapOvr>
-  <p:transition spd="med"/>
+  <mc:AlternateContent xmlns:mc="http://schemas.openxmlformats.org/markup-compatibility/2006">
+    <mc:Choice xmlns:p14="http://schemas.microsoft.com/office/powerpoint/2010/main" Requires="p14">
+      <p:transition spd="med" p14:dur="700">
+        <p:fade/>
+      </p:transition>
+    </mc:Choice>
+    <mc:Fallback>
+      <p:transition spd="med">
+        <p:fade/>
+      </p:transition>
+    </mc:Fallback>
+  </mc:AlternateContent>
   <p:timing>
     <p:tnLst>
       <p:par>
@@ -14704,7 +15130,18 @@
   <p:clrMapOvr>
     <a:masterClrMapping/>
   </p:clrMapOvr>
-  <p:transition spd="med"/>
+  <mc:AlternateContent xmlns:mc="http://schemas.openxmlformats.org/markup-compatibility/2006">
+    <mc:Choice xmlns:p14="http://schemas.microsoft.com/office/powerpoint/2010/main" Requires="p14">
+      <p:transition spd="med" p14:dur="700">
+        <p:fade/>
+      </p:transition>
+    </mc:Choice>
+    <mc:Fallback>
+      <p:transition spd="med">
+        <p:fade/>
+      </p:transition>
+    </mc:Fallback>
+  </mc:AlternateContent>
   <p:timing>
     <p:tnLst>
       <p:par>
@@ -14916,11 +15353,149 @@
   <p:clrMapOvr>
     <a:masterClrMapping/>
   </p:clrMapOvr>
-  <p:transition spd="med"/>
+  <mc:AlternateContent xmlns:mc="http://schemas.openxmlformats.org/markup-compatibility/2006">
+    <mc:Choice xmlns:p14="http://schemas.microsoft.com/office/powerpoint/2010/main" Requires="p14">
+      <p:transition spd="med" p14:dur="700">
+        <p:fade/>
+      </p:transition>
+    </mc:Choice>
+    <mc:Fallback>
+      <p:transition spd="med">
+        <p:fade/>
+      </p:transition>
+    </mc:Fallback>
+  </mc:AlternateContent>
   <p:timing>
     <p:tnLst>
       <p:par>
-        <p:cTn id="1" dur="indefinite" restart="never" nodeType="tmRoot"/>
+        <p:cTn id="1" dur="indefinite" restart="never" nodeType="tmRoot">
+          <p:childTnLst>
+            <p:seq concurrent="1" nextAc="seek">
+              <p:cTn id="2" dur="indefinite" nodeType="mainSeq">
+                <p:childTnLst>
+                  <p:par>
+                    <p:cTn id="3" fill="hold">
+                      <p:stCondLst>
+                        <p:cond delay="indefinite"/>
+                      </p:stCondLst>
+                      <p:childTnLst>
+                        <p:par>
+                          <p:cTn id="4" fill="hold">
+                            <p:stCondLst>
+                              <p:cond delay="0"/>
+                            </p:stCondLst>
+                            <p:childTnLst>
+                              <p:par>
+                                <p:cTn id="5" presetID="10" presetClass="entr" presetSubtype="0" fill="hold" nodeType="clickEffect">
+                                  <p:stCondLst>
+                                    <p:cond delay="0"/>
+                                  </p:stCondLst>
+                                  <p:childTnLst>
+                                    <p:set>
+                                      <p:cBhvr>
+                                        <p:cTn id="6" dur="1" fill="hold">
+                                          <p:stCondLst>
+                                            <p:cond delay="0"/>
+                                          </p:stCondLst>
+                                        </p:cTn>
+                                        <p:tgtEl>
+                                          <p:spTgt spid="3">
+                                            <p:txEl>
+                                              <p:pRg st="4" end="4"/>
+                                            </p:txEl>
+                                          </p:spTgt>
+                                        </p:tgtEl>
+                                        <p:attrNameLst>
+                                          <p:attrName>style.visibility</p:attrName>
+                                        </p:attrNameLst>
+                                      </p:cBhvr>
+                                      <p:to>
+                                        <p:strVal val="visible"/>
+                                      </p:to>
+                                    </p:set>
+                                    <p:animEffect transition="in" filter="fade">
+                                      <p:cBhvr>
+                                        <p:cTn id="7" dur="500"/>
+                                        <p:tgtEl>
+                                          <p:spTgt spid="3">
+                                            <p:txEl>
+                                              <p:pRg st="4" end="4"/>
+                                            </p:txEl>
+                                          </p:spTgt>
+                                        </p:tgtEl>
+                                      </p:cBhvr>
+                                    </p:animEffect>
+                                  </p:childTnLst>
+                                </p:cTn>
+                              </p:par>
+                              <p:par>
+                                <p:cTn id="8" presetID="10" presetClass="entr" presetSubtype="0" fill="hold" nodeType="withEffect">
+                                  <p:stCondLst>
+                                    <p:cond delay="0"/>
+                                  </p:stCondLst>
+                                  <p:childTnLst>
+                                    <p:set>
+                                      <p:cBhvr>
+                                        <p:cTn id="9" dur="1" fill="hold">
+                                          <p:stCondLst>
+                                            <p:cond delay="0"/>
+                                          </p:stCondLst>
+                                        </p:cTn>
+                                        <p:tgtEl>
+                                          <p:spTgt spid="3">
+                                            <p:txEl>
+                                              <p:pRg st="6" end="6"/>
+                                            </p:txEl>
+                                          </p:spTgt>
+                                        </p:tgtEl>
+                                        <p:attrNameLst>
+                                          <p:attrName>style.visibility</p:attrName>
+                                        </p:attrNameLst>
+                                      </p:cBhvr>
+                                      <p:to>
+                                        <p:strVal val="visible"/>
+                                      </p:to>
+                                    </p:set>
+                                    <p:animEffect transition="in" filter="fade">
+                                      <p:cBhvr>
+                                        <p:cTn id="10" dur="500"/>
+                                        <p:tgtEl>
+                                          <p:spTgt spid="3">
+                                            <p:txEl>
+                                              <p:pRg st="6" end="6"/>
+                                            </p:txEl>
+                                          </p:spTgt>
+                                        </p:tgtEl>
+                                      </p:cBhvr>
+                                    </p:animEffect>
+                                  </p:childTnLst>
+                                </p:cTn>
+                              </p:par>
+                            </p:childTnLst>
+                          </p:cTn>
+                        </p:par>
+                      </p:childTnLst>
+                    </p:cTn>
+                  </p:par>
+                </p:childTnLst>
+              </p:cTn>
+              <p:prevCondLst>
+                <p:cond evt="onPrev" delay="0">
+                  <p:tgtEl>
+                    <p:sldTgt/>
+                  </p:tgtEl>
+                </p:cond>
+              </p:prevCondLst>
+              <p:nextCondLst>
+                <p:cond evt="onNext" delay="0">
+                  <p:tgtEl>
+                    <p:sldTgt/>
+                  </p:tgtEl>
+                </p:cond>
+              </p:nextCondLst>
+            </p:seq>
+          </p:childTnLst>
+        </p:cTn>
       </p:par>
     </p:tnLst>
   </p:timing>
@@ -15202,9 +15777,12 @@
             </a:r>
             <a:r>
               <a:rPr lang="de-DE" sz="1600" dirty="0"/>
-              <a:t>, 10(7), 2016.</a:t>
-            </a:r>
-            <a:endParaRPr lang="de-DE" sz="1600" dirty="0" smtClean="0"/>
+              <a:t>, 10(7), 2016</a:t>
+            </a:r>
+            <a:r>
+              <a:rPr lang="de-DE" sz="1600" dirty="0" smtClean="0"/>
+              <a:t>.</a:t>
+            </a:r>
           </a:p>
           <a:p>
             <a:endParaRPr lang="de-DE" sz="1600" dirty="0" smtClean="0"/>
@@ -15386,7 +15964,18 @@
   <p:clrMapOvr>
     <a:masterClrMapping/>
   </p:clrMapOvr>
-  <p:transition spd="med"/>
+  <mc:AlternateContent xmlns:mc="http://schemas.openxmlformats.org/markup-compatibility/2006">
+    <mc:Choice xmlns:p14="http://schemas.microsoft.com/office/powerpoint/2010/main" Requires="p14">
+      <p:transition spd="med" p14:dur="700">
+        <p:fade/>
+      </p:transition>
+    </mc:Choice>
+    <mc:Fallback>
+      <p:transition spd="med">
+        <p:fade/>
+      </p:transition>
+    </mc:Fallback>
+  </mc:AlternateContent>
   <p:timing>
     <p:tnLst>
       <p:par>
@@ -15499,7 +16088,18 @@
   <p:clrMapOvr>
     <a:masterClrMapping/>
   </p:clrMapOvr>
-  <p:transition spd="med"/>
+  <mc:AlternateContent xmlns:mc="http://schemas.openxmlformats.org/markup-compatibility/2006">
+    <mc:Choice xmlns:p14="http://schemas.microsoft.com/office/powerpoint/2010/main" Requires="p14">
+      <p:transition spd="med" p14:dur="700">
+        <p:fade/>
+      </p:transition>
+    </mc:Choice>
+    <mc:Fallback>
+      <p:transition spd="med">
+        <p:fade/>
+      </p:transition>
+    </mc:Fallback>
+  </mc:AlternateContent>
   <p:timing>
     <p:tnLst>
       <p:par>
@@ -15683,7 +16283,18 @@
   <p:clrMapOvr>
     <a:masterClrMapping/>
   </p:clrMapOvr>
-  <p:transition spd="med"/>
+  <mc:AlternateContent xmlns:mc="http://schemas.openxmlformats.org/markup-compatibility/2006">
+    <mc:Choice xmlns:p14="http://schemas.microsoft.com/office/powerpoint/2010/main" Requires="p14">
+      <p:transition spd="med" p14:dur="700">
+        <p:fade/>
+      </p:transition>
+    </mc:Choice>
+    <mc:Fallback>
+      <p:transition spd="med">
+        <p:fade/>
+      </p:transition>
+    </mc:Fallback>
+  </mc:AlternateContent>
   <p:timing>
     <p:tnLst>
       <p:par>
@@ -15837,7 +16448,18 @@
   <p:clrMapOvr>
     <a:masterClrMapping/>
   </p:clrMapOvr>
-  <p:transition spd="med"/>
+  <mc:AlternateContent xmlns:mc="http://schemas.openxmlformats.org/markup-compatibility/2006">
+    <mc:Choice xmlns:p14="http://schemas.microsoft.com/office/powerpoint/2010/main" Requires="p14">
+      <p:transition spd="med" p14:dur="700">
+        <p:fade/>
+      </p:transition>
+    </mc:Choice>
+    <mc:Fallback>
+      <p:transition spd="med">
+        <p:fade/>
+      </p:transition>
+    </mc:Fallback>
+  </mc:AlternateContent>
   <p:timing>
     <p:tnLst>
       <p:par>
@@ -16855,7 +17477,7 @@
         </p:blipFill>
         <p:spPr bwMode="auto">
           <a:xfrm>
-            <a:off x="6896" y="1183534"/>
+            <a:off x="6896" y="1199349"/>
             <a:ext cx="2714102" cy="861499"/>
           </a:xfrm>
           <a:prstGeom prst="rect">

</xml_diff>